<commit_message>
Partially finished overview presentation. Added license file
</commit_message>
<xml_diff>
--- a/documentation/presentation/general_overview.pptx
+++ b/documentation/presentation/general_overview.pptx
@@ -2,7 +2,7 @@
 <file path=ppt/presentation.xml><?xml version="1.0" encoding="utf-8"?>
 <p:presentation xmlns:a="http://schemas.openxmlformats.org/drawingml/2006/main" xmlns:r="http://schemas.openxmlformats.org/officeDocument/2006/relationships" xmlns:p="http://schemas.openxmlformats.org/presentationml/2006/main" saveSubsetFonts="1">
   <p:sldMasterIdLst>
-    <p:sldMasterId id="2147483660" r:id="rId1"/>
+    <p:sldMasterId id="2147483769" r:id="rId1"/>
   </p:sldMasterIdLst>
   <p:sldIdLst>
     <p:sldId id="256" r:id="rId2"/>
@@ -12,12 +12,14 @@
     <p:sldId id="263" r:id="rId6"/>
     <p:sldId id="260" r:id="rId7"/>
     <p:sldId id="261" r:id="rId8"/>
-    <p:sldId id="262" r:id="rId9"/>
-    <p:sldId id="264" r:id="rId10"/>
+    <p:sldId id="270" r:id="rId9"/>
+    <p:sldId id="262" r:id="rId10"/>
     <p:sldId id="265" r:id="rId11"/>
-    <p:sldId id="267" r:id="rId12"/>
-    <p:sldId id="266" r:id="rId13"/>
-    <p:sldId id="268" r:id="rId14"/>
+    <p:sldId id="271" r:id="rId12"/>
+    <p:sldId id="267" r:id="rId13"/>
+    <p:sldId id="266" r:id="rId14"/>
+    <p:sldId id="268" r:id="rId15"/>
+    <p:sldId id="269" r:id="rId16"/>
   </p:sldIdLst>
   <p:sldSz cx="9144000" cy="6858000" type="screen4x3"/>
   <p:notesSz cx="6858000" cy="9144000"/>
@@ -4201,17 +4203,17 @@
   </p:cSld>
   <p:clrMap bg1="lt1" tx1="dk1" bg2="lt2" tx2="dk2" accent1="accent1" accent2="accent2" accent3="accent3" accent4="accent4" accent5="accent5" accent6="accent6" hlink="hlink" folHlink="folHlink"/>
   <p:sldLayoutIdLst>
-    <p:sldLayoutId id="2147483661" r:id="rId1"/>
-    <p:sldLayoutId id="2147483662" r:id="rId2"/>
-    <p:sldLayoutId id="2147483663" r:id="rId3"/>
-    <p:sldLayoutId id="2147483664" r:id="rId4"/>
-    <p:sldLayoutId id="2147483665" r:id="rId5"/>
-    <p:sldLayoutId id="2147483666" r:id="rId6"/>
-    <p:sldLayoutId id="2147483667" r:id="rId7"/>
-    <p:sldLayoutId id="2147483668" r:id="rId8"/>
-    <p:sldLayoutId id="2147483669" r:id="rId9"/>
-    <p:sldLayoutId id="2147483670" r:id="rId10"/>
-    <p:sldLayoutId id="2147483671" r:id="rId11"/>
+    <p:sldLayoutId id="2147483770" r:id="rId1"/>
+    <p:sldLayoutId id="2147483771" r:id="rId2"/>
+    <p:sldLayoutId id="2147483772" r:id="rId3"/>
+    <p:sldLayoutId id="2147483773" r:id="rId4"/>
+    <p:sldLayoutId id="2147483774" r:id="rId5"/>
+    <p:sldLayoutId id="2147483775" r:id="rId6"/>
+    <p:sldLayoutId id="2147483776" r:id="rId7"/>
+    <p:sldLayoutId id="2147483777" r:id="rId8"/>
+    <p:sldLayoutId id="2147483778" r:id="rId9"/>
+    <p:sldLayoutId id="2147483779" r:id="rId10"/>
+    <p:sldLayoutId id="2147483780" r:id="rId11"/>
   </p:sldLayoutIdLst>
   <p:txStyles>
     <p:titleStyle>
@@ -4573,6 +4575,21 @@
   <p:clrMapOvr>
     <a:masterClrMapping/>
   </p:clrMapOvr>
+  <mc:AlternateContent xmlns:mc="http://schemas.openxmlformats.org/markup-compatibility/2006">
+    <mc:Choice xmlns:p14="http://schemas.microsoft.com/office/powerpoint/2010/main" Requires="p14">
+      <p:transition spd="slow" p14:dur="2000"/>
+    </mc:Choice>
+    <mc:Fallback>
+      <p:transition spd="slow"/>
+    </mc:Fallback>
+  </mc:AlternateContent>
+  <p:timing>
+    <p:tnLst>
+      <p:par>
+        <p:cTn id="1" dur="indefinite" restart="never" nodeType="tmRoot"/>
+      </p:par>
+    </p:tnLst>
+  </p:timing>
 </p:sld>
 </file>
 
@@ -4631,7 +4648,62 @@
           <a:bodyPr/>
           <a:lstStyle/>
           <a:p>
-            <a:endParaRPr lang="pl-PL"/>
+            <a:pPr marL="0" indent="0">
+              <a:buNone/>
+            </a:pPr>
+            <a:r>
+              <a:rPr lang="pl-PL" dirty="0" err="1" smtClean="0"/>
+              <a:t>Various</a:t>
+            </a:r>
+            <a:r>
+              <a:rPr lang="pl-PL" dirty="0" smtClean="0"/>
+              <a:t> </a:t>
+            </a:r>
+            <a:r>
+              <a:rPr lang="en-US" dirty="0" smtClean="0"/>
+              <a:t>engines</a:t>
+            </a:r>
+            <a:r>
+              <a:rPr lang="pl-PL" dirty="0" smtClean="0"/>
+              <a:t> </a:t>
+            </a:r>
+            <a:r>
+              <a:rPr lang="pl-PL" dirty="0" err="1" smtClean="0"/>
+              <a:t>used</a:t>
+            </a:r>
+            <a:r>
+              <a:rPr lang="pl-PL" dirty="0" smtClean="0"/>
+              <a:t> for </a:t>
+            </a:r>
+            <a:r>
+              <a:rPr lang="pl-PL" dirty="0" err="1" smtClean="0"/>
+              <a:t>blender</a:t>
+            </a:r>
+            <a:r>
+              <a:rPr lang="en-US" dirty="0" smtClean="0"/>
+              <a:t> rendering pipe:</a:t>
+            </a:r>
+          </a:p>
+          <a:p>
+            <a:r>
+              <a:rPr lang="en-US" dirty="0" smtClean="0"/>
+              <a:t>Built</a:t>
+            </a:r>
+            <a:r>
+              <a:rPr lang="pl-PL" dirty="0" smtClean="0"/>
+              <a:t>-</a:t>
+            </a:r>
+            <a:r>
+              <a:rPr lang="en-US" dirty="0" smtClean="0"/>
+              <a:t>in OpenGL render</a:t>
+            </a:r>
+          </a:p>
+          <a:p>
+            <a:r>
+              <a:rPr lang="en-US" dirty="0" err="1" smtClean="0"/>
+              <a:t>LuxRender</a:t>
+            </a:r>
+            <a:endParaRPr lang="en-US" dirty="0"/>
           </a:p>
         </p:txBody>
       </p:sp>
@@ -4645,6 +4717,21 @@
   <p:clrMapOvr>
     <a:masterClrMapping/>
   </p:clrMapOvr>
+  <mc:AlternateContent xmlns:mc="http://schemas.openxmlformats.org/markup-compatibility/2006">
+    <mc:Choice xmlns:p14="http://schemas.microsoft.com/office/powerpoint/2010/main" Requires="p14">
+      <p:transition spd="slow" p14:dur="2000"/>
+    </mc:Choice>
+    <mc:Fallback>
+      <p:transition spd="slow"/>
+    </mc:Fallback>
+  </mc:AlternateContent>
+  <p:timing>
+    <p:tnLst>
+      <p:par>
+        <p:cTn id="1" dur="indefinite" restart="never" nodeType="tmRoot"/>
+      </p:par>
+    </p:tnLst>
+  </p:timing>
 </p:sld>
 </file>
 
@@ -4681,36 +4768,47 @@
           <a:lstStyle/>
           <a:p>
             <a:r>
-              <a:rPr lang="en-US" dirty="0" smtClean="0"/>
-              <a:t>State of implementation</a:t>
-            </a:r>
-            <a:endParaRPr lang="en-US" dirty="0"/>
-          </a:p>
-        </p:txBody>
-      </p:sp>
-      <p:sp>
-        <p:nvSpPr>
-          <p:cNvPr id="3" name="Symbol zastępczy zawartości 2"/>
-          <p:cNvSpPr>
-            <a:spLocks noGrp="1"/>
-          </p:cNvSpPr>
-          <p:nvPr>
-            <p:ph idx="1"/>
-          </p:nvPr>
-        </p:nvSpPr>
-        <p:spPr/>
-        <p:txBody>
-          <a:bodyPr/>
-          <a:lstStyle/>
-          <a:p>
-            <a:endParaRPr lang="pl-PL"/>
-          </a:p>
-        </p:txBody>
-      </p:sp>
+              <a:rPr lang="pl-PL" dirty="0" smtClean="0"/>
+              <a:t>Rendering</a:t>
+            </a:r>
+            <a:endParaRPr lang="pl-PL" dirty="0"/>
+          </a:p>
+        </p:txBody>
+      </p:sp>
+      <p:pic>
+        <p:nvPicPr>
+          <p:cNvPr id="4" name="Obraz 3"/>
+          <p:cNvPicPr>
+            <a:picLocks noChangeAspect="1"/>
+          </p:cNvPicPr>
+          <p:nvPr/>
+        </p:nvPicPr>
+        <p:blipFill>
+          <a:blip r:embed="rId2">
+            <a:extLst>
+              <a:ext uri="{28A0092B-C50C-407E-A947-70E740481C1C}">
+                <a14:useLocalDpi xmlns:a14="http://schemas.microsoft.com/office/drawing/2010/main" val="0"/>
+              </a:ext>
+            </a:extLst>
+          </a:blip>
+          <a:stretch>
+            <a:fillRect/>
+          </a:stretch>
+        </p:blipFill>
+        <p:spPr>
+          <a:xfrm>
+            <a:off x="3707904" y="1844824"/>
+            <a:ext cx="3859629" cy="4824536"/>
+          </a:xfrm>
+          <a:prstGeom prst="rect">
+            <a:avLst/>
+          </a:prstGeom>
+        </p:spPr>
+      </p:pic>
     </p:spTree>
     <p:extLst>
       <p:ext uri="{BB962C8B-B14F-4D97-AF65-F5344CB8AC3E}">
-        <p14:creationId xmlns:p14="http://schemas.microsoft.com/office/powerpoint/2010/main" val="1069565877"/>
+        <p14:creationId xmlns:p14="http://schemas.microsoft.com/office/powerpoint/2010/main" val="187252362"/>
       </p:ext>
     </p:extLst>
   </p:cSld>
@@ -4760,18 +4858,10 @@
           <a:lstStyle/>
           <a:p>
             <a:r>
-              <a:rPr lang="pl-PL" dirty="0" err="1" smtClean="0"/>
-              <a:t>Planned</a:t>
-            </a:r>
-            <a:r>
-              <a:rPr lang="pl-PL" dirty="0" smtClean="0"/>
-              <a:t> </a:t>
-            </a:r>
-            <a:r>
-              <a:rPr lang="pl-PL" dirty="0" err="1" smtClean="0"/>
-              <a:t>experiments</a:t>
-            </a:r>
-            <a:endParaRPr lang="pl-PL" dirty="0"/>
+              <a:rPr lang="en-US" smtClean="0"/>
+              <a:t>State of implementation</a:t>
+            </a:r>
+            <a:endParaRPr lang="en-US"/>
           </a:p>
         </p:txBody>
       </p:sp>
@@ -4790,20 +4880,35 @@
           <a:bodyPr/>
           <a:lstStyle/>
           <a:p>
-            <a:endParaRPr lang="pl-PL"/>
+            <a:pPr marL="0" indent="0">
+              <a:buNone/>
+            </a:pPr>
+            <a:r>
+              <a:rPr lang="pl-PL" dirty="0" smtClean="0"/>
+              <a:t>TODO: ten sam smart art ale z kolorkami co jest zaimplementowane a co nie?</a:t>
+            </a:r>
+            <a:endParaRPr lang="en-US" dirty="0"/>
           </a:p>
         </p:txBody>
       </p:sp>
     </p:spTree>
     <p:extLst>
       <p:ext uri="{BB962C8B-B14F-4D97-AF65-F5344CB8AC3E}">
-        <p14:creationId xmlns:p14="http://schemas.microsoft.com/office/powerpoint/2010/main" val="363477968"/>
+        <p14:creationId xmlns:p14="http://schemas.microsoft.com/office/powerpoint/2010/main" val="1069565877"/>
       </p:ext>
     </p:extLst>
   </p:cSld>
   <p:clrMapOvr>
     <a:masterClrMapping/>
   </p:clrMapOvr>
+  <mc:AlternateContent xmlns:mc="http://schemas.openxmlformats.org/markup-compatibility/2006">
+    <mc:Choice xmlns:p14="http://schemas.microsoft.com/office/powerpoint/2010/main" Requires="p14">
+      <p:transition spd="slow" p14:dur="2000"/>
+    </mc:Choice>
+    <mc:Fallback>
+      <p:transition spd="slow"/>
+    </mc:Fallback>
+  </mc:AlternateContent>
   <p:timing>
     <p:tnLst>
       <p:par>
@@ -4847,6 +4952,115 @@
           <a:lstStyle/>
           <a:p>
             <a:r>
+              <a:rPr lang="en-US" dirty="0" smtClean="0"/>
+              <a:t>Planned experiments</a:t>
+            </a:r>
+            <a:endParaRPr lang="en-US" dirty="0"/>
+          </a:p>
+        </p:txBody>
+      </p:sp>
+      <p:sp>
+        <p:nvSpPr>
+          <p:cNvPr id="3" name="Symbol zastępczy zawartości 2"/>
+          <p:cNvSpPr>
+            <a:spLocks noGrp="1"/>
+          </p:cNvSpPr>
+          <p:nvPr>
+            <p:ph idx="1"/>
+          </p:nvPr>
+        </p:nvSpPr>
+        <p:spPr/>
+        <p:txBody>
+          <a:bodyPr/>
+          <a:lstStyle/>
+          <a:p>
+            <a:r>
+              <a:rPr lang="en-US" dirty="0" smtClean="0"/>
+              <a:t>simple object rotation</a:t>
+            </a:r>
+          </a:p>
+          <a:p>
+            <a:r>
+              <a:rPr lang="en-US" dirty="0" smtClean="0"/>
+              <a:t>simple object with occlusion </a:t>
+            </a:r>
+          </a:p>
+          <a:p>
+            <a:r>
+              <a:rPr lang="en-US" dirty="0" smtClean="0"/>
+              <a:t>multiple objects in various lights </a:t>
+            </a:r>
+          </a:p>
+          <a:p>
+            <a:r>
+              <a:rPr lang="en-US" dirty="0" smtClean="0"/>
+              <a:t>multiple objects with foggy occlusion</a:t>
+            </a:r>
+            <a:endParaRPr lang="en-US" dirty="0"/>
+          </a:p>
+        </p:txBody>
+      </p:sp>
+    </p:spTree>
+    <p:extLst>
+      <p:ext uri="{BB962C8B-B14F-4D97-AF65-F5344CB8AC3E}">
+        <p14:creationId xmlns:p14="http://schemas.microsoft.com/office/powerpoint/2010/main" val="363477968"/>
+      </p:ext>
+    </p:extLst>
+  </p:cSld>
+  <p:clrMapOvr>
+    <a:masterClrMapping/>
+  </p:clrMapOvr>
+  <mc:AlternateContent xmlns:mc="http://schemas.openxmlformats.org/markup-compatibility/2006">
+    <mc:Choice xmlns:p14="http://schemas.microsoft.com/office/powerpoint/2010/main" Requires="p14">
+      <p:transition spd="slow" p14:dur="2000"/>
+    </mc:Choice>
+    <mc:Fallback>
+      <p:transition spd="slow"/>
+    </mc:Fallback>
+  </mc:AlternateContent>
+  <p:timing>
+    <p:tnLst>
+      <p:par>
+        <p:cTn id="1" dur="indefinite" restart="never" nodeType="tmRoot"/>
+      </p:par>
+    </p:tnLst>
+  </p:timing>
+</p:sld>
+</file>
+
+<file path=ppt/slides/slide14.xml><?xml version="1.0" encoding="utf-8"?>
+<p:sld xmlns:a="http://schemas.openxmlformats.org/drawingml/2006/main" xmlns:r="http://schemas.openxmlformats.org/officeDocument/2006/relationships" xmlns:p="http://schemas.openxmlformats.org/presentationml/2006/main">
+  <p:cSld>
+    <p:spTree>
+      <p:nvGrpSpPr>
+        <p:cNvPr id="1" name=""/>
+        <p:cNvGrpSpPr/>
+        <p:nvPr/>
+      </p:nvGrpSpPr>
+      <p:grpSpPr>
+        <a:xfrm>
+          <a:off x="0" y="0"/>
+          <a:ext cx="0" cy="0"/>
+          <a:chOff x="0" y="0"/>
+          <a:chExt cx="0" cy="0"/>
+        </a:xfrm>
+      </p:grpSpPr>
+      <p:sp>
+        <p:nvSpPr>
+          <p:cNvPr id="2" name="Tytuł 1"/>
+          <p:cNvSpPr>
+            <a:spLocks noGrp="1"/>
+          </p:cNvSpPr>
+          <p:nvPr>
+            <p:ph type="title"/>
+          </p:nvPr>
+        </p:nvSpPr>
+        <p:spPr/>
+        <p:txBody>
+          <a:bodyPr/>
+          <a:lstStyle/>
+          <a:p>
+            <a:r>
               <a:rPr lang="pl-PL" dirty="0" smtClean="0"/>
               <a:t>Source </a:t>
             </a:r>
@@ -4865,22 +5079,214 @@
             <a:spLocks noGrp="1"/>
           </p:cNvSpPr>
           <p:nvPr>
-            <p:ph idx="1"/>
-          </p:nvPr>
-        </p:nvSpPr>
-        <p:spPr/>
+            <p:ph idx="4294967295"/>
+          </p:nvPr>
+        </p:nvSpPr>
+        <p:spPr>
+          <a:xfrm>
+            <a:off x="3995936" y="2276872"/>
+            <a:ext cx="4968552" cy="3840163"/>
+          </a:xfrm>
+        </p:spPr>
         <p:txBody>
           <a:bodyPr/>
           <a:lstStyle/>
           <a:p>
-            <a:endParaRPr lang="pl-PL"/>
-          </a:p>
-        </p:txBody>
-      </p:sp>
+            <a:pPr marL="0" indent="0" algn="ctr">
+              <a:buNone/>
+            </a:pPr>
+            <a:r>
+              <a:rPr lang="pl-PL" dirty="0">
+                <a:hlinkClick r:id="rId2"/>
+              </a:rPr>
+              <a:t>https://</a:t>
+            </a:r>
+            <a:r>
+              <a:rPr lang="pl-PL" dirty="0" smtClean="0">
+                <a:hlinkClick r:id="rId2"/>
+              </a:rPr>
+              <a:t>github.com/Dzess/ALFIRT</a:t>
+            </a:r>
+            <a:endParaRPr lang="pl-PL" dirty="0" smtClean="0"/>
+          </a:p>
+          <a:p>
+            <a:pPr marL="0" indent="0" algn="ctr">
+              <a:buNone/>
+            </a:pPr>
+            <a:endParaRPr lang="pl-PL" dirty="0"/>
+          </a:p>
+          <a:p>
+            <a:pPr marL="0" indent="0" algn="ctr">
+              <a:buNone/>
+            </a:pPr>
+            <a:r>
+              <a:rPr lang="en-US" dirty="0" smtClean="0"/>
+              <a:t>MIT License</a:t>
+            </a:r>
+            <a:r>
+              <a:rPr lang="pl-PL" dirty="0" smtClean="0"/>
+              <a:t> !</a:t>
+            </a:r>
+            <a:endParaRPr lang="en-US" dirty="0"/>
+          </a:p>
+        </p:txBody>
+      </p:sp>
+      <p:pic>
+        <p:nvPicPr>
+          <p:cNvPr id="4" name="Obraz 3"/>
+          <p:cNvPicPr>
+            <a:picLocks noChangeAspect="1"/>
+          </p:cNvPicPr>
+          <p:nvPr/>
+        </p:nvPicPr>
+        <p:blipFill>
+          <a:blip r:embed="rId3" cstate="print">
+            <a:extLst>
+              <a:ext uri="{28A0092B-C50C-407E-A947-70E740481C1C}">
+                <a14:useLocalDpi xmlns:a14="http://schemas.microsoft.com/office/drawing/2010/main" val="0"/>
+              </a:ext>
+            </a:extLst>
+          </a:blip>
+          <a:stretch>
+            <a:fillRect/>
+          </a:stretch>
+        </p:blipFill>
+        <p:spPr>
+          <a:xfrm>
+            <a:off x="323528" y="2170559"/>
+            <a:ext cx="3203119" cy="4304427"/>
+          </a:xfrm>
+          <a:prstGeom prst="rect">
+            <a:avLst/>
+          </a:prstGeom>
+          <a:ln>
+            <a:noFill/>
+          </a:ln>
+          <a:effectLst>
+            <a:softEdge rad="112500"/>
+          </a:effectLst>
+        </p:spPr>
+      </p:pic>
     </p:spTree>
     <p:extLst>
       <p:ext uri="{BB962C8B-B14F-4D97-AF65-F5344CB8AC3E}">
         <p14:creationId xmlns:p14="http://schemas.microsoft.com/office/powerpoint/2010/main" val="3724166097"/>
+      </p:ext>
+    </p:extLst>
+  </p:cSld>
+  <p:clrMapOvr>
+    <a:masterClrMapping/>
+  </p:clrMapOvr>
+  <mc:AlternateContent xmlns:mc="http://schemas.openxmlformats.org/markup-compatibility/2006">
+    <mc:Choice xmlns:p14="http://schemas.microsoft.com/office/powerpoint/2010/main" Requires="p14">
+      <p:transition spd="slow" p14:dur="2000"/>
+    </mc:Choice>
+    <mc:Fallback>
+      <p:transition spd="slow"/>
+    </mc:Fallback>
+  </mc:AlternateContent>
+  <p:timing>
+    <p:tnLst>
+      <p:par>
+        <p:cTn id="1" dur="indefinite" restart="never" nodeType="tmRoot"/>
+      </p:par>
+    </p:tnLst>
+  </p:timing>
+</p:sld>
+</file>
+
+<file path=ppt/slides/slide15.xml><?xml version="1.0" encoding="utf-8"?>
+<p:sld xmlns:a="http://schemas.openxmlformats.org/drawingml/2006/main" xmlns:r="http://schemas.openxmlformats.org/officeDocument/2006/relationships" xmlns:p="http://schemas.openxmlformats.org/presentationml/2006/main">
+  <p:cSld>
+    <p:spTree>
+      <p:nvGrpSpPr>
+        <p:cNvPr id="1" name=""/>
+        <p:cNvGrpSpPr/>
+        <p:nvPr/>
+      </p:nvGrpSpPr>
+      <p:grpSpPr>
+        <a:xfrm>
+          <a:off x="0" y="0"/>
+          <a:ext cx="0" cy="0"/>
+          <a:chOff x="0" y="0"/>
+          <a:chExt cx="0" cy="0"/>
+        </a:xfrm>
+      </p:grpSpPr>
+      <p:sp>
+        <p:nvSpPr>
+          <p:cNvPr id="2" name="Tytuł 1"/>
+          <p:cNvSpPr>
+            <a:spLocks noGrp="1"/>
+          </p:cNvSpPr>
+          <p:nvPr>
+            <p:ph type="title"/>
+          </p:nvPr>
+        </p:nvSpPr>
+        <p:spPr>
+          <a:xfrm>
+            <a:off x="1905000" y="2667000"/>
+            <a:ext cx="6771456" cy="1143000"/>
+          </a:xfrm>
+        </p:spPr>
+        <p:txBody>
+          <a:bodyPr/>
+          <a:lstStyle/>
+          <a:p>
+            <a:r>
+              <a:rPr lang="en-US" dirty="0" smtClean="0"/>
+              <a:t>Thank you for you</a:t>
+            </a:r>
+            <a:r>
+              <a:rPr lang="pl-PL" dirty="0" smtClean="0"/>
+              <a:t>r</a:t>
+            </a:r>
+            <a:r>
+              <a:rPr lang="en-US" dirty="0" smtClean="0"/>
+              <a:t> attention</a:t>
+            </a:r>
+            <a:r>
+              <a:rPr lang="pl-PL" dirty="0" smtClean="0"/>
+              <a:t>!</a:t>
+            </a:r>
+            <a:endParaRPr lang="en-US" dirty="0"/>
+          </a:p>
+        </p:txBody>
+      </p:sp>
+      <p:sp>
+        <p:nvSpPr>
+          <p:cNvPr id="4" name="Symbol zastępczy tekstu 3"/>
+          <p:cNvSpPr>
+            <a:spLocks noGrp="1"/>
+          </p:cNvSpPr>
+          <p:nvPr>
+            <p:ph type="body" idx="1"/>
+          </p:nvPr>
+        </p:nvSpPr>
+        <p:spPr/>
+        <p:txBody>
+          <a:bodyPr/>
+          <a:lstStyle/>
+          <a:p>
+            <a:r>
+              <a:rPr lang="en-US" dirty="0" smtClean="0"/>
+              <a:t>Any</a:t>
+            </a:r>
+            <a:r>
+              <a:rPr lang="pl-PL" dirty="0" smtClean="0"/>
+              <a:t> </a:t>
+            </a:r>
+            <a:r>
+              <a:rPr lang="en-US" dirty="0" smtClean="0"/>
+              <a:t>Questions?</a:t>
+            </a:r>
+            <a:endParaRPr lang="en-US" dirty="0"/>
+          </a:p>
+        </p:txBody>
+      </p:sp>
+    </p:spTree>
+    <p:extLst>
+      <p:ext uri="{BB962C8B-B14F-4D97-AF65-F5344CB8AC3E}">
+        <p14:creationId xmlns:p14="http://schemas.microsoft.com/office/powerpoint/2010/main" val="784223439"/>
       </p:ext>
     </p:extLst>
   </p:cSld>
@@ -4972,10 +5378,53 @@
           <a:bodyPr/>
           <a:lstStyle/>
           <a:p>
-            <a:endParaRPr lang="pl-PL" dirty="0"/>
-          </a:p>
-        </p:txBody>
-      </p:sp>
+            <a:pPr marL="0" indent="0">
+              <a:buNone/>
+            </a:pPr>
+            <a:r>
+              <a:rPr lang="en-US" dirty="0" smtClean="0"/>
+              <a:t>Object Pose – 6 DOF representation.</a:t>
+            </a:r>
+            <a:endParaRPr lang="pl-PL" dirty="0" smtClean="0"/>
+          </a:p>
+          <a:p>
+            <a:pPr marL="0" indent="0">
+              <a:buNone/>
+            </a:pPr>
+            <a:endParaRPr lang="pl-PL" dirty="0" smtClean="0"/>
+          </a:p>
+        </p:txBody>
+      </p:sp>
+      <p:pic>
+        <p:nvPicPr>
+          <p:cNvPr id="5" name="Obraz 4"/>
+          <p:cNvPicPr>
+            <a:picLocks noChangeAspect="1"/>
+          </p:cNvPicPr>
+          <p:nvPr/>
+        </p:nvPicPr>
+        <p:blipFill>
+          <a:blip r:embed="rId2">
+            <a:extLst>
+              <a:ext uri="{28A0092B-C50C-407E-A947-70E740481C1C}">
+                <a14:useLocalDpi xmlns:a14="http://schemas.microsoft.com/office/drawing/2010/main" val="0"/>
+              </a:ext>
+            </a:extLst>
+          </a:blip>
+          <a:stretch>
+            <a:fillRect/>
+          </a:stretch>
+        </p:blipFill>
+        <p:spPr>
+          <a:xfrm>
+            <a:off x="2339752" y="2852935"/>
+            <a:ext cx="5760640" cy="3809223"/>
+          </a:xfrm>
+          <a:prstGeom prst="rect">
+            <a:avLst/>
+          </a:prstGeom>
+        </p:spPr>
+      </p:pic>
     </p:spTree>
     <p:extLst>
       <p:ext uri="{BB962C8B-B14F-4D97-AF65-F5344CB8AC3E}">
@@ -4986,6 +5435,21 @@
   <p:clrMapOvr>
     <a:masterClrMapping/>
   </p:clrMapOvr>
+  <mc:AlternateContent xmlns:mc="http://schemas.openxmlformats.org/markup-compatibility/2006">
+    <mc:Choice xmlns:p14="http://schemas.microsoft.com/office/powerpoint/2010/main" Requires="p14">
+      <p:transition spd="slow" p14:dur="2000"/>
+    </mc:Choice>
+    <mc:Fallback>
+      <p:transition spd="slow"/>
+    </mc:Fallback>
+  </mc:AlternateContent>
+  <p:timing>
+    <p:tnLst>
+      <p:par>
+        <p:cTn id="1" dur="indefinite" restart="never" nodeType="tmRoot"/>
+      </p:par>
+    </p:tnLst>
+  </p:timing>
 </p:sld>
 </file>
 
@@ -5072,7 +5536,39 @@
           <a:bodyPr/>
           <a:lstStyle/>
           <a:p>
-            <a:endParaRPr lang="pl-PL"/>
+            <a:r>
+              <a:rPr lang="en-US" dirty="0" smtClean="0"/>
+              <a:t>How we test that object positioning works well ?</a:t>
+            </a:r>
+          </a:p>
+          <a:p>
+            <a:r>
+              <a:rPr lang="en-US" dirty="0" smtClean="0"/>
+              <a:t>How different researchers test theirs algorithm</a:t>
+            </a:r>
+            <a:r>
+              <a:rPr lang="pl-PL" dirty="0" smtClean="0"/>
+              <a:t>s</a:t>
+            </a:r>
+            <a:r>
+              <a:rPr lang="en-US" dirty="0" smtClean="0"/>
+              <a:t>?</a:t>
+            </a:r>
+            <a:endParaRPr lang="pl-PL" dirty="0" smtClean="0"/>
+          </a:p>
+          <a:p>
+            <a:r>
+              <a:rPr lang="en-US" dirty="0" smtClean="0"/>
+              <a:t>Is there a universal way to test objects in constant conditions ?</a:t>
+            </a:r>
+            <a:endParaRPr lang="pl-PL" dirty="0" smtClean="0"/>
+          </a:p>
+          <a:p>
+            <a:r>
+              <a:rPr lang="en-US" dirty="0" smtClean="0"/>
+              <a:t>How to find advantageous conditions for your image recognition algorithm ?</a:t>
+            </a:r>
+            <a:endParaRPr lang="en-US" dirty="0"/>
           </a:p>
         </p:txBody>
       </p:sp>
@@ -5086,6 +5582,21 @@
   <p:clrMapOvr>
     <a:masterClrMapping/>
   </p:clrMapOvr>
+  <mc:AlternateContent xmlns:mc="http://schemas.openxmlformats.org/markup-compatibility/2006">
+    <mc:Choice xmlns:p14="http://schemas.microsoft.com/office/powerpoint/2010/main" Requires="p14">
+      <p:transition spd="slow" p14:dur="2000"/>
+    </mc:Choice>
+    <mc:Fallback>
+      <p:transition spd="slow"/>
+    </mc:Fallback>
+  </mc:AlternateContent>
+  <p:timing>
+    <p:tnLst>
+      <p:par>
+        <p:cTn id="1" dur="indefinite" restart="never" nodeType="tmRoot"/>
+      </p:par>
+    </p:tnLst>
+  </p:timing>
 </p:sld>
 </file>
 
@@ -5152,7 +5663,39 @@
           <a:bodyPr/>
           <a:lstStyle/>
           <a:p>
-            <a:endParaRPr lang="pl-PL"/>
+            <a:r>
+              <a:rPr lang="pl-PL" dirty="0" smtClean="0"/>
+              <a:t>TODO: </a:t>
+            </a:r>
+            <a:r>
+              <a:rPr lang="pl-PL" dirty="0" err="1" smtClean="0"/>
+              <a:t>put</a:t>
+            </a:r>
+            <a:r>
+              <a:rPr lang="pl-PL" dirty="0" smtClean="0"/>
+              <a:t> smart </a:t>
+            </a:r>
+            <a:r>
+              <a:rPr lang="pl-PL" dirty="0" err="1" smtClean="0"/>
+              <a:t>ass</a:t>
+            </a:r>
+            <a:r>
+              <a:rPr lang="pl-PL" dirty="0" smtClean="0"/>
+              <a:t> </a:t>
+            </a:r>
+            <a:r>
+              <a:rPr lang="pl-PL" dirty="0" err="1" smtClean="0"/>
+              <a:t>smat</a:t>
+            </a:r>
+            <a:r>
+              <a:rPr lang="pl-PL" dirty="0" smtClean="0"/>
+              <a:t> art </a:t>
+            </a:r>
+            <a:r>
+              <a:rPr lang="pl-PL" dirty="0" err="1" smtClean="0"/>
+              <a:t>here</a:t>
+            </a:r>
+            <a:endParaRPr lang="pl-PL" dirty="0"/>
           </a:p>
         </p:txBody>
       </p:sp>
@@ -5166,6 +5709,21 @@
   <p:clrMapOvr>
     <a:masterClrMapping/>
   </p:clrMapOvr>
+  <mc:AlternateContent xmlns:mc="http://schemas.openxmlformats.org/markup-compatibility/2006">
+    <mc:Choice xmlns:p14="http://schemas.microsoft.com/office/powerpoint/2010/main" Requires="p14">
+      <p:transition spd="slow" p14:dur="2000"/>
+    </mc:Choice>
+    <mc:Fallback>
+      <p:transition spd="slow"/>
+    </mc:Fallback>
+  </mc:AlternateContent>
+  <p:timing>
+    <p:tnLst>
+      <p:par>
+        <p:cTn id="1" dur="indefinite" restart="never" nodeType="tmRoot"/>
+      </p:par>
+    </p:tnLst>
+  </p:timing>
 </p:sld>
 </file>
 
@@ -5223,12 +5781,98 @@
             <p:ph idx="1"/>
           </p:nvPr>
         </p:nvSpPr>
-        <p:spPr/>
+        <p:spPr>
+          <a:xfrm>
+            <a:off x="2438400" y="2286000"/>
+            <a:ext cx="6248400" cy="4383360"/>
+          </a:xfrm>
+        </p:spPr>
         <p:txBody>
           <a:bodyPr/>
           <a:lstStyle/>
           <a:p>
-            <a:endParaRPr lang="pl-PL"/>
+            <a:pPr marL="0" indent="0">
+              <a:buNone/>
+            </a:pPr>
+            <a:r>
+              <a:rPr lang="en-US" dirty="0" smtClean="0"/>
+              <a:t>Used technology</a:t>
+            </a:r>
+          </a:p>
+          <a:p>
+            <a:r>
+              <a:rPr lang="pl-PL" dirty="0" smtClean="0"/>
+              <a:t>C</a:t>
+            </a:r>
+            <a:r>
+              <a:rPr lang="en-US" dirty="0" smtClean="0"/>
+              <a:t>Python 2.7</a:t>
+            </a:r>
+            <a:endParaRPr lang="pl-PL" dirty="0" smtClean="0"/>
+          </a:p>
+          <a:p>
+            <a:r>
+              <a:rPr lang="en-US" dirty="0" err="1" smtClean="0"/>
+              <a:t>OpenCV</a:t>
+            </a:r>
+            <a:r>
+              <a:rPr lang="en-US" dirty="0" smtClean="0"/>
+              <a:t> 2.2 </a:t>
+            </a:r>
+            <a:r>
+              <a:rPr lang="en-US" i="1" dirty="0" smtClean="0"/>
+              <a:t>nightly build</a:t>
+            </a:r>
+            <a:endParaRPr lang="en-US" dirty="0" smtClean="0"/>
+          </a:p>
+          <a:p>
+            <a:r>
+              <a:rPr lang="en-US" dirty="0" smtClean="0"/>
+              <a:t>Blender 2.57b </a:t>
+            </a:r>
+            <a:r>
+              <a:rPr lang="pl-PL" dirty="0" smtClean="0"/>
+              <a:t>OMP</a:t>
+            </a:r>
+          </a:p>
+          <a:p>
+            <a:r>
+              <a:rPr lang="en-US" dirty="0" smtClean="0"/>
+              <a:t>Lot of python stuff:</a:t>
+            </a:r>
+            <a:endParaRPr lang="pl-PL" dirty="0" smtClean="0"/>
+          </a:p>
+          <a:p>
+            <a:pPr lvl="1"/>
+            <a:r>
+              <a:rPr lang="en-US" dirty="0" smtClean="0"/>
+              <a:t> </a:t>
+            </a:r>
+            <a:r>
+              <a:rPr lang="pl-PL" dirty="0" smtClean="0"/>
+              <a:t>M</a:t>
+            </a:r>
+            <a:r>
+              <a:rPr lang="en-US" dirty="0" err="1" smtClean="0"/>
+              <a:t>ockito</a:t>
+            </a:r>
+            <a:endParaRPr lang="pl-PL" dirty="0" smtClean="0"/>
+          </a:p>
+          <a:p>
+            <a:pPr lvl="1"/>
+            <a:r>
+              <a:rPr lang="en-US" dirty="0" err="1" smtClean="0"/>
+              <a:t>Unittest</a:t>
+            </a:r>
+            <a:endParaRPr lang="pl-PL" dirty="0"/>
+          </a:p>
+          <a:p>
+            <a:pPr lvl="1"/>
+            <a:r>
+              <a:rPr lang="pl-PL" dirty="0" smtClean="0"/>
+              <a:t>… </a:t>
+            </a:r>
+            <a:endParaRPr lang="en-US" dirty="0"/>
           </a:p>
         </p:txBody>
       </p:sp>
@@ -5242,6 +5886,21 @@
   <p:clrMapOvr>
     <a:masterClrMapping/>
   </p:clrMapOvr>
+  <mc:AlternateContent xmlns:mc="http://schemas.openxmlformats.org/markup-compatibility/2006">
+    <mc:Choice xmlns:p14="http://schemas.microsoft.com/office/powerpoint/2010/main" Requires="p14">
+      <p:transition spd="slow" p14:dur="2000"/>
+    </mc:Choice>
+    <mc:Fallback>
+      <p:transition spd="slow"/>
+    </mc:Fallback>
+  </mc:AlternateContent>
+  <p:timing>
+    <p:tnLst>
+      <p:par>
+        <p:cTn id="1" dur="indefinite" restart="never" nodeType="tmRoot"/>
+      </p:par>
+    </p:tnLst>
+  </p:timing>
 </p:sld>
 </file>
 
@@ -5297,10 +5956,211 @@
         </p:nvSpPr>
         <p:spPr/>
         <p:txBody>
-          <a:bodyPr/>
+          <a:bodyPr>
+            <a:noAutofit/>
+          </a:bodyPr>
           <a:lstStyle/>
           <a:p>
-            <a:endParaRPr lang="pl-PL"/>
+            <a:pPr marL="0" indent="0">
+              <a:spcBef>
+                <a:spcPts val="1200"/>
+              </a:spcBef>
+              <a:buNone/>
+            </a:pPr>
+            <a:r>
+              <a:rPr lang="pl-PL" sz="1400" b="1" dirty="0">
+                <a:solidFill>
+                  <a:schemeClr val="accent6"/>
+                </a:solidFill>
+              </a:rPr>
+              <a:t>[</a:t>
+            </a:r>
+            <a:r>
+              <a:rPr lang="pl-PL" sz="1400" b="1" dirty="0" err="1">
+                <a:solidFill>
+                  <a:schemeClr val="accent6"/>
+                </a:solidFill>
+              </a:rPr>
+              <a:t>PolarCoordinates</a:t>
+            </a:r>
+            <a:r>
+              <a:rPr lang="pl-PL" sz="1400" b="1" dirty="0">
+                <a:solidFill>
+                  <a:schemeClr val="accent6"/>
+                </a:solidFill>
+              </a:rPr>
+              <a:t>]</a:t>
+            </a:r>
+          </a:p>
+          <a:p>
+            <a:pPr marL="0" indent="0">
+              <a:spcBef>
+                <a:spcPts val="1200"/>
+              </a:spcBef>
+              <a:buNone/>
+            </a:pPr>
+            <a:r>
+              <a:rPr lang="pl-PL" sz="1400" dirty="0" err="1"/>
+              <a:t>AlfaStart</a:t>
+            </a:r>
+            <a:r>
+              <a:rPr lang="pl-PL" sz="1400" dirty="0"/>
+              <a:t>: 20</a:t>
+            </a:r>
+          </a:p>
+          <a:p>
+            <a:pPr marL="0" indent="0">
+              <a:spcBef>
+                <a:spcPts val="1200"/>
+              </a:spcBef>
+              <a:buNone/>
+            </a:pPr>
+            <a:r>
+              <a:rPr lang="pl-PL" sz="1400" dirty="0" err="1"/>
+              <a:t>AlfaStop</a:t>
+            </a:r>
+            <a:r>
+              <a:rPr lang="pl-PL" sz="1400" dirty="0"/>
+              <a:t>: 50</a:t>
+            </a:r>
+          </a:p>
+          <a:p>
+            <a:pPr marL="0" indent="0">
+              <a:spcBef>
+                <a:spcPts val="1200"/>
+              </a:spcBef>
+              <a:buNone/>
+            </a:pPr>
+            <a:r>
+              <a:rPr lang="pl-PL" sz="1400" dirty="0" err="1"/>
+              <a:t>BetaStart</a:t>
+            </a:r>
+            <a:r>
+              <a:rPr lang="pl-PL" sz="1400" dirty="0"/>
+              <a:t>: 100</a:t>
+            </a:r>
+          </a:p>
+          <a:p>
+            <a:pPr marL="0" indent="0">
+              <a:spcBef>
+                <a:spcPts val="1200"/>
+              </a:spcBef>
+              <a:buNone/>
+            </a:pPr>
+            <a:r>
+              <a:rPr lang="pl-PL" sz="1400" dirty="0" err="1"/>
+              <a:t>BetaStop</a:t>
+            </a:r>
+            <a:r>
+              <a:rPr lang="pl-PL" sz="1400" dirty="0"/>
+              <a:t>: 150</a:t>
+            </a:r>
+          </a:p>
+          <a:p>
+            <a:pPr marL="0" indent="0">
+              <a:spcBef>
+                <a:spcPts val="1200"/>
+              </a:spcBef>
+              <a:buNone/>
+            </a:pPr>
+            <a:r>
+              <a:rPr lang="pl-PL" sz="1400" dirty="0" err="1"/>
+              <a:t>RadiusStart</a:t>
+            </a:r>
+            <a:r>
+              <a:rPr lang="pl-PL" sz="1400" dirty="0"/>
+              <a:t>: 10</a:t>
+            </a:r>
+          </a:p>
+          <a:p>
+            <a:pPr marL="0" indent="0">
+              <a:spcBef>
+                <a:spcPts val="1200"/>
+              </a:spcBef>
+              <a:buNone/>
+            </a:pPr>
+            <a:r>
+              <a:rPr lang="pl-PL" sz="1400" dirty="0" err="1"/>
+              <a:t>RadiusStop</a:t>
+            </a:r>
+            <a:r>
+              <a:rPr lang="pl-PL" sz="1400" dirty="0"/>
+              <a:t>: 10</a:t>
+            </a:r>
+          </a:p>
+          <a:p>
+            <a:pPr marL="0" indent="0">
+              <a:spcBef>
+                <a:spcPts val="1200"/>
+              </a:spcBef>
+              <a:buNone/>
+            </a:pPr>
+            <a:r>
+              <a:rPr lang="pl-PL" sz="1400" b="1" dirty="0">
+                <a:solidFill>
+                  <a:schemeClr val="accent6"/>
+                </a:solidFill>
+              </a:rPr>
+              <a:t>[File]</a:t>
+            </a:r>
+          </a:p>
+          <a:p>
+            <a:pPr marL="0" indent="0">
+              <a:spcBef>
+                <a:spcPts val="1200"/>
+              </a:spcBef>
+              <a:buNone/>
+            </a:pPr>
+            <a:r>
+              <a:rPr lang="pl-PL" sz="1400" dirty="0" err="1"/>
+              <a:t>InputFileName</a:t>
+            </a:r>
+            <a:r>
+              <a:rPr lang="pl-PL" sz="1400" dirty="0"/>
+              <a:t> : </a:t>
+            </a:r>
+            <a:r>
+              <a:rPr lang="pl-PL" sz="1400" dirty="0" err="1"/>
+              <a:t>myFileName</a:t>
+            </a:r>
+            <a:endParaRPr lang="pl-PL" sz="1400" dirty="0"/>
+          </a:p>
+          <a:p>
+            <a:pPr marL="0" indent="0">
+              <a:spcBef>
+                <a:spcPts val="1200"/>
+              </a:spcBef>
+              <a:buNone/>
+            </a:pPr>
+            <a:r>
+              <a:rPr lang="pl-PL" sz="1400" dirty="0" err="1"/>
+              <a:t>InputFormat</a:t>
+            </a:r>
+            <a:r>
+              <a:rPr lang="pl-PL" sz="1400" dirty="0"/>
+              <a:t> : .</a:t>
+            </a:r>
+            <a:r>
+              <a:rPr lang="pl-PL" sz="1400" dirty="0" err="1"/>
+              <a:t>collada</a:t>
+            </a:r>
+            <a:endParaRPr lang="pl-PL" sz="1400" dirty="0"/>
+          </a:p>
+          <a:p>
+            <a:pPr marL="0" indent="0">
+              <a:spcBef>
+                <a:spcPts val="1200"/>
+              </a:spcBef>
+              <a:buNone/>
+            </a:pPr>
+            <a:r>
+              <a:rPr lang="pl-PL" sz="1400" dirty="0" err="1"/>
+              <a:t>OutputFormat</a:t>
+            </a:r>
+            <a:r>
+              <a:rPr lang="pl-PL" sz="1400" dirty="0"/>
+              <a:t>: .jpg</a:t>
+            </a:r>
           </a:p>
         </p:txBody>
       </p:sp>
@@ -5314,6 +6174,21 @@
   <p:clrMapOvr>
     <a:masterClrMapping/>
   </p:clrMapOvr>
+  <mc:AlternateContent xmlns:mc="http://schemas.openxmlformats.org/markup-compatibility/2006">
+    <mc:Choice xmlns:p14="http://schemas.microsoft.com/office/powerpoint/2010/main" Requires="p14">
+      <p:transition spd="slow" p14:dur="2000"/>
+    </mc:Choice>
+    <mc:Fallback>
+      <p:transition spd="slow"/>
+    </mc:Fallback>
+  </mc:AlternateContent>
+  <p:timing>
+    <p:tnLst>
+      <p:par>
+        <p:cTn id="1" dur="indefinite" restart="never" nodeType="tmRoot"/>
+      </p:par>
+    </p:tnLst>
+  </p:timing>
 </p:sld>
 </file>
 
@@ -5355,31 +6230,53 @@
             </a:r>
             <a:r>
               <a:rPr lang="pl-PL" dirty="0" smtClean="0"/>
-              <a:t> File</a:t>
+              <a:t> File – x3d</a:t>
             </a:r>
             <a:endParaRPr lang="pl-PL" dirty="0"/>
           </a:p>
         </p:txBody>
       </p:sp>
-      <p:sp>
-        <p:nvSpPr>
-          <p:cNvPr id="3" name="Symbol zastępczy zawartości 2"/>
-          <p:cNvSpPr>
-            <a:spLocks noGrp="1"/>
-          </p:cNvSpPr>
-          <p:nvPr>
-            <p:ph idx="1"/>
-          </p:nvPr>
-        </p:nvSpPr>
-        <p:spPr/>
-        <p:txBody>
-          <a:bodyPr/>
-          <a:lstStyle/>
-          <a:p>
-            <a:endParaRPr lang="pl-PL"/>
-          </a:p>
-        </p:txBody>
-      </p:sp>
+      <p:pic>
+        <p:nvPicPr>
+          <p:cNvPr id="4" name="Symbol zastępczy zawartości 3"/>
+          <p:cNvPicPr>
+            <a:picLocks noGrp="1" noChangeAspect="1"/>
+          </p:cNvPicPr>
+          <p:nvPr>
+            <p:ph idx="4294967295"/>
+          </p:nvPr>
+        </p:nvPicPr>
+        <p:blipFill rotWithShape="1">
+          <a:blip r:embed="rId2">
+            <a:extLst>
+              <a:ext uri="{28A0092B-C50C-407E-A947-70E740481C1C}">
+                <a14:useLocalDpi xmlns:a14="http://schemas.microsoft.com/office/drawing/2010/main" val="0"/>
+              </a:ext>
+            </a:extLst>
+          </a:blip>
+          <a:srcRect l="517" r="28238"/>
+          <a:stretch/>
+        </p:blipFill>
+        <p:spPr>
+          <a:xfrm>
+            <a:off x="238539" y="2420888"/>
+            <a:ext cx="8110332" cy="3456384"/>
+          </a:xfrm>
+          <a:prstGeom prst="rect">
+            <a:avLst/>
+          </a:prstGeom>
+          <a:ln>
+            <a:noFill/>
+          </a:ln>
+          <a:effectLst>
+            <a:outerShdw blurRad="292100" dist="139700" dir="2700000" algn="tl" rotWithShape="0">
+              <a:srgbClr val="333333">
+                <a:alpha val="65000"/>
+              </a:srgbClr>
+            </a:outerShdw>
+          </a:effectLst>
+        </p:spPr>
+      </p:pic>
     </p:spTree>
     <p:extLst>
       <p:ext uri="{BB962C8B-B14F-4D97-AF65-F5344CB8AC3E}">
@@ -5390,6 +6287,21 @@
   <p:clrMapOvr>
     <a:masterClrMapping/>
   </p:clrMapOvr>
+  <mc:AlternateContent xmlns:mc="http://schemas.openxmlformats.org/markup-compatibility/2006">
+    <mc:Choice xmlns:p14="http://schemas.microsoft.com/office/powerpoint/2010/main" Requires="p14">
+      <p:transition spd="slow" p14:dur="2000"/>
+    </mc:Choice>
+    <mc:Fallback>
+      <p:transition spd="slow"/>
+    </mc:Fallback>
+  </mc:AlternateContent>
+  <p:timing>
+    <p:tnLst>
+      <p:par>
+        <p:cTn id="1" dur="indefinite" restart="never" nodeType="tmRoot"/>
+      </p:par>
+    </p:tnLst>
+  </p:timing>
 </p:sld>
 </file>
 
@@ -5426,50 +6338,117 @@
           <a:lstStyle/>
           <a:p>
             <a:r>
-              <a:rPr lang="pl-PL" dirty="0" err="1" smtClean="0"/>
-              <a:t>Alfirt</a:t>
+              <a:rPr lang="pl-PL" dirty="0" err="1"/>
+              <a:t>Scene</a:t>
+            </a:r>
+            <a:r>
+              <a:rPr lang="pl-PL" dirty="0"/>
+              <a:t> File – </a:t>
             </a:r>
             <a:r>
               <a:rPr lang="pl-PL" dirty="0" smtClean="0"/>
-              <a:t> </a:t>
-            </a:r>
-            <a:r>
-              <a:rPr lang="pl-PL" dirty="0" err="1" smtClean="0"/>
-              <a:t>TAGs</a:t>
+              <a:t>COLLADA</a:t>
             </a:r>
             <a:endParaRPr lang="pl-PL" dirty="0"/>
           </a:p>
         </p:txBody>
       </p:sp>
-      <p:sp>
-        <p:nvSpPr>
-          <p:cNvPr id="3" name="Symbol zastępczy zawartości 2"/>
-          <p:cNvSpPr>
-            <a:spLocks noGrp="1"/>
-          </p:cNvSpPr>
-          <p:nvPr>
-            <p:ph idx="1"/>
-          </p:nvPr>
-        </p:nvSpPr>
-        <p:spPr/>
-        <p:txBody>
-          <a:bodyPr/>
-          <a:lstStyle/>
-          <a:p>
-            <a:endParaRPr lang="pl-PL"/>
-          </a:p>
-        </p:txBody>
-      </p:sp>
+      <p:pic>
+        <p:nvPicPr>
+          <p:cNvPr id="3" name="Obraz 2"/>
+          <p:cNvPicPr>
+            <a:picLocks noChangeAspect="1"/>
+          </p:cNvPicPr>
+          <p:nvPr/>
+        </p:nvPicPr>
+        <p:blipFill rotWithShape="1">
+          <a:blip r:embed="rId2">
+            <a:extLst>
+              <a:ext uri="{28A0092B-C50C-407E-A947-70E740481C1C}">
+                <a14:useLocalDpi xmlns:a14="http://schemas.microsoft.com/office/drawing/2010/main" val="0"/>
+              </a:ext>
+            </a:extLst>
+          </a:blip>
+          <a:srcRect l="446"/>
+          <a:stretch/>
+        </p:blipFill>
+        <p:spPr>
+          <a:xfrm>
+            <a:off x="285750" y="1844824"/>
+            <a:ext cx="7643992" cy="552527"/>
+          </a:xfrm>
+          <a:prstGeom prst="rect">
+            <a:avLst/>
+          </a:prstGeom>
+          <a:ln>
+            <a:noFill/>
+          </a:ln>
+          <a:effectLst>
+            <a:outerShdw blurRad="292100" dist="139700" dir="2700000" algn="tl" rotWithShape="0">
+              <a:srgbClr val="333333">
+                <a:alpha val="65000"/>
+              </a:srgbClr>
+            </a:outerShdw>
+          </a:effectLst>
+        </p:spPr>
+      </p:pic>
+      <p:pic>
+        <p:nvPicPr>
+          <p:cNvPr id="4" name="Obraz 3"/>
+          <p:cNvPicPr>
+            <a:picLocks noChangeAspect="1"/>
+          </p:cNvPicPr>
+          <p:nvPr/>
+        </p:nvPicPr>
+        <p:blipFill>
+          <a:blip r:embed="rId3">
+            <a:extLst>
+              <a:ext uri="{28A0092B-C50C-407E-A947-70E740481C1C}">
+                <a14:useLocalDpi xmlns:a14="http://schemas.microsoft.com/office/drawing/2010/main" val="0"/>
+              </a:ext>
+            </a:extLst>
+          </a:blip>
+          <a:stretch>
+            <a:fillRect/>
+          </a:stretch>
+        </p:blipFill>
+        <p:spPr>
+          <a:xfrm>
+            <a:off x="285750" y="2564904"/>
+            <a:ext cx="8246690" cy="3856366"/>
+          </a:xfrm>
+          <a:prstGeom prst="rect">
+            <a:avLst/>
+          </a:prstGeom>
+          <a:ln>
+            <a:noFill/>
+          </a:ln>
+          <a:effectLst>
+            <a:outerShdw blurRad="292100" dist="139700" dir="2700000" algn="tl" rotWithShape="0">
+              <a:srgbClr val="333333">
+                <a:alpha val="65000"/>
+              </a:srgbClr>
+            </a:outerShdw>
+          </a:effectLst>
+        </p:spPr>
+      </p:pic>
     </p:spTree>
     <p:extLst>
       <p:ext uri="{BB962C8B-B14F-4D97-AF65-F5344CB8AC3E}">
-        <p14:creationId xmlns:p14="http://schemas.microsoft.com/office/powerpoint/2010/main" val="591684312"/>
+        <p14:creationId xmlns:p14="http://schemas.microsoft.com/office/powerpoint/2010/main" val="2516097853"/>
       </p:ext>
     </p:extLst>
   </p:cSld>
   <p:clrMapOvr>
     <a:masterClrMapping/>
   </p:clrMapOvr>
+  <p:timing>
+    <p:tnLst>
+      <p:par>
+        <p:cTn id="1" dur="indefinite" restart="never" nodeType="tmRoot"/>
+      </p:par>
+    </p:tnLst>
+  </p:timing>
 </p:sld>
 </file>
 
@@ -5502,16 +6481,22 @@
         </p:nvSpPr>
         <p:spPr/>
         <p:txBody>
-          <a:bodyPr>
-            <a:normAutofit fontScale="90000"/>
-          </a:bodyPr>
+          <a:bodyPr/>
           <a:lstStyle/>
           <a:p>
             <a:r>
-              <a:rPr lang="en-US" dirty="0" smtClean="0"/>
-              <a:t>6 DOF pose representation</a:t>
-            </a:r>
-            <a:endParaRPr lang="en-US" dirty="0"/>
+              <a:rPr lang="pl-PL" dirty="0" err="1" smtClean="0"/>
+              <a:t>Alfirt</a:t>
+            </a:r>
+            <a:r>
+              <a:rPr lang="pl-PL" dirty="0" smtClean="0"/>
+              <a:t> </a:t>
+            </a:r>
+            <a:r>
+              <a:rPr lang="pl-PL" dirty="0" err="1" smtClean="0"/>
+              <a:t>TAGs</a:t>
+            </a:r>
+            <a:endParaRPr lang="pl-PL" dirty="0"/>
           </a:p>
         </p:txBody>
       </p:sp>
@@ -5537,13 +6522,28 @@
     </p:spTree>
     <p:extLst>
       <p:ext uri="{BB962C8B-B14F-4D97-AF65-F5344CB8AC3E}">
-        <p14:creationId xmlns:p14="http://schemas.microsoft.com/office/powerpoint/2010/main" val="859662691"/>
+        <p14:creationId xmlns:p14="http://schemas.microsoft.com/office/powerpoint/2010/main" val="591684312"/>
       </p:ext>
     </p:extLst>
   </p:cSld>
   <p:clrMapOvr>
     <a:masterClrMapping/>
   </p:clrMapOvr>
+  <mc:AlternateContent xmlns:mc="http://schemas.openxmlformats.org/markup-compatibility/2006">
+    <mc:Choice xmlns:p14="http://schemas.microsoft.com/office/powerpoint/2010/main" Requires="p14">
+      <p:transition spd="slow" p14:dur="2000"/>
+    </mc:Choice>
+    <mc:Fallback>
+      <p:transition spd="slow"/>
+    </mc:Fallback>
+  </mc:AlternateContent>
+  <p:timing>
+    <p:tnLst>
+      <p:par>
+        <p:cTn id="1" dur="indefinite" restart="never" nodeType="tmRoot"/>
+      </p:par>
+    </p:tnLst>
+  </p:timing>
 </p:sld>
 </file>
 

</xml_diff>

<commit_message>
State of implementation slide finished
</commit_message>
<xml_diff>
--- a/documentation/presentation/general_overview.pptx
+++ b/documentation/presentation/general_overview.pptx
@@ -7227,7 +7227,50 @@
           <a:bodyPr/>
           <a:lstStyle/>
           <a:p>
-            <a:endParaRPr lang="pl-PL"/>
+            <a:pPr marL="0" indent="0">
+              <a:buNone/>
+            </a:pPr>
+            <a:r>
+              <a:rPr lang="pl-PL" dirty="0" smtClean="0"/>
+              <a:t>TODO: </a:t>
+            </a:r>
+            <a:r>
+              <a:rPr lang="pl-PL" dirty="0" err="1" smtClean="0"/>
+              <a:t>add</a:t>
+            </a:r>
+            <a:r>
+              <a:rPr lang="pl-PL" dirty="0" smtClean="0"/>
+              <a:t> the idea </a:t>
+            </a:r>
+            <a:r>
+              <a:rPr lang="pl-PL" dirty="0" err="1" smtClean="0"/>
+              <a:t>behind</a:t>
+            </a:r>
+            <a:r>
+              <a:rPr lang="pl-PL" dirty="0" smtClean="0"/>
+              <a:t> the </a:t>
+            </a:r>
+            <a:r>
+              <a:rPr lang="pl-PL" dirty="0" err="1" smtClean="0"/>
+              <a:t>alfirt</a:t>
+            </a:r>
+            <a:r>
+              <a:rPr lang="pl-PL" dirty="0" smtClean="0"/>
+              <a:t> </a:t>
+            </a:r>
+            <a:r>
+              <a:rPr lang="pl-PL" dirty="0" err="1" smtClean="0"/>
+              <a:t>namespace</a:t>
+            </a:r>
+            <a:r>
+              <a:rPr lang="pl-PL" dirty="0" smtClean="0"/>
+              <a:t> and </a:t>
+            </a:r>
+            <a:r>
+              <a:rPr lang="pl-PL" dirty="0" err="1" smtClean="0"/>
+              <a:t>tags</a:t>
+            </a:r>
+            <a:endParaRPr lang="pl-PL" dirty="0"/>
           </a:p>
         </p:txBody>
       </p:sp>
@@ -7533,30 +7576,2999 @@
       </p:sp>
       <p:sp>
         <p:nvSpPr>
-          <p:cNvPr id="3" name="Symbol zastępczy zawartości 2"/>
-          <p:cNvSpPr>
-            <a:spLocks noGrp="1"/>
-          </p:cNvSpPr>
-          <p:nvPr>
-            <p:ph idx="1"/>
-          </p:nvPr>
+          <p:cNvPr id="5" name="Prostokąt 3"/>
+          <p:cNvSpPr/>
+          <p:nvPr/>
         </p:nvSpPr>
-        <p:spPr/>
+        <p:spPr>
+          <a:xfrm>
+            <a:off x="467544" y="1844824"/>
+            <a:ext cx="792088" cy="1080120"/>
+          </a:xfrm>
+          <a:custGeom>
+            <a:avLst/>
+            <a:gdLst>
+              <a:gd name="connsiteX0" fmla="*/ 0 w 576064"/>
+              <a:gd name="connsiteY0" fmla="*/ 0 h 864096"/>
+              <a:gd name="connsiteX1" fmla="*/ 576064 w 576064"/>
+              <a:gd name="connsiteY1" fmla="*/ 0 h 864096"/>
+              <a:gd name="connsiteX2" fmla="*/ 576064 w 576064"/>
+              <a:gd name="connsiteY2" fmla="*/ 864096 h 864096"/>
+              <a:gd name="connsiteX3" fmla="*/ 0 w 576064"/>
+              <a:gd name="connsiteY3" fmla="*/ 864096 h 864096"/>
+              <a:gd name="connsiteX4" fmla="*/ 0 w 576064"/>
+              <a:gd name="connsiteY4" fmla="*/ 0 h 864096"/>
+              <a:gd name="connsiteX0" fmla="*/ 432 w 576496"/>
+              <a:gd name="connsiteY0" fmla="*/ 0 h 864096"/>
+              <a:gd name="connsiteX1" fmla="*/ 576496 w 576496"/>
+              <a:gd name="connsiteY1" fmla="*/ 0 h 864096"/>
+              <a:gd name="connsiteX2" fmla="*/ 576496 w 576496"/>
+              <a:gd name="connsiteY2" fmla="*/ 864096 h 864096"/>
+              <a:gd name="connsiteX3" fmla="*/ 432 w 576496"/>
+              <a:gd name="connsiteY3" fmla="*/ 864096 h 864096"/>
+              <a:gd name="connsiteX4" fmla="*/ 0 w 576496"/>
+              <a:gd name="connsiteY4" fmla="*/ 355456 h 864096"/>
+              <a:gd name="connsiteX5" fmla="*/ 432 w 576496"/>
+              <a:gd name="connsiteY5" fmla="*/ 0 h 864096"/>
+              <a:gd name="connsiteX0" fmla="*/ 432 w 576496"/>
+              <a:gd name="connsiteY0" fmla="*/ 10304 h 874400"/>
+              <a:gd name="connsiteX1" fmla="*/ 243840 w 576496"/>
+              <a:gd name="connsiteY1" fmla="*/ 0 h 874400"/>
+              <a:gd name="connsiteX2" fmla="*/ 576496 w 576496"/>
+              <a:gd name="connsiteY2" fmla="*/ 10304 h 874400"/>
+              <a:gd name="connsiteX3" fmla="*/ 576496 w 576496"/>
+              <a:gd name="connsiteY3" fmla="*/ 874400 h 874400"/>
+              <a:gd name="connsiteX4" fmla="*/ 432 w 576496"/>
+              <a:gd name="connsiteY4" fmla="*/ 874400 h 874400"/>
+              <a:gd name="connsiteX5" fmla="*/ 0 w 576496"/>
+              <a:gd name="connsiteY5" fmla="*/ 365760 h 874400"/>
+              <a:gd name="connsiteX6" fmla="*/ 432 w 576496"/>
+              <a:gd name="connsiteY6" fmla="*/ 10304 h 874400"/>
+              <a:gd name="connsiteX0" fmla="*/ 0 w 576496"/>
+              <a:gd name="connsiteY0" fmla="*/ 365760 h 874400"/>
+              <a:gd name="connsiteX1" fmla="*/ 243840 w 576496"/>
+              <a:gd name="connsiteY1" fmla="*/ 0 h 874400"/>
+              <a:gd name="connsiteX2" fmla="*/ 576496 w 576496"/>
+              <a:gd name="connsiteY2" fmla="*/ 10304 h 874400"/>
+              <a:gd name="connsiteX3" fmla="*/ 576496 w 576496"/>
+              <a:gd name="connsiteY3" fmla="*/ 874400 h 874400"/>
+              <a:gd name="connsiteX4" fmla="*/ 432 w 576496"/>
+              <a:gd name="connsiteY4" fmla="*/ 874400 h 874400"/>
+              <a:gd name="connsiteX5" fmla="*/ 0 w 576496"/>
+              <a:gd name="connsiteY5" fmla="*/ 365760 h 874400"/>
+              <a:gd name="connsiteX0" fmla="*/ 0 w 576496"/>
+              <a:gd name="connsiteY0" fmla="*/ 213360 h 874400"/>
+              <a:gd name="connsiteX1" fmla="*/ 243840 w 576496"/>
+              <a:gd name="connsiteY1" fmla="*/ 0 h 874400"/>
+              <a:gd name="connsiteX2" fmla="*/ 576496 w 576496"/>
+              <a:gd name="connsiteY2" fmla="*/ 10304 h 874400"/>
+              <a:gd name="connsiteX3" fmla="*/ 576496 w 576496"/>
+              <a:gd name="connsiteY3" fmla="*/ 874400 h 874400"/>
+              <a:gd name="connsiteX4" fmla="*/ 432 w 576496"/>
+              <a:gd name="connsiteY4" fmla="*/ 874400 h 874400"/>
+              <a:gd name="connsiteX5" fmla="*/ 0 w 576496"/>
+              <a:gd name="connsiteY5" fmla="*/ 213360 h 874400"/>
+              <a:gd name="connsiteX0" fmla="*/ 0 w 576496"/>
+              <a:gd name="connsiteY0" fmla="*/ 213360 h 874400"/>
+              <a:gd name="connsiteX1" fmla="*/ 121920 w 576496"/>
+              <a:gd name="connsiteY1" fmla="*/ 0 h 874400"/>
+              <a:gd name="connsiteX2" fmla="*/ 576496 w 576496"/>
+              <a:gd name="connsiteY2" fmla="*/ 10304 h 874400"/>
+              <a:gd name="connsiteX3" fmla="*/ 576496 w 576496"/>
+              <a:gd name="connsiteY3" fmla="*/ 874400 h 874400"/>
+              <a:gd name="connsiteX4" fmla="*/ 432 w 576496"/>
+              <a:gd name="connsiteY4" fmla="*/ 874400 h 874400"/>
+              <a:gd name="connsiteX5" fmla="*/ 0 w 576496"/>
+              <a:gd name="connsiteY5" fmla="*/ 213360 h 874400"/>
+            </a:gdLst>
+            <a:ahLst/>
+            <a:cxnLst>
+              <a:cxn ang="0">
+                <a:pos x="connsiteX0" y="connsiteY0"/>
+              </a:cxn>
+              <a:cxn ang="0">
+                <a:pos x="connsiteX1" y="connsiteY1"/>
+              </a:cxn>
+              <a:cxn ang="0">
+                <a:pos x="connsiteX2" y="connsiteY2"/>
+              </a:cxn>
+              <a:cxn ang="0">
+                <a:pos x="connsiteX3" y="connsiteY3"/>
+              </a:cxn>
+              <a:cxn ang="0">
+                <a:pos x="connsiteX4" y="connsiteY4"/>
+              </a:cxn>
+              <a:cxn ang="0">
+                <a:pos x="connsiteX5" y="connsiteY5"/>
+              </a:cxn>
+            </a:cxnLst>
+            <a:rect l="l" t="t" r="r" b="b"/>
+            <a:pathLst>
+              <a:path w="576496" h="874400">
+                <a:moveTo>
+                  <a:pt x="0" y="213360"/>
+                </a:moveTo>
+                <a:lnTo>
+                  <a:pt x="121920" y="0"/>
+                </a:lnTo>
+                <a:lnTo>
+                  <a:pt x="576496" y="10304"/>
+                </a:lnTo>
+                <a:lnTo>
+                  <a:pt x="576496" y="874400"/>
+                </a:lnTo>
+                <a:lnTo>
+                  <a:pt x="432" y="874400"/>
+                </a:lnTo>
+                <a:lnTo>
+                  <a:pt x="0" y="213360"/>
+                </a:lnTo>
+                <a:close/>
+              </a:path>
+            </a:pathLst>
+          </a:custGeom>
+          <a:solidFill>
+            <a:schemeClr val="bg2"/>
+          </a:solidFill>
+          <a:ln w="76200">
+            <a:solidFill>
+              <a:srgbClr val="00B0F0"/>
+            </a:solidFill>
+            <a:prstDash val="dash"/>
+          </a:ln>
+          <a:effectLst>
+            <a:outerShdw blurRad="50800" dist="38100" algn="l" rotWithShape="0">
+              <a:prstClr val="black">
+                <a:alpha val="40000"/>
+              </a:prstClr>
+            </a:outerShdw>
+          </a:effectLst>
+        </p:spPr>
+        <p:style>
+          <a:lnRef idx="2">
+            <a:schemeClr val="accent3">
+              <a:shade val="50000"/>
+            </a:schemeClr>
+          </a:lnRef>
+          <a:fillRef idx="1">
+            <a:schemeClr val="accent3"/>
+          </a:fillRef>
+          <a:effectRef idx="0">
+            <a:schemeClr val="accent3"/>
+          </a:effectRef>
+          <a:fontRef idx="minor">
+            <a:schemeClr val="lt1"/>
+          </a:fontRef>
+        </p:style>
         <p:txBody>
-          <a:bodyPr/>
+          <a:bodyPr rtlCol="0" anchor="ctr"/>
           <a:lstStyle/>
           <a:p>
-            <a:pPr marL="0" indent="0">
-              <a:buNone/>
-            </a:pPr>
-            <a:r>
-              <a:rPr lang="pl-PL" dirty="0" smtClean="0"/>
-              <a:t>TODO: ten sam smart art ale z kolorkami co jest zaimplementowane a co nie?</a:t>
-            </a:r>
-            <a:endParaRPr lang="en-US" dirty="0"/>
+            <a:pPr algn="ctr"/>
+            <a:endParaRPr lang="pl-PL"/>
           </a:p>
         </p:txBody>
       </p:sp>
+      <p:sp>
+        <p:nvSpPr>
+          <p:cNvPr id="6" name="pole tekstowe 5"/>
+          <p:cNvSpPr txBox="1"/>
+          <p:nvPr/>
+        </p:nvSpPr>
+        <p:spPr>
+          <a:xfrm>
+            <a:off x="467544" y="2267580"/>
+            <a:ext cx="792088" cy="369332"/>
+          </a:xfrm>
+          <a:prstGeom prst="rect">
+            <a:avLst/>
+          </a:prstGeom>
+          <a:noFill/>
+        </p:spPr>
+        <p:txBody>
+          <a:bodyPr wrap="square" rtlCol="0">
+            <a:spAutoFit/>
+          </a:bodyPr>
+          <a:lstStyle/>
+          <a:p>
+            <a:pPr algn="ctr"/>
+            <a:r>
+              <a:rPr lang="pl-PL" dirty="0" err="1" smtClean="0"/>
+              <a:t>Config</a:t>
+            </a:r>
+            <a:r>
+              <a:rPr lang="pl-PL" dirty="0" smtClean="0"/>
+              <a:t> </a:t>
+            </a:r>
+            <a:endParaRPr lang="pl-PL" dirty="0"/>
+          </a:p>
+        </p:txBody>
+      </p:sp>
+      <p:sp>
+        <p:nvSpPr>
+          <p:cNvPr id="7" name="Prostokąt 6"/>
+          <p:cNvSpPr/>
+          <p:nvPr/>
+        </p:nvSpPr>
+        <p:spPr>
+          <a:xfrm>
+            <a:off x="2915816" y="1844824"/>
+            <a:ext cx="2016224" cy="1080120"/>
+          </a:xfrm>
+          <a:prstGeom prst="rect">
+            <a:avLst/>
+          </a:prstGeom>
+          <a:ln w="76200">
+            <a:solidFill>
+              <a:srgbClr val="00B0F0"/>
+            </a:solidFill>
+          </a:ln>
+          <a:effectLst>
+            <a:outerShdw blurRad="50800" dist="38100" algn="l" rotWithShape="0">
+              <a:prstClr val="black">
+                <a:alpha val="40000"/>
+              </a:prstClr>
+            </a:outerShdw>
+          </a:effectLst>
+        </p:spPr>
+        <p:style>
+          <a:lnRef idx="1">
+            <a:schemeClr val="accent6"/>
+          </a:lnRef>
+          <a:fillRef idx="2">
+            <a:schemeClr val="accent6"/>
+          </a:fillRef>
+          <a:effectRef idx="1">
+            <a:schemeClr val="accent6"/>
+          </a:effectRef>
+          <a:fontRef idx="minor">
+            <a:schemeClr val="dk1"/>
+          </a:fontRef>
+        </p:style>
+        <p:txBody>
+          <a:bodyPr rtlCol="0" anchor="ctr"/>
+          <a:lstStyle/>
+          <a:p>
+            <a:pPr algn="ctr"/>
+            <a:r>
+              <a:rPr lang="pl-PL" dirty="0" smtClean="0"/>
+              <a:t>Generator</a:t>
+            </a:r>
+            <a:endParaRPr lang="pl-PL" dirty="0"/>
+          </a:p>
+        </p:txBody>
+      </p:sp>
+      <p:cxnSp>
+        <p:nvCxnSpPr>
+          <p:cNvPr id="8" name="Łącznik prosty ze strzałką 7"/>
+          <p:cNvCxnSpPr/>
+          <p:nvPr/>
+        </p:nvCxnSpPr>
+        <p:spPr>
+          <a:xfrm>
+            <a:off x="2339752" y="2354084"/>
+            <a:ext cx="568119" cy="0"/>
+          </a:xfrm>
+          <a:prstGeom prst="straightConnector1">
+            <a:avLst/>
+          </a:prstGeom>
+          <a:ln w="19050">
+            <a:tailEnd type="arrow"/>
+          </a:ln>
+        </p:spPr>
+        <p:style>
+          <a:lnRef idx="1">
+            <a:schemeClr val="accent6"/>
+          </a:lnRef>
+          <a:fillRef idx="0">
+            <a:schemeClr val="accent6"/>
+          </a:fillRef>
+          <a:effectRef idx="0">
+            <a:schemeClr val="accent6"/>
+          </a:effectRef>
+          <a:fontRef idx="minor">
+            <a:schemeClr val="tx1"/>
+          </a:fontRef>
+        </p:style>
+      </p:cxnSp>
+      <p:cxnSp>
+        <p:nvCxnSpPr>
+          <p:cNvPr id="9" name="Łącznik prosty ze strzałką 14"/>
+          <p:cNvCxnSpPr/>
+          <p:nvPr/>
+        </p:nvCxnSpPr>
+        <p:spPr>
+          <a:xfrm>
+            <a:off x="1259632" y="2689461"/>
+            <a:ext cx="1648240" cy="12700"/>
+          </a:xfrm>
+          <a:prstGeom prst="bentConnector3">
+            <a:avLst>
+              <a:gd name="adj1" fmla="val 50000"/>
+            </a:avLst>
+          </a:prstGeom>
+          <a:ln w="19050">
+            <a:tailEnd type="arrow"/>
+          </a:ln>
+        </p:spPr>
+        <p:style>
+          <a:lnRef idx="1">
+            <a:schemeClr val="accent6"/>
+          </a:lnRef>
+          <a:fillRef idx="0">
+            <a:schemeClr val="accent6"/>
+          </a:fillRef>
+          <a:effectRef idx="0">
+            <a:schemeClr val="accent6"/>
+          </a:effectRef>
+          <a:fontRef idx="minor">
+            <a:schemeClr val="tx1"/>
+          </a:fontRef>
+        </p:style>
+      </p:cxnSp>
+      <p:grpSp>
+        <p:nvGrpSpPr>
+          <p:cNvPr id="10" name="Grupa 9"/>
+          <p:cNvGrpSpPr/>
+          <p:nvPr/>
+        </p:nvGrpSpPr>
+        <p:grpSpPr>
+          <a:xfrm flipV="1">
+            <a:off x="6350966" y="2366294"/>
+            <a:ext cx="237258" cy="45719"/>
+            <a:chOff x="6516216" y="2544842"/>
+            <a:chExt cx="524118" cy="99844"/>
+          </a:xfrm>
+          <a:effectLst>
+            <a:outerShdw blurRad="50800" dist="38100" algn="l" rotWithShape="0">
+              <a:prstClr val="black">
+                <a:alpha val="40000"/>
+              </a:prstClr>
+            </a:outerShdw>
+          </a:effectLst>
+        </p:grpSpPr>
+        <p:sp>
+          <p:nvSpPr>
+            <p:cNvPr id="11" name="Elipsa 10"/>
+            <p:cNvSpPr/>
+            <p:nvPr/>
+          </p:nvSpPr>
+          <p:spPr>
+            <a:xfrm>
+              <a:off x="6516216" y="2544842"/>
+              <a:ext cx="92070" cy="92070"/>
+            </a:xfrm>
+            <a:prstGeom prst="ellipse">
+              <a:avLst/>
+            </a:prstGeom>
+            <a:ln>
+              <a:noFill/>
+            </a:ln>
+          </p:spPr>
+          <p:style>
+            <a:lnRef idx="2">
+              <a:schemeClr val="accent6">
+                <a:shade val="50000"/>
+              </a:schemeClr>
+            </a:lnRef>
+            <a:fillRef idx="1">
+              <a:schemeClr val="accent6"/>
+            </a:fillRef>
+            <a:effectRef idx="0">
+              <a:schemeClr val="accent6"/>
+            </a:effectRef>
+            <a:fontRef idx="minor">
+              <a:schemeClr val="lt1"/>
+            </a:fontRef>
+          </p:style>
+          <p:txBody>
+            <a:bodyPr rtlCol="0" anchor="ctr"/>
+            <a:lstStyle/>
+            <a:p>
+              <a:pPr algn="ctr"/>
+              <a:endParaRPr lang="pl-PL"/>
+            </a:p>
+          </p:txBody>
+        </p:sp>
+        <p:sp>
+          <p:nvSpPr>
+            <p:cNvPr id="12" name="Elipsa 11"/>
+            <p:cNvSpPr/>
+            <p:nvPr/>
+          </p:nvSpPr>
+          <p:spPr>
+            <a:xfrm>
+              <a:off x="6728946" y="2544919"/>
+              <a:ext cx="92070" cy="92070"/>
+            </a:xfrm>
+            <a:prstGeom prst="ellipse">
+              <a:avLst/>
+            </a:prstGeom>
+            <a:ln>
+              <a:noFill/>
+            </a:ln>
+          </p:spPr>
+          <p:style>
+            <a:lnRef idx="2">
+              <a:schemeClr val="accent6">
+                <a:shade val="50000"/>
+              </a:schemeClr>
+            </a:lnRef>
+            <a:fillRef idx="1">
+              <a:schemeClr val="accent6"/>
+            </a:fillRef>
+            <a:effectRef idx="0">
+              <a:schemeClr val="accent6"/>
+            </a:effectRef>
+            <a:fontRef idx="minor">
+              <a:schemeClr val="lt1"/>
+            </a:fontRef>
+          </p:style>
+          <p:txBody>
+            <a:bodyPr rtlCol="0" anchor="ctr"/>
+            <a:lstStyle/>
+            <a:p>
+              <a:pPr algn="ctr"/>
+              <a:endParaRPr lang="pl-PL"/>
+            </a:p>
+          </p:txBody>
+        </p:sp>
+        <p:sp>
+          <p:nvSpPr>
+            <p:cNvPr id="13" name="Elipsa 12"/>
+            <p:cNvSpPr/>
+            <p:nvPr/>
+          </p:nvSpPr>
+          <p:spPr>
+            <a:xfrm>
+              <a:off x="6948264" y="2552616"/>
+              <a:ext cx="92070" cy="92070"/>
+            </a:xfrm>
+            <a:prstGeom prst="ellipse">
+              <a:avLst/>
+            </a:prstGeom>
+            <a:ln>
+              <a:noFill/>
+            </a:ln>
+          </p:spPr>
+          <p:style>
+            <a:lnRef idx="2">
+              <a:schemeClr val="accent6">
+                <a:shade val="50000"/>
+              </a:schemeClr>
+            </a:lnRef>
+            <a:fillRef idx="1">
+              <a:schemeClr val="accent6"/>
+            </a:fillRef>
+            <a:effectRef idx="0">
+              <a:schemeClr val="accent6"/>
+            </a:effectRef>
+            <a:fontRef idx="minor">
+              <a:schemeClr val="lt1"/>
+            </a:fontRef>
+          </p:style>
+          <p:txBody>
+            <a:bodyPr rtlCol="0" anchor="ctr"/>
+            <a:lstStyle/>
+            <a:p>
+              <a:pPr algn="ctr"/>
+              <a:endParaRPr lang="pl-PL"/>
+            </a:p>
+          </p:txBody>
+        </p:sp>
+      </p:grpSp>
+      <p:cxnSp>
+        <p:nvCxnSpPr>
+          <p:cNvPr id="14" name="Łącznik prosty ze strzałką 13"/>
+          <p:cNvCxnSpPr>
+            <a:stCxn id="7" idx="3"/>
+          </p:cNvCxnSpPr>
+          <p:nvPr/>
+        </p:nvCxnSpPr>
+        <p:spPr>
+          <a:xfrm flipV="1">
+            <a:off x="4932040" y="2384013"/>
+            <a:ext cx="504056" cy="871"/>
+          </a:xfrm>
+          <a:prstGeom prst="straightConnector1">
+            <a:avLst/>
+          </a:prstGeom>
+          <a:ln w="19050">
+            <a:tailEnd type="arrow"/>
+          </a:ln>
+        </p:spPr>
+        <p:style>
+          <a:lnRef idx="1">
+            <a:schemeClr val="accent6"/>
+          </a:lnRef>
+          <a:fillRef idx="0">
+            <a:schemeClr val="accent6"/>
+          </a:fillRef>
+          <a:effectRef idx="0">
+            <a:schemeClr val="accent6"/>
+          </a:effectRef>
+          <a:fontRef idx="minor">
+            <a:schemeClr val="tx1"/>
+          </a:fontRef>
+        </p:style>
+      </p:cxnSp>
+      <p:sp>
+        <p:nvSpPr>
+          <p:cNvPr id="15" name="Prostokąt 14"/>
+          <p:cNvSpPr/>
+          <p:nvPr/>
+        </p:nvSpPr>
+        <p:spPr>
+          <a:xfrm>
+            <a:off x="2907871" y="3281979"/>
+            <a:ext cx="2016224" cy="1080120"/>
+          </a:xfrm>
+          <a:prstGeom prst="rect">
+            <a:avLst/>
+          </a:prstGeom>
+          <a:ln w="76200">
+            <a:solidFill>
+              <a:srgbClr val="FF0000"/>
+            </a:solidFill>
+          </a:ln>
+          <a:effectLst>
+            <a:outerShdw blurRad="50800" dist="38100" algn="l" rotWithShape="0">
+              <a:prstClr val="black">
+                <a:alpha val="40000"/>
+              </a:prstClr>
+            </a:outerShdw>
+          </a:effectLst>
+        </p:spPr>
+        <p:style>
+          <a:lnRef idx="1">
+            <a:schemeClr val="accent3"/>
+          </a:lnRef>
+          <a:fillRef idx="2">
+            <a:schemeClr val="accent3"/>
+          </a:fillRef>
+          <a:effectRef idx="1">
+            <a:schemeClr val="accent3"/>
+          </a:effectRef>
+          <a:fontRef idx="minor">
+            <a:schemeClr val="dk1"/>
+          </a:fontRef>
+        </p:style>
+        <p:txBody>
+          <a:bodyPr rtlCol="0" anchor="ctr"/>
+          <a:lstStyle/>
+          <a:p>
+            <a:pPr algn="ctr"/>
+            <a:r>
+              <a:rPr lang="en-US" dirty="0" smtClean="0"/>
+              <a:t>Detector</a:t>
+            </a:r>
+            <a:endParaRPr lang="en-US" dirty="0"/>
+          </a:p>
+        </p:txBody>
+      </p:sp>
+      <p:cxnSp>
+        <p:nvCxnSpPr>
+          <p:cNvPr id="16" name="Łącznik łamany 15"/>
+          <p:cNvCxnSpPr>
+            <a:endCxn id="15" idx="3"/>
+          </p:cNvCxnSpPr>
+          <p:nvPr/>
+        </p:nvCxnSpPr>
+        <p:spPr>
+          <a:xfrm rot="5400000">
+            <a:off x="4927825" y="2553605"/>
+            <a:ext cx="892640" cy="900100"/>
+          </a:xfrm>
+          <a:prstGeom prst="bentConnector2">
+            <a:avLst/>
+          </a:prstGeom>
+          <a:ln w="19050">
+            <a:tailEnd type="arrow"/>
+          </a:ln>
+        </p:spPr>
+        <p:style>
+          <a:lnRef idx="1">
+            <a:schemeClr val="accent6"/>
+          </a:lnRef>
+          <a:fillRef idx="0">
+            <a:schemeClr val="accent6"/>
+          </a:fillRef>
+          <a:effectRef idx="0">
+            <a:schemeClr val="accent6"/>
+          </a:effectRef>
+          <a:fontRef idx="minor">
+            <a:schemeClr val="tx1"/>
+          </a:fontRef>
+        </p:style>
+      </p:cxnSp>
+      <p:cxnSp>
+        <p:nvCxnSpPr>
+          <p:cNvPr id="17" name="Łącznik łamany 16"/>
+          <p:cNvCxnSpPr/>
+          <p:nvPr/>
+        </p:nvCxnSpPr>
+        <p:spPr>
+          <a:xfrm rot="10800000" flipV="1">
+            <a:off x="5084440" y="2848371"/>
+            <a:ext cx="1932538" cy="601603"/>
+          </a:xfrm>
+          <a:prstGeom prst="bentConnector3">
+            <a:avLst>
+              <a:gd name="adj1" fmla="val 1174"/>
+            </a:avLst>
+          </a:prstGeom>
+          <a:ln w="19050">
+            <a:tailEnd type="none"/>
+          </a:ln>
+        </p:spPr>
+        <p:style>
+          <a:lnRef idx="1">
+            <a:schemeClr val="accent6"/>
+          </a:lnRef>
+          <a:fillRef idx="0">
+            <a:schemeClr val="accent6"/>
+          </a:fillRef>
+          <a:effectRef idx="0">
+            <a:schemeClr val="accent6"/>
+          </a:effectRef>
+          <a:fontRef idx="minor">
+            <a:schemeClr val="tx1"/>
+          </a:fontRef>
+        </p:style>
+      </p:cxnSp>
+      <p:sp>
+        <p:nvSpPr>
+          <p:cNvPr id="18" name="pole tekstowe 17"/>
+          <p:cNvSpPr txBox="1"/>
+          <p:nvPr/>
+        </p:nvSpPr>
+        <p:spPr>
+          <a:xfrm>
+            <a:off x="6033135" y="3087097"/>
+            <a:ext cx="677339" cy="369332"/>
+          </a:xfrm>
+          <a:prstGeom prst="rect">
+            <a:avLst/>
+          </a:prstGeom>
+          <a:noFill/>
+        </p:spPr>
+        <p:txBody>
+          <a:bodyPr wrap="square" rtlCol="0">
+            <a:spAutoFit/>
+          </a:bodyPr>
+          <a:lstStyle/>
+          <a:p>
+            <a:r>
+              <a:rPr lang="en-US" i="1" dirty="0" smtClean="0"/>
+              <a:t>learn</a:t>
+            </a:r>
+            <a:endParaRPr lang="en-US" i="1" dirty="0"/>
+          </a:p>
+        </p:txBody>
+      </p:sp>
+      <p:grpSp>
+        <p:nvGrpSpPr>
+          <p:cNvPr id="19" name="Grupa 18"/>
+          <p:cNvGrpSpPr/>
+          <p:nvPr/>
+        </p:nvGrpSpPr>
+        <p:grpSpPr>
+          <a:xfrm>
+            <a:off x="6588224" y="1705372"/>
+            <a:ext cx="864096" cy="1147564"/>
+            <a:chOff x="5436096" y="1844824"/>
+            <a:chExt cx="864096" cy="1147564"/>
+          </a:xfrm>
+          <a:effectLst>
+            <a:outerShdw blurRad="50800" dist="38100" algn="l" rotWithShape="0">
+              <a:prstClr val="black">
+                <a:alpha val="40000"/>
+              </a:prstClr>
+            </a:outerShdw>
+          </a:effectLst>
+        </p:grpSpPr>
+        <p:sp>
+          <p:nvSpPr>
+            <p:cNvPr id="20" name="Prostokąt 3"/>
+            <p:cNvSpPr/>
+            <p:nvPr/>
+          </p:nvSpPr>
+          <p:spPr>
+            <a:xfrm>
+              <a:off x="5508104" y="1844824"/>
+              <a:ext cx="792088" cy="1080120"/>
+            </a:xfrm>
+            <a:custGeom>
+              <a:avLst/>
+              <a:gdLst>
+                <a:gd name="connsiteX0" fmla="*/ 0 w 576064"/>
+                <a:gd name="connsiteY0" fmla="*/ 0 h 864096"/>
+                <a:gd name="connsiteX1" fmla="*/ 576064 w 576064"/>
+                <a:gd name="connsiteY1" fmla="*/ 0 h 864096"/>
+                <a:gd name="connsiteX2" fmla="*/ 576064 w 576064"/>
+                <a:gd name="connsiteY2" fmla="*/ 864096 h 864096"/>
+                <a:gd name="connsiteX3" fmla="*/ 0 w 576064"/>
+                <a:gd name="connsiteY3" fmla="*/ 864096 h 864096"/>
+                <a:gd name="connsiteX4" fmla="*/ 0 w 576064"/>
+                <a:gd name="connsiteY4" fmla="*/ 0 h 864096"/>
+                <a:gd name="connsiteX0" fmla="*/ 432 w 576496"/>
+                <a:gd name="connsiteY0" fmla="*/ 0 h 864096"/>
+                <a:gd name="connsiteX1" fmla="*/ 576496 w 576496"/>
+                <a:gd name="connsiteY1" fmla="*/ 0 h 864096"/>
+                <a:gd name="connsiteX2" fmla="*/ 576496 w 576496"/>
+                <a:gd name="connsiteY2" fmla="*/ 864096 h 864096"/>
+                <a:gd name="connsiteX3" fmla="*/ 432 w 576496"/>
+                <a:gd name="connsiteY3" fmla="*/ 864096 h 864096"/>
+                <a:gd name="connsiteX4" fmla="*/ 0 w 576496"/>
+                <a:gd name="connsiteY4" fmla="*/ 355456 h 864096"/>
+                <a:gd name="connsiteX5" fmla="*/ 432 w 576496"/>
+                <a:gd name="connsiteY5" fmla="*/ 0 h 864096"/>
+                <a:gd name="connsiteX0" fmla="*/ 432 w 576496"/>
+                <a:gd name="connsiteY0" fmla="*/ 10304 h 874400"/>
+                <a:gd name="connsiteX1" fmla="*/ 243840 w 576496"/>
+                <a:gd name="connsiteY1" fmla="*/ 0 h 874400"/>
+                <a:gd name="connsiteX2" fmla="*/ 576496 w 576496"/>
+                <a:gd name="connsiteY2" fmla="*/ 10304 h 874400"/>
+                <a:gd name="connsiteX3" fmla="*/ 576496 w 576496"/>
+                <a:gd name="connsiteY3" fmla="*/ 874400 h 874400"/>
+                <a:gd name="connsiteX4" fmla="*/ 432 w 576496"/>
+                <a:gd name="connsiteY4" fmla="*/ 874400 h 874400"/>
+                <a:gd name="connsiteX5" fmla="*/ 0 w 576496"/>
+                <a:gd name="connsiteY5" fmla="*/ 365760 h 874400"/>
+                <a:gd name="connsiteX6" fmla="*/ 432 w 576496"/>
+                <a:gd name="connsiteY6" fmla="*/ 10304 h 874400"/>
+                <a:gd name="connsiteX0" fmla="*/ 0 w 576496"/>
+                <a:gd name="connsiteY0" fmla="*/ 365760 h 874400"/>
+                <a:gd name="connsiteX1" fmla="*/ 243840 w 576496"/>
+                <a:gd name="connsiteY1" fmla="*/ 0 h 874400"/>
+                <a:gd name="connsiteX2" fmla="*/ 576496 w 576496"/>
+                <a:gd name="connsiteY2" fmla="*/ 10304 h 874400"/>
+                <a:gd name="connsiteX3" fmla="*/ 576496 w 576496"/>
+                <a:gd name="connsiteY3" fmla="*/ 874400 h 874400"/>
+                <a:gd name="connsiteX4" fmla="*/ 432 w 576496"/>
+                <a:gd name="connsiteY4" fmla="*/ 874400 h 874400"/>
+                <a:gd name="connsiteX5" fmla="*/ 0 w 576496"/>
+                <a:gd name="connsiteY5" fmla="*/ 365760 h 874400"/>
+                <a:gd name="connsiteX0" fmla="*/ 0 w 576496"/>
+                <a:gd name="connsiteY0" fmla="*/ 213360 h 874400"/>
+                <a:gd name="connsiteX1" fmla="*/ 243840 w 576496"/>
+                <a:gd name="connsiteY1" fmla="*/ 0 h 874400"/>
+                <a:gd name="connsiteX2" fmla="*/ 576496 w 576496"/>
+                <a:gd name="connsiteY2" fmla="*/ 10304 h 874400"/>
+                <a:gd name="connsiteX3" fmla="*/ 576496 w 576496"/>
+                <a:gd name="connsiteY3" fmla="*/ 874400 h 874400"/>
+                <a:gd name="connsiteX4" fmla="*/ 432 w 576496"/>
+                <a:gd name="connsiteY4" fmla="*/ 874400 h 874400"/>
+                <a:gd name="connsiteX5" fmla="*/ 0 w 576496"/>
+                <a:gd name="connsiteY5" fmla="*/ 213360 h 874400"/>
+                <a:gd name="connsiteX0" fmla="*/ 0 w 576496"/>
+                <a:gd name="connsiteY0" fmla="*/ 213360 h 874400"/>
+                <a:gd name="connsiteX1" fmla="*/ 121920 w 576496"/>
+                <a:gd name="connsiteY1" fmla="*/ 0 h 874400"/>
+                <a:gd name="connsiteX2" fmla="*/ 576496 w 576496"/>
+                <a:gd name="connsiteY2" fmla="*/ 10304 h 874400"/>
+                <a:gd name="connsiteX3" fmla="*/ 576496 w 576496"/>
+                <a:gd name="connsiteY3" fmla="*/ 874400 h 874400"/>
+                <a:gd name="connsiteX4" fmla="*/ 432 w 576496"/>
+                <a:gd name="connsiteY4" fmla="*/ 874400 h 874400"/>
+                <a:gd name="connsiteX5" fmla="*/ 0 w 576496"/>
+                <a:gd name="connsiteY5" fmla="*/ 213360 h 874400"/>
+              </a:gdLst>
+              <a:ahLst/>
+              <a:cxnLst>
+                <a:cxn ang="0">
+                  <a:pos x="connsiteX0" y="connsiteY0"/>
+                </a:cxn>
+                <a:cxn ang="0">
+                  <a:pos x="connsiteX1" y="connsiteY1"/>
+                </a:cxn>
+                <a:cxn ang="0">
+                  <a:pos x="connsiteX2" y="connsiteY2"/>
+                </a:cxn>
+                <a:cxn ang="0">
+                  <a:pos x="connsiteX3" y="connsiteY3"/>
+                </a:cxn>
+                <a:cxn ang="0">
+                  <a:pos x="connsiteX4" y="connsiteY4"/>
+                </a:cxn>
+                <a:cxn ang="0">
+                  <a:pos x="connsiteX5" y="connsiteY5"/>
+                </a:cxn>
+              </a:cxnLst>
+              <a:rect l="l" t="t" r="r" b="b"/>
+              <a:pathLst>
+                <a:path w="576496" h="874400">
+                  <a:moveTo>
+                    <a:pt x="0" y="213360"/>
+                  </a:moveTo>
+                  <a:lnTo>
+                    <a:pt x="121920" y="0"/>
+                  </a:lnTo>
+                  <a:lnTo>
+                    <a:pt x="576496" y="10304"/>
+                  </a:lnTo>
+                  <a:lnTo>
+                    <a:pt x="576496" y="874400"/>
+                  </a:lnTo>
+                  <a:lnTo>
+                    <a:pt x="432" y="874400"/>
+                  </a:lnTo>
+                  <a:lnTo>
+                    <a:pt x="0" y="213360"/>
+                  </a:lnTo>
+                  <a:close/>
+                </a:path>
+              </a:pathLst>
+            </a:custGeom>
+            <a:ln w="9525"/>
+            <a:effectLst/>
+          </p:spPr>
+          <p:style>
+            <a:lnRef idx="2">
+              <a:schemeClr val="accent1">
+                <a:shade val="50000"/>
+              </a:schemeClr>
+            </a:lnRef>
+            <a:fillRef idx="1">
+              <a:schemeClr val="accent1"/>
+            </a:fillRef>
+            <a:effectRef idx="0">
+              <a:schemeClr val="accent1"/>
+            </a:effectRef>
+            <a:fontRef idx="minor">
+              <a:schemeClr val="lt1"/>
+            </a:fontRef>
+          </p:style>
+          <p:txBody>
+            <a:bodyPr rtlCol="0" anchor="ctr"/>
+            <a:lstStyle/>
+            <a:p>
+              <a:pPr algn="ctr"/>
+              <a:endParaRPr lang="pl-PL"/>
+            </a:p>
+          </p:txBody>
+        </p:sp>
+        <p:sp>
+          <p:nvSpPr>
+            <p:cNvPr id="21" name="Prostokąt 3"/>
+            <p:cNvSpPr/>
+            <p:nvPr/>
+          </p:nvSpPr>
+          <p:spPr>
+            <a:xfrm>
+              <a:off x="5436096" y="1912268"/>
+              <a:ext cx="792088" cy="1080120"/>
+            </a:xfrm>
+            <a:custGeom>
+              <a:avLst/>
+              <a:gdLst>
+                <a:gd name="connsiteX0" fmla="*/ 0 w 576064"/>
+                <a:gd name="connsiteY0" fmla="*/ 0 h 864096"/>
+                <a:gd name="connsiteX1" fmla="*/ 576064 w 576064"/>
+                <a:gd name="connsiteY1" fmla="*/ 0 h 864096"/>
+                <a:gd name="connsiteX2" fmla="*/ 576064 w 576064"/>
+                <a:gd name="connsiteY2" fmla="*/ 864096 h 864096"/>
+                <a:gd name="connsiteX3" fmla="*/ 0 w 576064"/>
+                <a:gd name="connsiteY3" fmla="*/ 864096 h 864096"/>
+                <a:gd name="connsiteX4" fmla="*/ 0 w 576064"/>
+                <a:gd name="connsiteY4" fmla="*/ 0 h 864096"/>
+                <a:gd name="connsiteX0" fmla="*/ 432 w 576496"/>
+                <a:gd name="connsiteY0" fmla="*/ 0 h 864096"/>
+                <a:gd name="connsiteX1" fmla="*/ 576496 w 576496"/>
+                <a:gd name="connsiteY1" fmla="*/ 0 h 864096"/>
+                <a:gd name="connsiteX2" fmla="*/ 576496 w 576496"/>
+                <a:gd name="connsiteY2" fmla="*/ 864096 h 864096"/>
+                <a:gd name="connsiteX3" fmla="*/ 432 w 576496"/>
+                <a:gd name="connsiteY3" fmla="*/ 864096 h 864096"/>
+                <a:gd name="connsiteX4" fmla="*/ 0 w 576496"/>
+                <a:gd name="connsiteY4" fmla="*/ 355456 h 864096"/>
+                <a:gd name="connsiteX5" fmla="*/ 432 w 576496"/>
+                <a:gd name="connsiteY5" fmla="*/ 0 h 864096"/>
+                <a:gd name="connsiteX0" fmla="*/ 432 w 576496"/>
+                <a:gd name="connsiteY0" fmla="*/ 10304 h 874400"/>
+                <a:gd name="connsiteX1" fmla="*/ 243840 w 576496"/>
+                <a:gd name="connsiteY1" fmla="*/ 0 h 874400"/>
+                <a:gd name="connsiteX2" fmla="*/ 576496 w 576496"/>
+                <a:gd name="connsiteY2" fmla="*/ 10304 h 874400"/>
+                <a:gd name="connsiteX3" fmla="*/ 576496 w 576496"/>
+                <a:gd name="connsiteY3" fmla="*/ 874400 h 874400"/>
+                <a:gd name="connsiteX4" fmla="*/ 432 w 576496"/>
+                <a:gd name="connsiteY4" fmla="*/ 874400 h 874400"/>
+                <a:gd name="connsiteX5" fmla="*/ 0 w 576496"/>
+                <a:gd name="connsiteY5" fmla="*/ 365760 h 874400"/>
+                <a:gd name="connsiteX6" fmla="*/ 432 w 576496"/>
+                <a:gd name="connsiteY6" fmla="*/ 10304 h 874400"/>
+                <a:gd name="connsiteX0" fmla="*/ 0 w 576496"/>
+                <a:gd name="connsiteY0" fmla="*/ 365760 h 874400"/>
+                <a:gd name="connsiteX1" fmla="*/ 243840 w 576496"/>
+                <a:gd name="connsiteY1" fmla="*/ 0 h 874400"/>
+                <a:gd name="connsiteX2" fmla="*/ 576496 w 576496"/>
+                <a:gd name="connsiteY2" fmla="*/ 10304 h 874400"/>
+                <a:gd name="connsiteX3" fmla="*/ 576496 w 576496"/>
+                <a:gd name="connsiteY3" fmla="*/ 874400 h 874400"/>
+                <a:gd name="connsiteX4" fmla="*/ 432 w 576496"/>
+                <a:gd name="connsiteY4" fmla="*/ 874400 h 874400"/>
+                <a:gd name="connsiteX5" fmla="*/ 0 w 576496"/>
+                <a:gd name="connsiteY5" fmla="*/ 365760 h 874400"/>
+                <a:gd name="connsiteX0" fmla="*/ 0 w 576496"/>
+                <a:gd name="connsiteY0" fmla="*/ 213360 h 874400"/>
+                <a:gd name="connsiteX1" fmla="*/ 243840 w 576496"/>
+                <a:gd name="connsiteY1" fmla="*/ 0 h 874400"/>
+                <a:gd name="connsiteX2" fmla="*/ 576496 w 576496"/>
+                <a:gd name="connsiteY2" fmla="*/ 10304 h 874400"/>
+                <a:gd name="connsiteX3" fmla="*/ 576496 w 576496"/>
+                <a:gd name="connsiteY3" fmla="*/ 874400 h 874400"/>
+                <a:gd name="connsiteX4" fmla="*/ 432 w 576496"/>
+                <a:gd name="connsiteY4" fmla="*/ 874400 h 874400"/>
+                <a:gd name="connsiteX5" fmla="*/ 0 w 576496"/>
+                <a:gd name="connsiteY5" fmla="*/ 213360 h 874400"/>
+                <a:gd name="connsiteX0" fmla="*/ 0 w 576496"/>
+                <a:gd name="connsiteY0" fmla="*/ 213360 h 874400"/>
+                <a:gd name="connsiteX1" fmla="*/ 121920 w 576496"/>
+                <a:gd name="connsiteY1" fmla="*/ 0 h 874400"/>
+                <a:gd name="connsiteX2" fmla="*/ 576496 w 576496"/>
+                <a:gd name="connsiteY2" fmla="*/ 10304 h 874400"/>
+                <a:gd name="connsiteX3" fmla="*/ 576496 w 576496"/>
+                <a:gd name="connsiteY3" fmla="*/ 874400 h 874400"/>
+                <a:gd name="connsiteX4" fmla="*/ 432 w 576496"/>
+                <a:gd name="connsiteY4" fmla="*/ 874400 h 874400"/>
+                <a:gd name="connsiteX5" fmla="*/ 0 w 576496"/>
+                <a:gd name="connsiteY5" fmla="*/ 213360 h 874400"/>
+              </a:gdLst>
+              <a:ahLst/>
+              <a:cxnLst>
+                <a:cxn ang="0">
+                  <a:pos x="connsiteX0" y="connsiteY0"/>
+                </a:cxn>
+                <a:cxn ang="0">
+                  <a:pos x="connsiteX1" y="connsiteY1"/>
+                </a:cxn>
+                <a:cxn ang="0">
+                  <a:pos x="connsiteX2" y="connsiteY2"/>
+                </a:cxn>
+                <a:cxn ang="0">
+                  <a:pos x="connsiteX3" y="connsiteY3"/>
+                </a:cxn>
+                <a:cxn ang="0">
+                  <a:pos x="connsiteX4" y="connsiteY4"/>
+                </a:cxn>
+                <a:cxn ang="0">
+                  <a:pos x="connsiteX5" y="connsiteY5"/>
+                </a:cxn>
+              </a:cxnLst>
+              <a:rect l="l" t="t" r="r" b="b"/>
+              <a:pathLst>
+                <a:path w="576496" h="874400">
+                  <a:moveTo>
+                    <a:pt x="0" y="213360"/>
+                  </a:moveTo>
+                  <a:lnTo>
+                    <a:pt x="121920" y="0"/>
+                  </a:lnTo>
+                  <a:lnTo>
+                    <a:pt x="576496" y="10304"/>
+                  </a:lnTo>
+                  <a:lnTo>
+                    <a:pt x="576496" y="874400"/>
+                  </a:lnTo>
+                  <a:lnTo>
+                    <a:pt x="432" y="874400"/>
+                  </a:lnTo>
+                  <a:lnTo>
+                    <a:pt x="0" y="213360"/>
+                  </a:lnTo>
+                  <a:close/>
+                </a:path>
+              </a:pathLst>
+            </a:custGeom>
+            <a:ln w="9525"/>
+            <a:effectLst/>
+          </p:spPr>
+          <p:style>
+            <a:lnRef idx="2">
+              <a:schemeClr val="accent3">
+                <a:shade val="50000"/>
+              </a:schemeClr>
+            </a:lnRef>
+            <a:fillRef idx="1">
+              <a:schemeClr val="accent3"/>
+            </a:fillRef>
+            <a:effectRef idx="0">
+              <a:schemeClr val="accent3"/>
+            </a:effectRef>
+            <a:fontRef idx="minor">
+              <a:schemeClr val="lt1"/>
+            </a:fontRef>
+          </p:style>
+          <p:txBody>
+            <a:bodyPr rtlCol="0" anchor="ctr"/>
+            <a:lstStyle/>
+            <a:p>
+              <a:pPr algn="ctr"/>
+              <a:endParaRPr lang="pl-PL"/>
+            </a:p>
+          </p:txBody>
+        </p:sp>
+        <p:sp>
+          <p:nvSpPr>
+            <p:cNvPr id="22" name="pole tekstowe 21"/>
+            <p:cNvSpPr txBox="1"/>
+            <p:nvPr/>
+          </p:nvSpPr>
+          <p:spPr>
+            <a:xfrm>
+              <a:off x="5436096" y="2200300"/>
+              <a:ext cx="792088" cy="646331"/>
+            </a:xfrm>
+            <a:prstGeom prst="rect">
+              <a:avLst/>
+            </a:prstGeom>
+            <a:noFill/>
+          </p:spPr>
+          <p:txBody>
+            <a:bodyPr wrap="square" rtlCol="0">
+              <a:spAutoFit/>
+            </a:bodyPr>
+            <a:lstStyle/>
+            <a:p>
+              <a:pPr algn="ctr"/>
+              <a:r>
+                <a:rPr lang="pl-PL" dirty="0" err="1" smtClean="0"/>
+                <a:t>ImageN</a:t>
+              </a:r>
+              <a:r>
+                <a:rPr lang="pl-PL" dirty="0" smtClean="0"/>
+                <a:t> </a:t>
+              </a:r>
+              <a:endParaRPr lang="pl-PL" dirty="0"/>
+            </a:p>
+          </p:txBody>
+        </p:sp>
+      </p:grpSp>
+      <p:sp>
+        <p:nvSpPr>
+          <p:cNvPr id="23" name="Prostokąt 22"/>
+          <p:cNvSpPr/>
+          <p:nvPr/>
+        </p:nvSpPr>
+        <p:spPr>
+          <a:xfrm>
+            <a:off x="2915816" y="4797152"/>
+            <a:ext cx="2016224" cy="1080120"/>
+          </a:xfrm>
+          <a:prstGeom prst="rect">
+            <a:avLst/>
+          </a:prstGeom>
+          <a:ln w="76200">
+            <a:solidFill>
+              <a:srgbClr val="00B0F0"/>
+            </a:solidFill>
+          </a:ln>
+          <a:effectLst>
+            <a:outerShdw blurRad="50800" dist="38100" algn="l" rotWithShape="0">
+              <a:prstClr val="black">
+                <a:alpha val="40000"/>
+              </a:prstClr>
+            </a:outerShdw>
+          </a:effectLst>
+        </p:spPr>
+        <p:style>
+          <a:lnRef idx="1">
+            <a:schemeClr val="accent1"/>
+          </a:lnRef>
+          <a:fillRef idx="2">
+            <a:schemeClr val="accent1"/>
+          </a:fillRef>
+          <a:effectRef idx="1">
+            <a:schemeClr val="accent1"/>
+          </a:effectRef>
+          <a:fontRef idx="minor">
+            <a:schemeClr val="dk1"/>
+          </a:fontRef>
+        </p:style>
+        <p:txBody>
+          <a:bodyPr rtlCol="0" anchor="ctr"/>
+          <a:lstStyle/>
+          <a:p>
+            <a:pPr algn="ctr"/>
+            <a:r>
+              <a:rPr lang="en-US" dirty="0" smtClean="0"/>
+              <a:t>Verifier</a:t>
+            </a:r>
+            <a:endParaRPr lang="en-US" dirty="0"/>
+          </a:p>
+        </p:txBody>
+      </p:sp>
+      <p:grpSp>
+        <p:nvGrpSpPr>
+          <p:cNvPr id="24" name="Grupa 23"/>
+          <p:cNvGrpSpPr/>
+          <p:nvPr/>
+        </p:nvGrpSpPr>
+        <p:grpSpPr>
+          <a:xfrm>
+            <a:off x="5436096" y="1700808"/>
+            <a:ext cx="864096" cy="1147564"/>
+            <a:chOff x="5436096" y="1844824"/>
+            <a:chExt cx="864096" cy="1147564"/>
+          </a:xfrm>
+          <a:effectLst>
+            <a:outerShdw blurRad="50800" dist="38100" algn="l" rotWithShape="0">
+              <a:prstClr val="black">
+                <a:alpha val="40000"/>
+              </a:prstClr>
+            </a:outerShdw>
+          </a:effectLst>
+        </p:grpSpPr>
+        <p:sp>
+          <p:nvSpPr>
+            <p:cNvPr id="25" name="Prostokąt 3"/>
+            <p:cNvSpPr/>
+            <p:nvPr/>
+          </p:nvSpPr>
+          <p:spPr>
+            <a:xfrm>
+              <a:off x="5508104" y="1844824"/>
+              <a:ext cx="792088" cy="1080120"/>
+            </a:xfrm>
+            <a:custGeom>
+              <a:avLst/>
+              <a:gdLst>
+                <a:gd name="connsiteX0" fmla="*/ 0 w 576064"/>
+                <a:gd name="connsiteY0" fmla="*/ 0 h 864096"/>
+                <a:gd name="connsiteX1" fmla="*/ 576064 w 576064"/>
+                <a:gd name="connsiteY1" fmla="*/ 0 h 864096"/>
+                <a:gd name="connsiteX2" fmla="*/ 576064 w 576064"/>
+                <a:gd name="connsiteY2" fmla="*/ 864096 h 864096"/>
+                <a:gd name="connsiteX3" fmla="*/ 0 w 576064"/>
+                <a:gd name="connsiteY3" fmla="*/ 864096 h 864096"/>
+                <a:gd name="connsiteX4" fmla="*/ 0 w 576064"/>
+                <a:gd name="connsiteY4" fmla="*/ 0 h 864096"/>
+                <a:gd name="connsiteX0" fmla="*/ 432 w 576496"/>
+                <a:gd name="connsiteY0" fmla="*/ 0 h 864096"/>
+                <a:gd name="connsiteX1" fmla="*/ 576496 w 576496"/>
+                <a:gd name="connsiteY1" fmla="*/ 0 h 864096"/>
+                <a:gd name="connsiteX2" fmla="*/ 576496 w 576496"/>
+                <a:gd name="connsiteY2" fmla="*/ 864096 h 864096"/>
+                <a:gd name="connsiteX3" fmla="*/ 432 w 576496"/>
+                <a:gd name="connsiteY3" fmla="*/ 864096 h 864096"/>
+                <a:gd name="connsiteX4" fmla="*/ 0 w 576496"/>
+                <a:gd name="connsiteY4" fmla="*/ 355456 h 864096"/>
+                <a:gd name="connsiteX5" fmla="*/ 432 w 576496"/>
+                <a:gd name="connsiteY5" fmla="*/ 0 h 864096"/>
+                <a:gd name="connsiteX0" fmla="*/ 432 w 576496"/>
+                <a:gd name="connsiteY0" fmla="*/ 10304 h 874400"/>
+                <a:gd name="connsiteX1" fmla="*/ 243840 w 576496"/>
+                <a:gd name="connsiteY1" fmla="*/ 0 h 874400"/>
+                <a:gd name="connsiteX2" fmla="*/ 576496 w 576496"/>
+                <a:gd name="connsiteY2" fmla="*/ 10304 h 874400"/>
+                <a:gd name="connsiteX3" fmla="*/ 576496 w 576496"/>
+                <a:gd name="connsiteY3" fmla="*/ 874400 h 874400"/>
+                <a:gd name="connsiteX4" fmla="*/ 432 w 576496"/>
+                <a:gd name="connsiteY4" fmla="*/ 874400 h 874400"/>
+                <a:gd name="connsiteX5" fmla="*/ 0 w 576496"/>
+                <a:gd name="connsiteY5" fmla="*/ 365760 h 874400"/>
+                <a:gd name="connsiteX6" fmla="*/ 432 w 576496"/>
+                <a:gd name="connsiteY6" fmla="*/ 10304 h 874400"/>
+                <a:gd name="connsiteX0" fmla="*/ 0 w 576496"/>
+                <a:gd name="connsiteY0" fmla="*/ 365760 h 874400"/>
+                <a:gd name="connsiteX1" fmla="*/ 243840 w 576496"/>
+                <a:gd name="connsiteY1" fmla="*/ 0 h 874400"/>
+                <a:gd name="connsiteX2" fmla="*/ 576496 w 576496"/>
+                <a:gd name="connsiteY2" fmla="*/ 10304 h 874400"/>
+                <a:gd name="connsiteX3" fmla="*/ 576496 w 576496"/>
+                <a:gd name="connsiteY3" fmla="*/ 874400 h 874400"/>
+                <a:gd name="connsiteX4" fmla="*/ 432 w 576496"/>
+                <a:gd name="connsiteY4" fmla="*/ 874400 h 874400"/>
+                <a:gd name="connsiteX5" fmla="*/ 0 w 576496"/>
+                <a:gd name="connsiteY5" fmla="*/ 365760 h 874400"/>
+                <a:gd name="connsiteX0" fmla="*/ 0 w 576496"/>
+                <a:gd name="connsiteY0" fmla="*/ 213360 h 874400"/>
+                <a:gd name="connsiteX1" fmla="*/ 243840 w 576496"/>
+                <a:gd name="connsiteY1" fmla="*/ 0 h 874400"/>
+                <a:gd name="connsiteX2" fmla="*/ 576496 w 576496"/>
+                <a:gd name="connsiteY2" fmla="*/ 10304 h 874400"/>
+                <a:gd name="connsiteX3" fmla="*/ 576496 w 576496"/>
+                <a:gd name="connsiteY3" fmla="*/ 874400 h 874400"/>
+                <a:gd name="connsiteX4" fmla="*/ 432 w 576496"/>
+                <a:gd name="connsiteY4" fmla="*/ 874400 h 874400"/>
+                <a:gd name="connsiteX5" fmla="*/ 0 w 576496"/>
+                <a:gd name="connsiteY5" fmla="*/ 213360 h 874400"/>
+                <a:gd name="connsiteX0" fmla="*/ 0 w 576496"/>
+                <a:gd name="connsiteY0" fmla="*/ 213360 h 874400"/>
+                <a:gd name="connsiteX1" fmla="*/ 121920 w 576496"/>
+                <a:gd name="connsiteY1" fmla="*/ 0 h 874400"/>
+                <a:gd name="connsiteX2" fmla="*/ 576496 w 576496"/>
+                <a:gd name="connsiteY2" fmla="*/ 10304 h 874400"/>
+                <a:gd name="connsiteX3" fmla="*/ 576496 w 576496"/>
+                <a:gd name="connsiteY3" fmla="*/ 874400 h 874400"/>
+                <a:gd name="connsiteX4" fmla="*/ 432 w 576496"/>
+                <a:gd name="connsiteY4" fmla="*/ 874400 h 874400"/>
+                <a:gd name="connsiteX5" fmla="*/ 0 w 576496"/>
+                <a:gd name="connsiteY5" fmla="*/ 213360 h 874400"/>
+              </a:gdLst>
+              <a:ahLst/>
+              <a:cxnLst>
+                <a:cxn ang="0">
+                  <a:pos x="connsiteX0" y="connsiteY0"/>
+                </a:cxn>
+                <a:cxn ang="0">
+                  <a:pos x="connsiteX1" y="connsiteY1"/>
+                </a:cxn>
+                <a:cxn ang="0">
+                  <a:pos x="connsiteX2" y="connsiteY2"/>
+                </a:cxn>
+                <a:cxn ang="0">
+                  <a:pos x="connsiteX3" y="connsiteY3"/>
+                </a:cxn>
+                <a:cxn ang="0">
+                  <a:pos x="connsiteX4" y="connsiteY4"/>
+                </a:cxn>
+                <a:cxn ang="0">
+                  <a:pos x="connsiteX5" y="connsiteY5"/>
+                </a:cxn>
+              </a:cxnLst>
+              <a:rect l="l" t="t" r="r" b="b"/>
+              <a:pathLst>
+                <a:path w="576496" h="874400">
+                  <a:moveTo>
+                    <a:pt x="0" y="213360"/>
+                  </a:moveTo>
+                  <a:lnTo>
+                    <a:pt x="121920" y="0"/>
+                  </a:lnTo>
+                  <a:lnTo>
+                    <a:pt x="576496" y="10304"/>
+                  </a:lnTo>
+                  <a:lnTo>
+                    <a:pt x="576496" y="874400"/>
+                  </a:lnTo>
+                  <a:lnTo>
+                    <a:pt x="432" y="874400"/>
+                  </a:lnTo>
+                  <a:lnTo>
+                    <a:pt x="0" y="213360"/>
+                  </a:lnTo>
+                  <a:close/>
+                </a:path>
+              </a:pathLst>
+            </a:custGeom>
+            <a:ln w="9525"/>
+            <a:effectLst/>
+          </p:spPr>
+          <p:style>
+            <a:lnRef idx="2">
+              <a:schemeClr val="accent1">
+                <a:shade val="50000"/>
+              </a:schemeClr>
+            </a:lnRef>
+            <a:fillRef idx="1">
+              <a:schemeClr val="accent1"/>
+            </a:fillRef>
+            <a:effectRef idx="0">
+              <a:schemeClr val="accent1"/>
+            </a:effectRef>
+            <a:fontRef idx="minor">
+              <a:schemeClr val="lt1"/>
+            </a:fontRef>
+          </p:style>
+          <p:txBody>
+            <a:bodyPr rtlCol="0" anchor="ctr"/>
+            <a:lstStyle/>
+            <a:p>
+              <a:pPr algn="ctr"/>
+              <a:endParaRPr lang="pl-PL"/>
+            </a:p>
+          </p:txBody>
+        </p:sp>
+        <p:sp>
+          <p:nvSpPr>
+            <p:cNvPr id="26" name="Prostokąt 3"/>
+            <p:cNvSpPr/>
+            <p:nvPr/>
+          </p:nvSpPr>
+          <p:spPr>
+            <a:xfrm>
+              <a:off x="5436096" y="1912268"/>
+              <a:ext cx="792088" cy="1080120"/>
+            </a:xfrm>
+            <a:custGeom>
+              <a:avLst/>
+              <a:gdLst>
+                <a:gd name="connsiteX0" fmla="*/ 0 w 576064"/>
+                <a:gd name="connsiteY0" fmla="*/ 0 h 864096"/>
+                <a:gd name="connsiteX1" fmla="*/ 576064 w 576064"/>
+                <a:gd name="connsiteY1" fmla="*/ 0 h 864096"/>
+                <a:gd name="connsiteX2" fmla="*/ 576064 w 576064"/>
+                <a:gd name="connsiteY2" fmla="*/ 864096 h 864096"/>
+                <a:gd name="connsiteX3" fmla="*/ 0 w 576064"/>
+                <a:gd name="connsiteY3" fmla="*/ 864096 h 864096"/>
+                <a:gd name="connsiteX4" fmla="*/ 0 w 576064"/>
+                <a:gd name="connsiteY4" fmla="*/ 0 h 864096"/>
+                <a:gd name="connsiteX0" fmla="*/ 432 w 576496"/>
+                <a:gd name="connsiteY0" fmla="*/ 0 h 864096"/>
+                <a:gd name="connsiteX1" fmla="*/ 576496 w 576496"/>
+                <a:gd name="connsiteY1" fmla="*/ 0 h 864096"/>
+                <a:gd name="connsiteX2" fmla="*/ 576496 w 576496"/>
+                <a:gd name="connsiteY2" fmla="*/ 864096 h 864096"/>
+                <a:gd name="connsiteX3" fmla="*/ 432 w 576496"/>
+                <a:gd name="connsiteY3" fmla="*/ 864096 h 864096"/>
+                <a:gd name="connsiteX4" fmla="*/ 0 w 576496"/>
+                <a:gd name="connsiteY4" fmla="*/ 355456 h 864096"/>
+                <a:gd name="connsiteX5" fmla="*/ 432 w 576496"/>
+                <a:gd name="connsiteY5" fmla="*/ 0 h 864096"/>
+                <a:gd name="connsiteX0" fmla="*/ 432 w 576496"/>
+                <a:gd name="connsiteY0" fmla="*/ 10304 h 874400"/>
+                <a:gd name="connsiteX1" fmla="*/ 243840 w 576496"/>
+                <a:gd name="connsiteY1" fmla="*/ 0 h 874400"/>
+                <a:gd name="connsiteX2" fmla="*/ 576496 w 576496"/>
+                <a:gd name="connsiteY2" fmla="*/ 10304 h 874400"/>
+                <a:gd name="connsiteX3" fmla="*/ 576496 w 576496"/>
+                <a:gd name="connsiteY3" fmla="*/ 874400 h 874400"/>
+                <a:gd name="connsiteX4" fmla="*/ 432 w 576496"/>
+                <a:gd name="connsiteY4" fmla="*/ 874400 h 874400"/>
+                <a:gd name="connsiteX5" fmla="*/ 0 w 576496"/>
+                <a:gd name="connsiteY5" fmla="*/ 365760 h 874400"/>
+                <a:gd name="connsiteX6" fmla="*/ 432 w 576496"/>
+                <a:gd name="connsiteY6" fmla="*/ 10304 h 874400"/>
+                <a:gd name="connsiteX0" fmla="*/ 0 w 576496"/>
+                <a:gd name="connsiteY0" fmla="*/ 365760 h 874400"/>
+                <a:gd name="connsiteX1" fmla="*/ 243840 w 576496"/>
+                <a:gd name="connsiteY1" fmla="*/ 0 h 874400"/>
+                <a:gd name="connsiteX2" fmla="*/ 576496 w 576496"/>
+                <a:gd name="connsiteY2" fmla="*/ 10304 h 874400"/>
+                <a:gd name="connsiteX3" fmla="*/ 576496 w 576496"/>
+                <a:gd name="connsiteY3" fmla="*/ 874400 h 874400"/>
+                <a:gd name="connsiteX4" fmla="*/ 432 w 576496"/>
+                <a:gd name="connsiteY4" fmla="*/ 874400 h 874400"/>
+                <a:gd name="connsiteX5" fmla="*/ 0 w 576496"/>
+                <a:gd name="connsiteY5" fmla="*/ 365760 h 874400"/>
+                <a:gd name="connsiteX0" fmla="*/ 0 w 576496"/>
+                <a:gd name="connsiteY0" fmla="*/ 213360 h 874400"/>
+                <a:gd name="connsiteX1" fmla="*/ 243840 w 576496"/>
+                <a:gd name="connsiteY1" fmla="*/ 0 h 874400"/>
+                <a:gd name="connsiteX2" fmla="*/ 576496 w 576496"/>
+                <a:gd name="connsiteY2" fmla="*/ 10304 h 874400"/>
+                <a:gd name="connsiteX3" fmla="*/ 576496 w 576496"/>
+                <a:gd name="connsiteY3" fmla="*/ 874400 h 874400"/>
+                <a:gd name="connsiteX4" fmla="*/ 432 w 576496"/>
+                <a:gd name="connsiteY4" fmla="*/ 874400 h 874400"/>
+                <a:gd name="connsiteX5" fmla="*/ 0 w 576496"/>
+                <a:gd name="connsiteY5" fmla="*/ 213360 h 874400"/>
+                <a:gd name="connsiteX0" fmla="*/ 0 w 576496"/>
+                <a:gd name="connsiteY0" fmla="*/ 213360 h 874400"/>
+                <a:gd name="connsiteX1" fmla="*/ 121920 w 576496"/>
+                <a:gd name="connsiteY1" fmla="*/ 0 h 874400"/>
+                <a:gd name="connsiteX2" fmla="*/ 576496 w 576496"/>
+                <a:gd name="connsiteY2" fmla="*/ 10304 h 874400"/>
+                <a:gd name="connsiteX3" fmla="*/ 576496 w 576496"/>
+                <a:gd name="connsiteY3" fmla="*/ 874400 h 874400"/>
+                <a:gd name="connsiteX4" fmla="*/ 432 w 576496"/>
+                <a:gd name="connsiteY4" fmla="*/ 874400 h 874400"/>
+                <a:gd name="connsiteX5" fmla="*/ 0 w 576496"/>
+                <a:gd name="connsiteY5" fmla="*/ 213360 h 874400"/>
+              </a:gdLst>
+              <a:ahLst/>
+              <a:cxnLst>
+                <a:cxn ang="0">
+                  <a:pos x="connsiteX0" y="connsiteY0"/>
+                </a:cxn>
+                <a:cxn ang="0">
+                  <a:pos x="connsiteX1" y="connsiteY1"/>
+                </a:cxn>
+                <a:cxn ang="0">
+                  <a:pos x="connsiteX2" y="connsiteY2"/>
+                </a:cxn>
+                <a:cxn ang="0">
+                  <a:pos x="connsiteX3" y="connsiteY3"/>
+                </a:cxn>
+                <a:cxn ang="0">
+                  <a:pos x="connsiteX4" y="connsiteY4"/>
+                </a:cxn>
+                <a:cxn ang="0">
+                  <a:pos x="connsiteX5" y="connsiteY5"/>
+                </a:cxn>
+              </a:cxnLst>
+              <a:rect l="l" t="t" r="r" b="b"/>
+              <a:pathLst>
+                <a:path w="576496" h="874400">
+                  <a:moveTo>
+                    <a:pt x="0" y="213360"/>
+                  </a:moveTo>
+                  <a:lnTo>
+                    <a:pt x="121920" y="0"/>
+                  </a:lnTo>
+                  <a:lnTo>
+                    <a:pt x="576496" y="10304"/>
+                  </a:lnTo>
+                  <a:lnTo>
+                    <a:pt x="576496" y="874400"/>
+                  </a:lnTo>
+                  <a:lnTo>
+                    <a:pt x="432" y="874400"/>
+                  </a:lnTo>
+                  <a:lnTo>
+                    <a:pt x="0" y="213360"/>
+                  </a:lnTo>
+                  <a:close/>
+                </a:path>
+              </a:pathLst>
+            </a:custGeom>
+            <a:ln w="9525"/>
+            <a:effectLst/>
+          </p:spPr>
+          <p:style>
+            <a:lnRef idx="2">
+              <a:schemeClr val="accent3">
+                <a:shade val="50000"/>
+              </a:schemeClr>
+            </a:lnRef>
+            <a:fillRef idx="1">
+              <a:schemeClr val="accent3"/>
+            </a:fillRef>
+            <a:effectRef idx="0">
+              <a:schemeClr val="accent3"/>
+            </a:effectRef>
+            <a:fontRef idx="minor">
+              <a:schemeClr val="lt1"/>
+            </a:fontRef>
+          </p:style>
+          <p:txBody>
+            <a:bodyPr rtlCol="0" anchor="ctr"/>
+            <a:lstStyle/>
+            <a:p>
+              <a:pPr algn="ctr"/>
+              <a:endParaRPr lang="pl-PL"/>
+            </a:p>
+          </p:txBody>
+        </p:sp>
+        <p:sp>
+          <p:nvSpPr>
+            <p:cNvPr id="27" name="pole tekstowe 26"/>
+            <p:cNvSpPr txBox="1"/>
+            <p:nvPr/>
+          </p:nvSpPr>
+          <p:spPr>
+            <a:xfrm>
+              <a:off x="5436096" y="2187146"/>
+              <a:ext cx="792088" cy="646331"/>
+            </a:xfrm>
+            <a:prstGeom prst="rect">
+              <a:avLst/>
+            </a:prstGeom>
+            <a:noFill/>
+          </p:spPr>
+          <p:txBody>
+            <a:bodyPr wrap="square" rtlCol="0">
+              <a:spAutoFit/>
+            </a:bodyPr>
+            <a:lstStyle/>
+            <a:p>
+              <a:pPr algn="ctr"/>
+              <a:r>
+                <a:rPr lang="pl-PL" dirty="0" smtClean="0"/>
+                <a:t>Image1 </a:t>
+              </a:r>
+              <a:endParaRPr lang="pl-PL" dirty="0"/>
+            </a:p>
+          </p:txBody>
+        </p:sp>
+      </p:grpSp>
+      <p:sp>
+        <p:nvSpPr>
+          <p:cNvPr id="30" name="Prostokąt 3"/>
+          <p:cNvSpPr/>
+          <p:nvPr/>
+        </p:nvSpPr>
+        <p:spPr>
+          <a:xfrm>
+            <a:off x="6588224" y="3573016"/>
+            <a:ext cx="792088" cy="1080120"/>
+          </a:xfrm>
+          <a:custGeom>
+            <a:avLst/>
+            <a:gdLst>
+              <a:gd name="connsiteX0" fmla="*/ 0 w 576064"/>
+              <a:gd name="connsiteY0" fmla="*/ 0 h 864096"/>
+              <a:gd name="connsiteX1" fmla="*/ 576064 w 576064"/>
+              <a:gd name="connsiteY1" fmla="*/ 0 h 864096"/>
+              <a:gd name="connsiteX2" fmla="*/ 576064 w 576064"/>
+              <a:gd name="connsiteY2" fmla="*/ 864096 h 864096"/>
+              <a:gd name="connsiteX3" fmla="*/ 0 w 576064"/>
+              <a:gd name="connsiteY3" fmla="*/ 864096 h 864096"/>
+              <a:gd name="connsiteX4" fmla="*/ 0 w 576064"/>
+              <a:gd name="connsiteY4" fmla="*/ 0 h 864096"/>
+              <a:gd name="connsiteX0" fmla="*/ 432 w 576496"/>
+              <a:gd name="connsiteY0" fmla="*/ 0 h 864096"/>
+              <a:gd name="connsiteX1" fmla="*/ 576496 w 576496"/>
+              <a:gd name="connsiteY1" fmla="*/ 0 h 864096"/>
+              <a:gd name="connsiteX2" fmla="*/ 576496 w 576496"/>
+              <a:gd name="connsiteY2" fmla="*/ 864096 h 864096"/>
+              <a:gd name="connsiteX3" fmla="*/ 432 w 576496"/>
+              <a:gd name="connsiteY3" fmla="*/ 864096 h 864096"/>
+              <a:gd name="connsiteX4" fmla="*/ 0 w 576496"/>
+              <a:gd name="connsiteY4" fmla="*/ 355456 h 864096"/>
+              <a:gd name="connsiteX5" fmla="*/ 432 w 576496"/>
+              <a:gd name="connsiteY5" fmla="*/ 0 h 864096"/>
+              <a:gd name="connsiteX0" fmla="*/ 432 w 576496"/>
+              <a:gd name="connsiteY0" fmla="*/ 10304 h 874400"/>
+              <a:gd name="connsiteX1" fmla="*/ 243840 w 576496"/>
+              <a:gd name="connsiteY1" fmla="*/ 0 h 874400"/>
+              <a:gd name="connsiteX2" fmla="*/ 576496 w 576496"/>
+              <a:gd name="connsiteY2" fmla="*/ 10304 h 874400"/>
+              <a:gd name="connsiteX3" fmla="*/ 576496 w 576496"/>
+              <a:gd name="connsiteY3" fmla="*/ 874400 h 874400"/>
+              <a:gd name="connsiteX4" fmla="*/ 432 w 576496"/>
+              <a:gd name="connsiteY4" fmla="*/ 874400 h 874400"/>
+              <a:gd name="connsiteX5" fmla="*/ 0 w 576496"/>
+              <a:gd name="connsiteY5" fmla="*/ 365760 h 874400"/>
+              <a:gd name="connsiteX6" fmla="*/ 432 w 576496"/>
+              <a:gd name="connsiteY6" fmla="*/ 10304 h 874400"/>
+              <a:gd name="connsiteX0" fmla="*/ 0 w 576496"/>
+              <a:gd name="connsiteY0" fmla="*/ 365760 h 874400"/>
+              <a:gd name="connsiteX1" fmla="*/ 243840 w 576496"/>
+              <a:gd name="connsiteY1" fmla="*/ 0 h 874400"/>
+              <a:gd name="connsiteX2" fmla="*/ 576496 w 576496"/>
+              <a:gd name="connsiteY2" fmla="*/ 10304 h 874400"/>
+              <a:gd name="connsiteX3" fmla="*/ 576496 w 576496"/>
+              <a:gd name="connsiteY3" fmla="*/ 874400 h 874400"/>
+              <a:gd name="connsiteX4" fmla="*/ 432 w 576496"/>
+              <a:gd name="connsiteY4" fmla="*/ 874400 h 874400"/>
+              <a:gd name="connsiteX5" fmla="*/ 0 w 576496"/>
+              <a:gd name="connsiteY5" fmla="*/ 365760 h 874400"/>
+              <a:gd name="connsiteX0" fmla="*/ 0 w 576496"/>
+              <a:gd name="connsiteY0" fmla="*/ 213360 h 874400"/>
+              <a:gd name="connsiteX1" fmla="*/ 243840 w 576496"/>
+              <a:gd name="connsiteY1" fmla="*/ 0 h 874400"/>
+              <a:gd name="connsiteX2" fmla="*/ 576496 w 576496"/>
+              <a:gd name="connsiteY2" fmla="*/ 10304 h 874400"/>
+              <a:gd name="connsiteX3" fmla="*/ 576496 w 576496"/>
+              <a:gd name="connsiteY3" fmla="*/ 874400 h 874400"/>
+              <a:gd name="connsiteX4" fmla="*/ 432 w 576496"/>
+              <a:gd name="connsiteY4" fmla="*/ 874400 h 874400"/>
+              <a:gd name="connsiteX5" fmla="*/ 0 w 576496"/>
+              <a:gd name="connsiteY5" fmla="*/ 213360 h 874400"/>
+              <a:gd name="connsiteX0" fmla="*/ 0 w 576496"/>
+              <a:gd name="connsiteY0" fmla="*/ 213360 h 874400"/>
+              <a:gd name="connsiteX1" fmla="*/ 121920 w 576496"/>
+              <a:gd name="connsiteY1" fmla="*/ 0 h 874400"/>
+              <a:gd name="connsiteX2" fmla="*/ 576496 w 576496"/>
+              <a:gd name="connsiteY2" fmla="*/ 10304 h 874400"/>
+              <a:gd name="connsiteX3" fmla="*/ 576496 w 576496"/>
+              <a:gd name="connsiteY3" fmla="*/ 874400 h 874400"/>
+              <a:gd name="connsiteX4" fmla="*/ 432 w 576496"/>
+              <a:gd name="connsiteY4" fmla="*/ 874400 h 874400"/>
+              <a:gd name="connsiteX5" fmla="*/ 0 w 576496"/>
+              <a:gd name="connsiteY5" fmla="*/ 213360 h 874400"/>
+            </a:gdLst>
+            <a:ahLst/>
+            <a:cxnLst>
+              <a:cxn ang="0">
+                <a:pos x="connsiteX0" y="connsiteY0"/>
+              </a:cxn>
+              <a:cxn ang="0">
+                <a:pos x="connsiteX1" y="connsiteY1"/>
+              </a:cxn>
+              <a:cxn ang="0">
+                <a:pos x="connsiteX2" y="connsiteY2"/>
+              </a:cxn>
+              <a:cxn ang="0">
+                <a:pos x="connsiteX3" y="connsiteY3"/>
+              </a:cxn>
+              <a:cxn ang="0">
+                <a:pos x="connsiteX4" y="connsiteY4"/>
+              </a:cxn>
+              <a:cxn ang="0">
+                <a:pos x="connsiteX5" y="connsiteY5"/>
+              </a:cxn>
+            </a:cxnLst>
+            <a:rect l="l" t="t" r="r" b="b"/>
+            <a:pathLst>
+              <a:path w="576496" h="874400">
+                <a:moveTo>
+                  <a:pt x="0" y="213360"/>
+                </a:moveTo>
+                <a:lnTo>
+                  <a:pt x="121920" y="0"/>
+                </a:lnTo>
+                <a:lnTo>
+                  <a:pt x="576496" y="10304"/>
+                </a:lnTo>
+                <a:lnTo>
+                  <a:pt x="576496" y="874400"/>
+                </a:lnTo>
+                <a:lnTo>
+                  <a:pt x="432" y="874400"/>
+                </a:lnTo>
+                <a:lnTo>
+                  <a:pt x="0" y="213360"/>
+                </a:lnTo>
+                <a:close/>
+              </a:path>
+            </a:pathLst>
+          </a:custGeom>
+          <a:solidFill>
+            <a:schemeClr val="accent3"/>
+          </a:solidFill>
+          <a:ln w="76200">
+            <a:solidFill>
+              <a:srgbClr val="00B0F0"/>
+            </a:solidFill>
+          </a:ln>
+          <a:effectLst>
+            <a:outerShdw blurRad="50800" dist="38100" algn="l" rotWithShape="0">
+              <a:prstClr val="black">
+                <a:alpha val="40000"/>
+              </a:prstClr>
+            </a:outerShdw>
+          </a:effectLst>
+        </p:spPr>
+        <p:style>
+          <a:lnRef idx="2">
+            <a:schemeClr val="accent3">
+              <a:shade val="50000"/>
+            </a:schemeClr>
+          </a:lnRef>
+          <a:fillRef idx="1">
+            <a:schemeClr val="accent3"/>
+          </a:fillRef>
+          <a:effectRef idx="0">
+            <a:schemeClr val="accent3"/>
+          </a:effectRef>
+          <a:fontRef idx="minor">
+            <a:schemeClr val="lt1"/>
+          </a:fontRef>
+        </p:style>
+        <p:txBody>
+          <a:bodyPr rtlCol="0" anchor="ctr"/>
+          <a:lstStyle/>
+          <a:p>
+            <a:pPr algn="ctr"/>
+            <a:endParaRPr lang="pl-PL"/>
+          </a:p>
+        </p:txBody>
+      </p:sp>
+      <p:sp>
+        <p:nvSpPr>
+          <p:cNvPr id="31" name="pole tekstowe 30"/>
+          <p:cNvSpPr txBox="1"/>
+          <p:nvPr/>
+        </p:nvSpPr>
+        <p:spPr>
+          <a:xfrm>
+            <a:off x="6624228" y="3850078"/>
+            <a:ext cx="756084" cy="615553"/>
+          </a:xfrm>
+          <a:prstGeom prst="rect">
+            <a:avLst/>
+          </a:prstGeom>
+          <a:noFill/>
+        </p:spPr>
+        <p:txBody>
+          <a:bodyPr wrap="square" rtlCol="0">
+            <a:spAutoFit/>
+          </a:bodyPr>
+          <a:lstStyle/>
+          <a:p>
+            <a:pPr algn="ctr"/>
+            <a:r>
+              <a:rPr lang="pl-PL" sz="1700" dirty="0" err="1" smtClean="0"/>
+              <a:t>ImageTest</a:t>
+            </a:r>
+            <a:endParaRPr lang="pl-PL" sz="1700" dirty="0"/>
+          </a:p>
+        </p:txBody>
+      </p:sp>
+      <p:cxnSp>
+        <p:nvCxnSpPr>
+          <p:cNvPr id="32" name="Łącznik prosty ze strzałką 107"/>
+          <p:cNvCxnSpPr>
+            <a:endCxn id="35" idx="3"/>
+          </p:cNvCxnSpPr>
+          <p:nvPr/>
+        </p:nvCxnSpPr>
+        <p:spPr>
+          <a:xfrm rot="5400000">
+            <a:off x="6602469" y="3637129"/>
+            <a:ext cx="2570149" cy="1014462"/>
+          </a:xfrm>
+          <a:prstGeom prst="bentConnector2">
+            <a:avLst/>
+          </a:prstGeom>
+          <a:ln w="19050">
+            <a:tailEnd type="arrow"/>
+          </a:ln>
+        </p:spPr>
+        <p:style>
+          <a:lnRef idx="1">
+            <a:schemeClr val="accent6"/>
+          </a:lnRef>
+          <a:fillRef idx="0">
+            <a:schemeClr val="accent6"/>
+          </a:fillRef>
+          <a:effectRef idx="0">
+            <a:schemeClr val="accent6"/>
+          </a:effectRef>
+          <a:fontRef idx="minor">
+            <a:schemeClr val="tx1"/>
+          </a:fontRef>
+        </p:style>
+      </p:cxnSp>
+      <p:sp>
+        <p:nvSpPr>
+          <p:cNvPr id="34" name="Prostokąt 3"/>
+          <p:cNvSpPr/>
+          <p:nvPr/>
+        </p:nvSpPr>
+        <p:spPr>
+          <a:xfrm>
+            <a:off x="6588224" y="4823052"/>
+            <a:ext cx="792088" cy="1080120"/>
+          </a:xfrm>
+          <a:custGeom>
+            <a:avLst/>
+            <a:gdLst>
+              <a:gd name="connsiteX0" fmla="*/ 0 w 576064"/>
+              <a:gd name="connsiteY0" fmla="*/ 0 h 864096"/>
+              <a:gd name="connsiteX1" fmla="*/ 576064 w 576064"/>
+              <a:gd name="connsiteY1" fmla="*/ 0 h 864096"/>
+              <a:gd name="connsiteX2" fmla="*/ 576064 w 576064"/>
+              <a:gd name="connsiteY2" fmla="*/ 864096 h 864096"/>
+              <a:gd name="connsiteX3" fmla="*/ 0 w 576064"/>
+              <a:gd name="connsiteY3" fmla="*/ 864096 h 864096"/>
+              <a:gd name="connsiteX4" fmla="*/ 0 w 576064"/>
+              <a:gd name="connsiteY4" fmla="*/ 0 h 864096"/>
+              <a:gd name="connsiteX0" fmla="*/ 432 w 576496"/>
+              <a:gd name="connsiteY0" fmla="*/ 0 h 864096"/>
+              <a:gd name="connsiteX1" fmla="*/ 576496 w 576496"/>
+              <a:gd name="connsiteY1" fmla="*/ 0 h 864096"/>
+              <a:gd name="connsiteX2" fmla="*/ 576496 w 576496"/>
+              <a:gd name="connsiteY2" fmla="*/ 864096 h 864096"/>
+              <a:gd name="connsiteX3" fmla="*/ 432 w 576496"/>
+              <a:gd name="connsiteY3" fmla="*/ 864096 h 864096"/>
+              <a:gd name="connsiteX4" fmla="*/ 0 w 576496"/>
+              <a:gd name="connsiteY4" fmla="*/ 355456 h 864096"/>
+              <a:gd name="connsiteX5" fmla="*/ 432 w 576496"/>
+              <a:gd name="connsiteY5" fmla="*/ 0 h 864096"/>
+              <a:gd name="connsiteX0" fmla="*/ 432 w 576496"/>
+              <a:gd name="connsiteY0" fmla="*/ 10304 h 874400"/>
+              <a:gd name="connsiteX1" fmla="*/ 243840 w 576496"/>
+              <a:gd name="connsiteY1" fmla="*/ 0 h 874400"/>
+              <a:gd name="connsiteX2" fmla="*/ 576496 w 576496"/>
+              <a:gd name="connsiteY2" fmla="*/ 10304 h 874400"/>
+              <a:gd name="connsiteX3" fmla="*/ 576496 w 576496"/>
+              <a:gd name="connsiteY3" fmla="*/ 874400 h 874400"/>
+              <a:gd name="connsiteX4" fmla="*/ 432 w 576496"/>
+              <a:gd name="connsiteY4" fmla="*/ 874400 h 874400"/>
+              <a:gd name="connsiteX5" fmla="*/ 0 w 576496"/>
+              <a:gd name="connsiteY5" fmla="*/ 365760 h 874400"/>
+              <a:gd name="connsiteX6" fmla="*/ 432 w 576496"/>
+              <a:gd name="connsiteY6" fmla="*/ 10304 h 874400"/>
+              <a:gd name="connsiteX0" fmla="*/ 0 w 576496"/>
+              <a:gd name="connsiteY0" fmla="*/ 365760 h 874400"/>
+              <a:gd name="connsiteX1" fmla="*/ 243840 w 576496"/>
+              <a:gd name="connsiteY1" fmla="*/ 0 h 874400"/>
+              <a:gd name="connsiteX2" fmla="*/ 576496 w 576496"/>
+              <a:gd name="connsiteY2" fmla="*/ 10304 h 874400"/>
+              <a:gd name="connsiteX3" fmla="*/ 576496 w 576496"/>
+              <a:gd name="connsiteY3" fmla="*/ 874400 h 874400"/>
+              <a:gd name="connsiteX4" fmla="*/ 432 w 576496"/>
+              <a:gd name="connsiteY4" fmla="*/ 874400 h 874400"/>
+              <a:gd name="connsiteX5" fmla="*/ 0 w 576496"/>
+              <a:gd name="connsiteY5" fmla="*/ 365760 h 874400"/>
+              <a:gd name="connsiteX0" fmla="*/ 0 w 576496"/>
+              <a:gd name="connsiteY0" fmla="*/ 213360 h 874400"/>
+              <a:gd name="connsiteX1" fmla="*/ 243840 w 576496"/>
+              <a:gd name="connsiteY1" fmla="*/ 0 h 874400"/>
+              <a:gd name="connsiteX2" fmla="*/ 576496 w 576496"/>
+              <a:gd name="connsiteY2" fmla="*/ 10304 h 874400"/>
+              <a:gd name="connsiteX3" fmla="*/ 576496 w 576496"/>
+              <a:gd name="connsiteY3" fmla="*/ 874400 h 874400"/>
+              <a:gd name="connsiteX4" fmla="*/ 432 w 576496"/>
+              <a:gd name="connsiteY4" fmla="*/ 874400 h 874400"/>
+              <a:gd name="connsiteX5" fmla="*/ 0 w 576496"/>
+              <a:gd name="connsiteY5" fmla="*/ 213360 h 874400"/>
+              <a:gd name="connsiteX0" fmla="*/ 0 w 576496"/>
+              <a:gd name="connsiteY0" fmla="*/ 213360 h 874400"/>
+              <a:gd name="connsiteX1" fmla="*/ 121920 w 576496"/>
+              <a:gd name="connsiteY1" fmla="*/ 0 h 874400"/>
+              <a:gd name="connsiteX2" fmla="*/ 576496 w 576496"/>
+              <a:gd name="connsiteY2" fmla="*/ 10304 h 874400"/>
+              <a:gd name="connsiteX3" fmla="*/ 576496 w 576496"/>
+              <a:gd name="connsiteY3" fmla="*/ 874400 h 874400"/>
+              <a:gd name="connsiteX4" fmla="*/ 432 w 576496"/>
+              <a:gd name="connsiteY4" fmla="*/ 874400 h 874400"/>
+              <a:gd name="connsiteX5" fmla="*/ 0 w 576496"/>
+              <a:gd name="connsiteY5" fmla="*/ 213360 h 874400"/>
+            </a:gdLst>
+            <a:ahLst/>
+            <a:cxnLst>
+              <a:cxn ang="0">
+                <a:pos x="connsiteX0" y="connsiteY0"/>
+              </a:cxn>
+              <a:cxn ang="0">
+                <a:pos x="connsiteX1" y="connsiteY1"/>
+              </a:cxn>
+              <a:cxn ang="0">
+                <a:pos x="connsiteX2" y="connsiteY2"/>
+              </a:cxn>
+              <a:cxn ang="0">
+                <a:pos x="connsiteX3" y="connsiteY3"/>
+              </a:cxn>
+              <a:cxn ang="0">
+                <a:pos x="connsiteX4" y="connsiteY4"/>
+              </a:cxn>
+              <a:cxn ang="0">
+                <a:pos x="connsiteX5" y="connsiteY5"/>
+              </a:cxn>
+            </a:cxnLst>
+            <a:rect l="l" t="t" r="r" b="b"/>
+            <a:pathLst>
+              <a:path w="576496" h="874400">
+                <a:moveTo>
+                  <a:pt x="0" y="213360"/>
+                </a:moveTo>
+                <a:lnTo>
+                  <a:pt x="121920" y="0"/>
+                </a:lnTo>
+                <a:lnTo>
+                  <a:pt x="576496" y="10304"/>
+                </a:lnTo>
+                <a:lnTo>
+                  <a:pt x="576496" y="874400"/>
+                </a:lnTo>
+                <a:lnTo>
+                  <a:pt x="432" y="874400"/>
+                </a:lnTo>
+                <a:lnTo>
+                  <a:pt x="0" y="213360"/>
+                </a:lnTo>
+                <a:close/>
+              </a:path>
+            </a:pathLst>
+          </a:custGeom>
+          <a:solidFill>
+            <a:schemeClr val="accent1"/>
+          </a:solidFill>
+          <a:ln w="76200">
+            <a:solidFill>
+              <a:srgbClr val="00B0F0"/>
+            </a:solidFill>
+          </a:ln>
+          <a:effectLst>
+            <a:outerShdw blurRad="50800" dist="38100" algn="l" rotWithShape="0">
+              <a:prstClr val="black">
+                <a:alpha val="40000"/>
+              </a:prstClr>
+            </a:outerShdw>
+          </a:effectLst>
+        </p:spPr>
+        <p:style>
+          <a:lnRef idx="2">
+            <a:schemeClr val="accent3">
+              <a:shade val="50000"/>
+            </a:schemeClr>
+          </a:lnRef>
+          <a:fillRef idx="1">
+            <a:schemeClr val="accent3"/>
+          </a:fillRef>
+          <a:effectRef idx="0">
+            <a:schemeClr val="accent3"/>
+          </a:effectRef>
+          <a:fontRef idx="minor">
+            <a:schemeClr val="lt1"/>
+          </a:fontRef>
+        </p:style>
+        <p:txBody>
+          <a:bodyPr rtlCol="0" anchor="ctr"/>
+          <a:lstStyle/>
+          <a:p>
+            <a:pPr algn="ctr"/>
+            <a:endParaRPr lang="pl-PL"/>
+          </a:p>
+        </p:txBody>
+      </p:sp>
+      <p:sp>
+        <p:nvSpPr>
+          <p:cNvPr id="35" name="pole tekstowe 34"/>
+          <p:cNvSpPr txBox="1"/>
+          <p:nvPr/>
+        </p:nvSpPr>
+        <p:spPr>
+          <a:xfrm>
+            <a:off x="6588224" y="5106269"/>
+            <a:ext cx="792088" cy="646331"/>
+          </a:xfrm>
+          <a:prstGeom prst="rect">
+            <a:avLst/>
+          </a:prstGeom>
+          <a:noFill/>
+        </p:spPr>
+        <p:txBody>
+          <a:bodyPr wrap="square" rtlCol="0">
+            <a:spAutoFit/>
+          </a:bodyPr>
+          <a:lstStyle/>
+          <a:p>
+            <a:pPr algn="ctr"/>
+            <a:r>
+              <a:rPr lang="pl-PL" dirty="0" err="1" smtClean="0"/>
+              <a:t>Pose</a:t>
+            </a:r>
+            <a:r>
+              <a:rPr lang="pl-PL" dirty="0" smtClean="0"/>
+              <a:t> Test</a:t>
+            </a:r>
+            <a:endParaRPr lang="pl-PL" dirty="0"/>
+          </a:p>
+        </p:txBody>
+      </p:sp>
+      <p:cxnSp>
+        <p:nvCxnSpPr>
+          <p:cNvPr id="36" name="Łącznik prosty ze strzałką 35"/>
+          <p:cNvCxnSpPr>
+            <a:stCxn id="31" idx="1"/>
+          </p:cNvCxnSpPr>
+          <p:nvPr/>
+        </p:nvCxnSpPr>
+        <p:spPr>
+          <a:xfrm flipH="1">
+            <a:off x="4968044" y="4157855"/>
+            <a:ext cx="1656184" cy="15389"/>
+          </a:xfrm>
+          <a:prstGeom prst="straightConnector1">
+            <a:avLst/>
+          </a:prstGeom>
+          <a:ln w="19050">
+            <a:tailEnd type="arrow"/>
+          </a:ln>
+        </p:spPr>
+        <p:style>
+          <a:lnRef idx="1">
+            <a:schemeClr val="accent6"/>
+          </a:lnRef>
+          <a:fillRef idx="0">
+            <a:schemeClr val="accent6"/>
+          </a:fillRef>
+          <a:effectRef idx="0">
+            <a:schemeClr val="accent6"/>
+          </a:effectRef>
+          <a:fontRef idx="minor">
+            <a:schemeClr val="tx1"/>
+          </a:fontRef>
+        </p:style>
+      </p:cxnSp>
+      <p:sp>
+        <p:nvSpPr>
+          <p:cNvPr id="37" name="pole tekstowe 36"/>
+          <p:cNvSpPr txBox="1"/>
+          <p:nvPr/>
+        </p:nvSpPr>
+        <p:spPr>
+          <a:xfrm>
+            <a:off x="5562803" y="3810066"/>
+            <a:ext cx="538674" cy="369332"/>
+          </a:xfrm>
+          <a:prstGeom prst="rect">
+            <a:avLst/>
+          </a:prstGeom>
+          <a:noFill/>
+        </p:spPr>
+        <p:txBody>
+          <a:bodyPr wrap="none" rtlCol="0">
+            <a:spAutoFit/>
+          </a:bodyPr>
+          <a:lstStyle/>
+          <a:p>
+            <a:r>
+              <a:rPr lang="pl-PL" i="1" dirty="0" smtClean="0"/>
+              <a:t>test</a:t>
+            </a:r>
+            <a:endParaRPr lang="pl-PL" i="1" dirty="0"/>
+          </a:p>
+        </p:txBody>
+      </p:sp>
+      <p:sp>
+        <p:nvSpPr>
+          <p:cNvPr id="43" name="Prostokąt 3"/>
+          <p:cNvSpPr/>
+          <p:nvPr/>
+        </p:nvSpPr>
+        <p:spPr>
+          <a:xfrm>
+            <a:off x="755576" y="3573016"/>
+            <a:ext cx="792088" cy="1080120"/>
+          </a:xfrm>
+          <a:custGeom>
+            <a:avLst/>
+            <a:gdLst>
+              <a:gd name="connsiteX0" fmla="*/ 0 w 576064"/>
+              <a:gd name="connsiteY0" fmla="*/ 0 h 864096"/>
+              <a:gd name="connsiteX1" fmla="*/ 576064 w 576064"/>
+              <a:gd name="connsiteY1" fmla="*/ 0 h 864096"/>
+              <a:gd name="connsiteX2" fmla="*/ 576064 w 576064"/>
+              <a:gd name="connsiteY2" fmla="*/ 864096 h 864096"/>
+              <a:gd name="connsiteX3" fmla="*/ 0 w 576064"/>
+              <a:gd name="connsiteY3" fmla="*/ 864096 h 864096"/>
+              <a:gd name="connsiteX4" fmla="*/ 0 w 576064"/>
+              <a:gd name="connsiteY4" fmla="*/ 0 h 864096"/>
+              <a:gd name="connsiteX0" fmla="*/ 432 w 576496"/>
+              <a:gd name="connsiteY0" fmla="*/ 0 h 864096"/>
+              <a:gd name="connsiteX1" fmla="*/ 576496 w 576496"/>
+              <a:gd name="connsiteY1" fmla="*/ 0 h 864096"/>
+              <a:gd name="connsiteX2" fmla="*/ 576496 w 576496"/>
+              <a:gd name="connsiteY2" fmla="*/ 864096 h 864096"/>
+              <a:gd name="connsiteX3" fmla="*/ 432 w 576496"/>
+              <a:gd name="connsiteY3" fmla="*/ 864096 h 864096"/>
+              <a:gd name="connsiteX4" fmla="*/ 0 w 576496"/>
+              <a:gd name="connsiteY4" fmla="*/ 355456 h 864096"/>
+              <a:gd name="connsiteX5" fmla="*/ 432 w 576496"/>
+              <a:gd name="connsiteY5" fmla="*/ 0 h 864096"/>
+              <a:gd name="connsiteX0" fmla="*/ 432 w 576496"/>
+              <a:gd name="connsiteY0" fmla="*/ 10304 h 874400"/>
+              <a:gd name="connsiteX1" fmla="*/ 243840 w 576496"/>
+              <a:gd name="connsiteY1" fmla="*/ 0 h 874400"/>
+              <a:gd name="connsiteX2" fmla="*/ 576496 w 576496"/>
+              <a:gd name="connsiteY2" fmla="*/ 10304 h 874400"/>
+              <a:gd name="connsiteX3" fmla="*/ 576496 w 576496"/>
+              <a:gd name="connsiteY3" fmla="*/ 874400 h 874400"/>
+              <a:gd name="connsiteX4" fmla="*/ 432 w 576496"/>
+              <a:gd name="connsiteY4" fmla="*/ 874400 h 874400"/>
+              <a:gd name="connsiteX5" fmla="*/ 0 w 576496"/>
+              <a:gd name="connsiteY5" fmla="*/ 365760 h 874400"/>
+              <a:gd name="connsiteX6" fmla="*/ 432 w 576496"/>
+              <a:gd name="connsiteY6" fmla="*/ 10304 h 874400"/>
+              <a:gd name="connsiteX0" fmla="*/ 0 w 576496"/>
+              <a:gd name="connsiteY0" fmla="*/ 365760 h 874400"/>
+              <a:gd name="connsiteX1" fmla="*/ 243840 w 576496"/>
+              <a:gd name="connsiteY1" fmla="*/ 0 h 874400"/>
+              <a:gd name="connsiteX2" fmla="*/ 576496 w 576496"/>
+              <a:gd name="connsiteY2" fmla="*/ 10304 h 874400"/>
+              <a:gd name="connsiteX3" fmla="*/ 576496 w 576496"/>
+              <a:gd name="connsiteY3" fmla="*/ 874400 h 874400"/>
+              <a:gd name="connsiteX4" fmla="*/ 432 w 576496"/>
+              <a:gd name="connsiteY4" fmla="*/ 874400 h 874400"/>
+              <a:gd name="connsiteX5" fmla="*/ 0 w 576496"/>
+              <a:gd name="connsiteY5" fmla="*/ 365760 h 874400"/>
+              <a:gd name="connsiteX0" fmla="*/ 0 w 576496"/>
+              <a:gd name="connsiteY0" fmla="*/ 213360 h 874400"/>
+              <a:gd name="connsiteX1" fmla="*/ 243840 w 576496"/>
+              <a:gd name="connsiteY1" fmla="*/ 0 h 874400"/>
+              <a:gd name="connsiteX2" fmla="*/ 576496 w 576496"/>
+              <a:gd name="connsiteY2" fmla="*/ 10304 h 874400"/>
+              <a:gd name="connsiteX3" fmla="*/ 576496 w 576496"/>
+              <a:gd name="connsiteY3" fmla="*/ 874400 h 874400"/>
+              <a:gd name="connsiteX4" fmla="*/ 432 w 576496"/>
+              <a:gd name="connsiteY4" fmla="*/ 874400 h 874400"/>
+              <a:gd name="connsiteX5" fmla="*/ 0 w 576496"/>
+              <a:gd name="connsiteY5" fmla="*/ 213360 h 874400"/>
+              <a:gd name="connsiteX0" fmla="*/ 0 w 576496"/>
+              <a:gd name="connsiteY0" fmla="*/ 213360 h 874400"/>
+              <a:gd name="connsiteX1" fmla="*/ 121920 w 576496"/>
+              <a:gd name="connsiteY1" fmla="*/ 0 h 874400"/>
+              <a:gd name="connsiteX2" fmla="*/ 576496 w 576496"/>
+              <a:gd name="connsiteY2" fmla="*/ 10304 h 874400"/>
+              <a:gd name="connsiteX3" fmla="*/ 576496 w 576496"/>
+              <a:gd name="connsiteY3" fmla="*/ 874400 h 874400"/>
+              <a:gd name="connsiteX4" fmla="*/ 432 w 576496"/>
+              <a:gd name="connsiteY4" fmla="*/ 874400 h 874400"/>
+              <a:gd name="connsiteX5" fmla="*/ 0 w 576496"/>
+              <a:gd name="connsiteY5" fmla="*/ 213360 h 874400"/>
+            </a:gdLst>
+            <a:ahLst/>
+            <a:cxnLst>
+              <a:cxn ang="0">
+                <a:pos x="connsiteX0" y="connsiteY0"/>
+              </a:cxn>
+              <a:cxn ang="0">
+                <a:pos x="connsiteX1" y="connsiteY1"/>
+              </a:cxn>
+              <a:cxn ang="0">
+                <a:pos x="connsiteX2" y="connsiteY2"/>
+              </a:cxn>
+              <a:cxn ang="0">
+                <a:pos x="connsiteX3" y="connsiteY3"/>
+              </a:cxn>
+              <a:cxn ang="0">
+                <a:pos x="connsiteX4" y="connsiteY4"/>
+              </a:cxn>
+              <a:cxn ang="0">
+                <a:pos x="connsiteX5" y="connsiteY5"/>
+              </a:cxn>
+            </a:cxnLst>
+            <a:rect l="l" t="t" r="r" b="b"/>
+            <a:pathLst>
+              <a:path w="576496" h="874400">
+                <a:moveTo>
+                  <a:pt x="0" y="213360"/>
+                </a:moveTo>
+                <a:lnTo>
+                  <a:pt x="121920" y="0"/>
+                </a:lnTo>
+                <a:lnTo>
+                  <a:pt x="576496" y="10304"/>
+                </a:lnTo>
+                <a:lnTo>
+                  <a:pt x="576496" y="874400"/>
+                </a:lnTo>
+                <a:lnTo>
+                  <a:pt x="432" y="874400"/>
+                </a:lnTo>
+                <a:lnTo>
+                  <a:pt x="0" y="213360"/>
+                </a:lnTo>
+                <a:close/>
+              </a:path>
+            </a:pathLst>
+          </a:custGeom>
+          <a:solidFill>
+            <a:schemeClr val="accent1"/>
+          </a:solidFill>
+          <a:ln w="76200">
+            <a:solidFill>
+              <a:srgbClr val="00B0F0"/>
+            </a:solidFill>
+          </a:ln>
+          <a:effectLst>
+            <a:outerShdw blurRad="50800" dist="38100" algn="l" rotWithShape="0">
+              <a:prstClr val="black">
+                <a:alpha val="40000"/>
+              </a:prstClr>
+            </a:outerShdw>
+          </a:effectLst>
+        </p:spPr>
+        <p:style>
+          <a:lnRef idx="2">
+            <a:schemeClr val="accent3">
+              <a:shade val="50000"/>
+            </a:schemeClr>
+          </a:lnRef>
+          <a:fillRef idx="1">
+            <a:schemeClr val="accent3"/>
+          </a:fillRef>
+          <a:effectRef idx="0">
+            <a:schemeClr val="accent3"/>
+          </a:effectRef>
+          <a:fontRef idx="minor">
+            <a:schemeClr val="lt1"/>
+          </a:fontRef>
+        </p:style>
+        <p:txBody>
+          <a:bodyPr rtlCol="0" anchor="ctr"/>
+          <a:lstStyle/>
+          <a:p>
+            <a:pPr algn="ctr"/>
+            <a:endParaRPr lang="pl-PL"/>
+          </a:p>
+        </p:txBody>
+      </p:sp>
+      <p:sp>
+        <p:nvSpPr>
+          <p:cNvPr id="44" name="pole tekstowe 43"/>
+          <p:cNvSpPr txBox="1"/>
+          <p:nvPr/>
+        </p:nvSpPr>
+        <p:spPr>
+          <a:xfrm>
+            <a:off x="827584" y="3992767"/>
+            <a:ext cx="648072" cy="369332"/>
+          </a:xfrm>
+          <a:prstGeom prst="rect">
+            <a:avLst/>
+          </a:prstGeom>
+          <a:solidFill>
+            <a:schemeClr val="accent1"/>
+          </a:solidFill>
+        </p:spPr>
+        <p:txBody>
+          <a:bodyPr wrap="square" rtlCol="0">
+            <a:spAutoFit/>
+          </a:bodyPr>
+          <a:lstStyle/>
+          <a:p>
+            <a:pPr algn="ctr"/>
+            <a:r>
+              <a:rPr lang="pl-PL" dirty="0" err="1" smtClean="0"/>
+              <a:t>Pose</a:t>
+            </a:r>
+            <a:endParaRPr lang="pl-PL" dirty="0"/>
+          </a:p>
+        </p:txBody>
+      </p:sp>
+      <p:cxnSp>
+        <p:nvCxnSpPr>
+          <p:cNvPr id="45" name="Łącznik prosty ze strzałką 44"/>
+          <p:cNvCxnSpPr/>
+          <p:nvPr/>
+        </p:nvCxnSpPr>
+        <p:spPr>
+          <a:xfrm flipH="1">
+            <a:off x="1547664" y="4179399"/>
+            <a:ext cx="1360208" cy="0"/>
+          </a:xfrm>
+          <a:prstGeom prst="straightConnector1">
+            <a:avLst/>
+          </a:prstGeom>
+          <a:ln w="19050">
+            <a:tailEnd type="arrow"/>
+          </a:ln>
+        </p:spPr>
+        <p:style>
+          <a:lnRef idx="1">
+            <a:schemeClr val="accent6"/>
+          </a:lnRef>
+          <a:fillRef idx="0">
+            <a:schemeClr val="accent6"/>
+          </a:fillRef>
+          <a:effectRef idx="0">
+            <a:schemeClr val="accent6"/>
+          </a:effectRef>
+          <a:fontRef idx="minor">
+            <a:schemeClr val="tx1"/>
+          </a:fontRef>
+        </p:style>
+      </p:cxnSp>
+      <p:cxnSp>
+        <p:nvCxnSpPr>
+          <p:cNvPr id="46" name="Łącznik łamany 45"/>
+          <p:cNvCxnSpPr/>
+          <p:nvPr/>
+        </p:nvCxnSpPr>
+        <p:spPr>
+          <a:xfrm>
+            <a:off x="1151620" y="4653136"/>
+            <a:ext cx="1764196" cy="776299"/>
+          </a:xfrm>
+          <a:prstGeom prst="bentConnector3">
+            <a:avLst>
+              <a:gd name="adj1" fmla="val -728"/>
+            </a:avLst>
+          </a:prstGeom>
+          <a:ln w="19050">
+            <a:tailEnd type="arrow"/>
+          </a:ln>
+        </p:spPr>
+        <p:style>
+          <a:lnRef idx="1">
+            <a:schemeClr val="accent6"/>
+          </a:lnRef>
+          <a:fillRef idx="0">
+            <a:schemeClr val="accent6"/>
+          </a:fillRef>
+          <a:effectRef idx="0">
+            <a:schemeClr val="accent6"/>
+          </a:effectRef>
+          <a:fontRef idx="minor">
+            <a:schemeClr val="tx1"/>
+          </a:fontRef>
+        </p:style>
+      </p:cxnSp>
+      <p:cxnSp>
+        <p:nvCxnSpPr>
+          <p:cNvPr id="47" name="Łącznik prosty ze strzałką 46"/>
+          <p:cNvCxnSpPr>
+            <a:stCxn id="35" idx="1"/>
+          </p:cNvCxnSpPr>
+          <p:nvPr/>
+        </p:nvCxnSpPr>
+        <p:spPr>
+          <a:xfrm flipH="1">
+            <a:off x="4924095" y="5429435"/>
+            <a:ext cx="1664129" cy="0"/>
+          </a:xfrm>
+          <a:prstGeom prst="straightConnector1">
+            <a:avLst/>
+          </a:prstGeom>
+          <a:ln w="19050">
+            <a:tailEnd type="arrow"/>
+          </a:ln>
+        </p:spPr>
+        <p:style>
+          <a:lnRef idx="1">
+            <a:schemeClr val="accent6"/>
+          </a:lnRef>
+          <a:fillRef idx="0">
+            <a:schemeClr val="accent6"/>
+          </a:fillRef>
+          <a:effectRef idx="0">
+            <a:schemeClr val="accent6"/>
+          </a:effectRef>
+          <a:fontRef idx="minor">
+            <a:schemeClr val="tx1"/>
+          </a:fontRef>
+        </p:style>
+      </p:cxnSp>
+      <p:cxnSp>
+        <p:nvCxnSpPr>
+          <p:cNvPr id="48" name="Łącznik prosty ze strzałką 47"/>
+          <p:cNvCxnSpPr>
+            <a:stCxn id="23" idx="2"/>
+          </p:cNvCxnSpPr>
+          <p:nvPr/>
+        </p:nvCxnSpPr>
+        <p:spPr>
+          <a:xfrm>
+            <a:off x="3923928" y="5877272"/>
+            <a:ext cx="0" cy="504056"/>
+          </a:xfrm>
+          <a:prstGeom prst="straightConnector1">
+            <a:avLst/>
+          </a:prstGeom>
+          <a:ln w="19050">
+            <a:tailEnd type="arrow"/>
+          </a:ln>
+        </p:spPr>
+        <p:style>
+          <a:lnRef idx="1">
+            <a:schemeClr val="accent6"/>
+          </a:lnRef>
+          <a:fillRef idx="0">
+            <a:schemeClr val="accent6"/>
+          </a:fillRef>
+          <a:effectRef idx="0">
+            <a:schemeClr val="accent6"/>
+          </a:effectRef>
+          <a:fontRef idx="minor">
+            <a:schemeClr val="tx1"/>
+          </a:fontRef>
+        </p:style>
+      </p:cxnSp>
+      <p:sp>
+        <p:nvSpPr>
+          <p:cNvPr id="49" name="pole tekstowe 48"/>
+          <p:cNvSpPr txBox="1"/>
+          <p:nvPr/>
+        </p:nvSpPr>
+        <p:spPr>
+          <a:xfrm>
+            <a:off x="3564599" y="6309320"/>
+            <a:ext cx="718658" cy="369332"/>
+          </a:xfrm>
+          <a:prstGeom prst="rect">
+            <a:avLst/>
+          </a:prstGeom>
+          <a:noFill/>
+        </p:spPr>
+        <p:txBody>
+          <a:bodyPr wrap="none" rtlCol="0">
+            <a:spAutoFit/>
+          </a:bodyPr>
+          <a:lstStyle/>
+          <a:p>
+            <a:r>
+              <a:rPr lang="pl-PL" dirty="0" err="1" smtClean="0"/>
+              <a:t>result</a:t>
+            </a:r>
+            <a:endParaRPr lang="pl-PL" dirty="0"/>
+          </a:p>
+        </p:txBody>
+      </p:sp>
+      <p:sp>
+        <p:nvSpPr>
+          <p:cNvPr id="51" name="Prostokąt 3"/>
+          <p:cNvSpPr/>
+          <p:nvPr/>
+        </p:nvSpPr>
+        <p:spPr>
+          <a:xfrm>
+            <a:off x="1547664" y="1772816"/>
+            <a:ext cx="792088" cy="1080120"/>
+          </a:xfrm>
+          <a:custGeom>
+            <a:avLst/>
+            <a:gdLst>
+              <a:gd name="connsiteX0" fmla="*/ 0 w 576064"/>
+              <a:gd name="connsiteY0" fmla="*/ 0 h 864096"/>
+              <a:gd name="connsiteX1" fmla="*/ 576064 w 576064"/>
+              <a:gd name="connsiteY1" fmla="*/ 0 h 864096"/>
+              <a:gd name="connsiteX2" fmla="*/ 576064 w 576064"/>
+              <a:gd name="connsiteY2" fmla="*/ 864096 h 864096"/>
+              <a:gd name="connsiteX3" fmla="*/ 0 w 576064"/>
+              <a:gd name="connsiteY3" fmla="*/ 864096 h 864096"/>
+              <a:gd name="connsiteX4" fmla="*/ 0 w 576064"/>
+              <a:gd name="connsiteY4" fmla="*/ 0 h 864096"/>
+              <a:gd name="connsiteX0" fmla="*/ 432 w 576496"/>
+              <a:gd name="connsiteY0" fmla="*/ 0 h 864096"/>
+              <a:gd name="connsiteX1" fmla="*/ 576496 w 576496"/>
+              <a:gd name="connsiteY1" fmla="*/ 0 h 864096"/>
+              <a:gd name="connsiteX2" fmla="*/ 576496 w 576496"/>
+              <a:gd name="connsiteY2" fmla="*/ 864096 h 864096"/>
+              <a:gd name="connsiteX3" fmla="*/ 432 w 576496"/>
+              <a:gd name="connsiteY3" fmla="*/ 864096 h 864096"/>
+              <a:gd name="connsiteX4" fmla="*/ 0 w 576496"/>
+              <a:gd name="connsiteY4" fmla="*/ 355456 h 864096"/>
+              <a:gd name="connsiteX5" fmla="*/ 432 w 576496"/>
+              <a:gd name="connsiteY5" fmla="*/ 0 h 864096"/>
+              <a:gd name="connsiteX0" fmla="*/ 432 w 576496"/>
+              <a:gd name="connsiteY0" fmla="*/ 10304 h 874400"/>
+              <a:gd name="connsiteX1" fmla="*/ 243840 w 576496"/>
+              <a:gd name="connsiteY1" fmla="*/ 0 h 874400"/>
+              <a:gd name="connsiteX2" fmla="*/ 576496 w 576496"/>
+              <a:gd name="connsiteY2" fmla="*/ 10304 h 874400"/>
+              <a:gd name="connsiteX3" fmla="*/ 576496 w 576496"/>
+              <a:gd name="connsiteY3" fmla="*/ 874400 h 874400"/>
+              <a:gd name="connsiteX4" fmla="*/ 432 w 576496"/>
+              <a:gd name="connsiteY4" fmla="*/ 874400 h 874400"/>
+              <a:gd name="connsiteX5" fmla="*/ 0 w 576496"/>
+              <a:gd name="connsiteY5" fmla="*/ 365760 h 874400"/>
+              <a:gd name="connsiteX6" fmla="*/ 432 w 576496"/>
+              <a:gd name="connsiteY6" fmla="*/ 10304 h 874400"/>
+              <a:gd name="connsiteX0" fmla="*/ 0 w 576496"/>
+              <a:gd name="connsiteY0" fmla="*/ 365760 h 874400"/>
+              <a:gd name="connsiteX1" fmla="*/ 243840 w 576496"/>
+              <a:gd name="connsiteY1" fmla="*/ 0 h 874400"/>
+              <a:gd name="connsiteX2" fmla="*/ 576496 w 576496"/>
+              <a:gd name="connsiteY2" fmla="*/ 10304 h 874400"/>
+              <a:gd name="connsiteX3" fmla="*/ 576496 w 576496"/>
+              <a:gd name="connsiteY3" fmla="*/ 874400 h 874400"/>
+              <a:gd name="connsiteX4" fmla="*/ 432 w 576496"/>
+              <a:gd name="connsiteY4" fmla="*/ 874400 h 874400"/>
+              <a:gd name="connsiteX5" fmla="*/ 0 w 576496"/>
+              <a:gd name="connsiteY5" fmla="*/ 365760 h 874400"/>
+              <a:gd name="connsiteX0" fmla="*/ 0 w 576496"/>
+              <a:gd name="connsiteY0" fmla="*/ 213360 h 874400"/>
+              <a:gd name="connsiteX1" fmla="*/ 243840 w 576496"/>
+              <a:gd name="connsiteY1" fmla="*/ 0 h 874400"/>
+              <a:gd name="connsiteX2" fmla="*/ 576496 w 576496"/>
+              <a:gd name="connsiteY2" fmla="*/ 10304 h 874400"/>
+              <a:gd name="connsiteX3" fmla="*/ 576496 w 576496"/>
+              <a:gd name="connsiteY3" fmla="*/ 874400 h 874400"/>
+              <a:gd name="connsiteX4" fmla="*/ 432 w 576496"/>
+              <a:gd name="connsiteY4" fmla="*/ 874400 h 874400"/>
+              <a:gd name="connsiteX5" fmla="*/ 0 w 576496"/>
+              <a:gd name="connsiteY5" fmla="*/ 213360 h 874400"/>
+              <a:gd name="connsiteX0" fmla="*/ 0 w 576496"/>
+              <a:gd name="connsiteY0" fmla="*/ 213360 h 874400"/>
+              <a:gd name="connsiteX1" fmla="*/ 121920 w 576496"/>
+              <a:gd name="connsiteY1" fmla="*/ 0 h 874400"/>
+              <a:gd name="connsiteX2" fmla="*/ 576496 w 576496"/>
+              <a:gd name="connsiteY2" fmla="*/ 10304 h 874400"/>
+              <a:gd name="connsiteX3" fmla="*/ 576496 w 576496"/>
+              <a:gd name="connsiteY3" fmla="*/ 874400 h 874400"/>
+              <a:gd name="connsiteX4" fmla="*/ 432 w 576496"/>
+              <a:gd name="connsiteY4" fmla="*/ 874400 h 874400"/>
+              <a:gd name="connsiteX5" fmla="*/ 0 w 576496"/>
+              <a:gd name="connsiteY5" fmla="*/ 213360 h 874400"/>
+            </a:gdLst>
+            <a:ahLst/>
+            <a:cxnLst>
+              <a:cxn ang="0">
+                <a:pos x="connsiteX0" y="connsiteY0"/>
+              </a:cxn>
+              <a:cxn ang="0">
+                <a:pos x="connsiteX1" y="connsiteY1"/>
+              </a:cxn>
+              <a:cxn ang="0">
+                <a:pos x="connsiteX2" y="connsiteY2"/>
+              </a:cxn>
+              <a:cxn ang="0">
+                <a:pos x="connsiteX3" y="connsiteY3"/>
+              </a:cxn>
+              <a:cxn ang="0">
+                <a:pos x="connsiteX4" y="connsiteY4"/>
+              </a:cxn>
+              <a:cxn ang="0">
+                <a:pos x="connsiteX5" y="connsiteY5"/>
+              </a:cxn>
+            </a:cxnLst>
+            <a:rect l="l" t="t" r="r" b="b"/>
+            <a:pathLst>
+              <a:path w="576496" h="874400">
+                <a:moveTo>
+                  <a:pt x="0" y="213360"/>
+                </a:moveTo>
+                <a:lnTo>
+                  <a:pt x="121920" y="0"/>
+                </a:lnTo>
+                <a:lnTo>
+                  <a:pt x="576496" y="10304"/>
+                </a:lnTo>
+                <a:lnTo>
+                  <a:pt x="576496" y="874400"/>
+                </a:lnTo>
+                <a:lnTo>
+                  <a:pt x="432" y="874400"/>
+                </a:lnTo>
+                <a:lnTo>
+                  <a:pt x="0" y="213360"/>
+                </a:lnTo>
+                <a:close/>
+              </a:path>
+            </a:pathLst>
+          </a:custGeom>
+          <a:solidFill>
+            <a:schemeClr val="bg2">
+              <a:lumMod val="90000"/>
+            </a:schemeClr>
+          </a:solidFill>
+          <a:ln w="76200">
+            <a:solidFill>
+              <a:srgbClr val="00B0F0"/>
+            </a:solidFill>
+            <a:prstDash val="dash"/>
+          </a:ln>
+          <a:effectLst>
+            <a:outerShdw blurRad="50800" dist="38100" algn="l" rotWithShape="0">
+              <a:prstClr val="black">
+                <a:alpha val="40000"/>
+              </a:prstClr>
+            </a:outerShdw>
+          </a:effectLst>
+        </p:spPr>
+        <p:style>
+          <a:lnRef idx="2">
+            <a:schemeClr val="accent3">
+              <a:shade val="50000"/>
+            </a:schemeClr>
+          </a:lnRef>
+          <a:fillRef idx="1">
+            <a:schemeClr val="accent3"/>
+          </a:fillRef>
+          <a:effectRef idx="0">
+            <a:schemeClr val="accent3"/>
+          </a:effectRef>
+          <a:fontRef idx="minor">
+            <a:schemeClr val="lt1"/>
+          </a:fontRef>
+        </p:style>
+        <p:txBody>
+          <a:bodyPr rtlCol="0" anchor="ctr"/>
+          <a:lstStyle/>
+          <a:p>
+            <a:pPr algn="ctr"/>
+            <a:endParaRPr lang="pl-PL"/>
+          </a:p>
+        </p:txBody>
+      </p:sp>
+      <p:sp>
+        <p:nvSpPr>
+          <p:cNvPr id="52" name="pole tekstowe 51"/>
+          <p:cNvSpPr txBox="1"/>
+          <p:nvPr/>
+        </p:nvSpPr>
+        <p:spPr>
+          <a:xfrm>
+            <a:off x="1547664" y="2175510"/>
+            <a:ext cx="792088" cy="369332"/>
+          </a:xfrm>
+          <a:prstGeom prst="rect">
+            <a:avLst/>
+          </a:prstGeom>
+          <a:noFill/>
+        </p:spPr>
+        <p:txBody>
+          <a:bodyPr wrap="square" rtlCol="0">
+            <a:spAutoFit/>
+          </a:bodyPr>
+          <a:lstStyle/>
+          <a:p>
+            <a:pPr algn="ctr"/>
+            <a:r>
+              <a:rPr lang="pl-PL" dirty="0" err="1" smtClean="0"/>
+              <a:t>Scene</a:t>
+            </a:r>
+            <a:r>
+              <a:rPr lang="pl-PL" dirty="0" smtClean="0"/>
+              <a:t> </a:t>
+            </a:r>
+            <a:endParaRPr lang="pl-PL" dirty="0"/>
+          </a:p>
+        </p:txBody>
+      </p:sp>
+      <p:cxnSp>
+        <p:nvCxnSpPr>
+          <p:cNvPr id="28" name="Łącznik łamany 27"/>
+          <p:cNvCxnSpPr>
+            <a:endCxn id="31" idx="3"/>
+          </p:cNvCxnSpPr>
+          <p:nvPr/>
+        </p:nvCxnSpPr>
+        <p:spPr>
+          <a:xfrm rot="5400000">
+            <a:off x="7151092" y="2956524"/>
+            <a:ext cx="1430551" cy="972110"/>
+          </a:xfrm>
+          <a:prstGeom prst="bentConnector2">
+            <a:avLst/>
+          </a:prstGeom>
+          <a:ln w="19050">
+            <a:tailEnd type="arrow"/>
+          </a:ln>
+        </p:spPr>
+        <p:style>
+          <a:lnRef idx="1">
+            <a:schemeClr val="accent6"/>
+          </a:lnRef>
+          <a:fillRef idx="0">
+            <a:schemeClr val="accent6"/>
+          </a:fillRef>
+          <a:effectRef idx="0">
+            <a:schemeClr val="accent6"/>
+          </a:effectRef>
+          <a:fontRef idx="minor">
+            <a:schemeClr val="tx1"/>
+          </a:fontRef>
+        </p:style>
+      </p:cxnSp>
+      <p:grpSp>
+        <p:nvGrpSpPr>
+          <p:cNvPr id="38" name="Grupa 37"/>
+          <p:cNvGrpSpPr/>
+          <p:nvPr/>
+        </p:nvGrpSpPr>
+        <p:grpSpPr>
+          <a:xfrm>
+            <a:off x="7920372" y="1705372"/>
+            <a:ext cx="864096" cy="1147564"/>
+            <a:chOff x="5436096" y="1844824"/>
+            <a:chExt cx="864096" cy="1147564"/>
+          </a:xfrm>
+          <a:effectLst>
+            <a:outerShdw blurRad="50800" dist="38100" algn="l" rotWithShape="0">
+              <a:prstClr val="black">
+                <a:alpha val="40000"/>
+              </a:prstClr>
+            </a:outerShdw>
+          </a:effectLst>
+        </p:grpSpPr>
+        <p:sp>
+          <p:nvSpPr>
+            <p:cNvPr id="39" name="Prostokąt 3"/>
+            <p:cNvSpPr/>
+            <p:nvPr/>
+          </p:nvSpPr>
+          <p:spPr>
+            <a:xfrm>
+              <a:off x="5508104" y="1844824"/>
+              <a:ext cx="792088" cy="1080120"/>
+            </a:xfrm>
+            <a:custGeom>
+              <a:avLst/>
+              <a:gdLst>
+                <a:gd name="connsiteX0" fmla="*/ 0 w 576064"/>
+                <a:gd name="connsiteY0" fmla="*/ 0 h 864096"/>
+                <a:gd name="connsiteX1" fmla="*/ 576064 w 576064"/>
+                <a:gd name="connsiteY1" fmla="*/ 0 h 864096"/>
+                <a:gd name="connsiteX2" fmla="*/ 576064 w 576064"/>
+                <a:gd name="connsiteY2" fmla="*/ 864096 h 864096"/>
+                <a:gd name="connsiteX3" fmla="*/ 0 w 576064"/>
+                <a:gd name="connsiteY3" fmla="*/ 864096 h 864096"/>
+                <a:gd name="connsiteX4" fmla="*/ 0 w 576064"/>
+                <a:gd name="connsiteY4" fmla="*/ 0 h 864096"/>
+                <a:gd name="connsiteX0" fmla="*/ 432 w 576496"/>
+                <a:gd name="connsiteY0" fmla="*/ 0 h 864096"/>
+                <a:gd name="connsiteX1" fmla="*/ 576496 w 576496"/>
+                <a:gd name="connsiteY1" fmla="*/ 0 h 864096"/>
+                <a:gd name="connsiteX2" fmla="*/ 576496 w 576496"/>
+                <a:gd name="connsiteY2" fmla="*/ 864096 h 864096"/>
+                <a:gd name="connsiteX3" fmla="*/ 432 w 576496"/>
+                <a:gd name="connsiteY3" fmla="*/ 864096 h 864096"/>
+                <a:gd name="connsiteX4" fmla="*/ 0 w 576496"/>
+                <a:gd name="connsiteY4" fmla="*/ 355456 h 864096"/>
+                <a:gd name="connsiteX5" fmla="*/ 432 w 576496"/>
+                <a:gd name="connsiteY5" fmla="*/ 0 h 864096"/>
+                <a:gd name="connsiteX0" fmla="*/ 432 w 576496"/>
+                <a:gd name="connsiteY0" fmla="*/ 10304 h 874400"/>
+                <a:gd name="connsiteX1" fmla="*/ 243840 w 576496"/>
+                <a:gd name="connsiteY1" fmla="*/ 0 h 874400"/>
+                <a:gd name="connsiteX2" fmla="*/ 576496 w 576496"/>
+                <a:gd name="connsiteY2" fmla="*/ 10304 h 874400"/>
+                <a:gd name="connsiteX3" fmla="*/ 576496 w 576496"/>
+                <a:gd name="connsiteY3" fmla="*/ 874400 h 874400"/>
+                <a:gd name="connsiteX4" fmla="*/ 432 w 576496"/>
+                <a:gd name="connsiteY4" fmla="*/ 874400 h 874400"/>
+                <a:gd name="connsiteX5" fmla="*/ 0 w 576496"/>
+                <a:gd name="connsiteY5" fmla="*/ 365760 h 874400"/>
+                <a:gd name="connsiteX6" fmla="*/ 432 w 576496"/>
+                <a:gd name="connsiteY6" fmla="*/ 10304 h 874400"/>
+                <a:gd name="connsiteX0" fmla="*/ 0 w 576496"/>
+                <a:gd name="connsiteY0" fmla="*/ 365760 h 874400"/>
+                <a:gd name="connsiteX1" fmla="*/ 243840 w 576496"/>
+                <a:gd name="connsiteY1" fmla="*/ 0 h 874400"/>
+                <a:gd name="connsiteX2" fmla="*/ 576496 w 576496"/>
+                <a:gd name="connsiteY2" fmla="*/ 10304 h 874400"/>
+                <a:gd name="connsiteX3" fmla="*/ 576496 w 576496"/>
+                <a:gd name="connsiteY3" fmla="*/ 874400 h 874400"/>
+                <a:gd name="connsiteX4" fmla="*/ 432 w 576496"/>
+                <a:gd name="connsiteY4" fmla="*/ 874400 h 874400"/>
+                <a:gd name="connsiteX5" fmla="*/ 0 w 576496"/>
+                <a:gd name="connsiteY5" fmla="*/ 365760 h 874400"/>
+                <a:gd name="connsiteX0" fmla="*/ 0 w 576496"/>
+                <a:gd name="connsiteY0" fmla="*/ 213360 h 874400"/>
+                <a:gd name="connsiteX1" fmla="*/ 243840 w 576496"/>
+                <a:gd name="connsiteY1" fmla="*/ 0 h 874400"/>
+                <a:gd name="connsiteX2" fmla="*/ 576496 w 576496"/>
+                <a:gd name="connsiteY2" fmla="*/ 10304 h 874400"/>
+                <a:gd name="connsiteX3" fmla="*/ 576496 w 576496"/>
+                <a:gd name="connsiteY3" fmla="*/ 874400 h 874400"/>
+                <a:gd name="connsiteX4" fmla="*/ 432 w 576496"/>
+                <a:gd name="connsiteY4" fmla="*/ 874400 h 874400"/>
+                <a:gd name="connsiteX5" fmla="*/ 0 w 576496"/>
+                <a:gd name="connsiteY5" fmla="*/ 213360 h 874400"/>
+                <a:gd name="connsiteX0" fmla="*/ 0 w 576496"/>
+                <a:gd name="connsiteY0" fmla="*/ 213360 h 874400"/>
+                <a:gd name="connsiteX1" fmla="*/ 121920 w 576496"/>
+                <a:gd name="connsiteY1" fmla="*/ 0 h 874400"/>
+                <a:gd name="connsiteX2" fmla="*/ 576496 w 576496"/>
+                <a:gd name="connsiteY2" fmla="*/ 10304 h 874400"/>
+                <a:gd name="connsiteX3" fmla="*/ 576496 w 576496"/>
+                <a:gd name="connsiteY3" fmla="*/ 874400 h 874400"/>
+                <a:gd name="connsiteX4" fmla="*/ 432 w 576496"/>
+                <a:gd name="connsiteY4" fmla="*/ 874400 h 874400"/>
+                <a:gd name="connsiteX5" fmla="*/ 0 w 576496"/>
+                <a:gd name="connsiteY5" fmla="*/ 213360 h 874400"/>
+              </a:gdLst>
+              <a:ahLst/>
+              <a:cxnLst>
+                <a:cxn ang="0">
+                  <a:pos x="connsiteX0" y="connsiteY0"/>
+                </a:cxn>
+                <a:cxn ang="0">
+                  <a:pos x="connsiteX1" y="connsiteY1"/>
+                </a:cxn>
+                <a:cxn ang="0">
+                  <a:pos x="connsiteX2" y="connsiteY2"/>
+                </a:cxn>
+                <a:cxn ang="0">
+                  <a:pos x="connsiteX3" y="connsiteY3"/>
+                </a:cxn>
+                <a:cxn ang="0">
+                  <a:pos x="connsiteX4" y="connsiteY4"/>
+                </a:cxn>
+                <a:cxn ang="0">
+                  <a:pos x="connsiteX5" y="connsiteY5"/>
+                </a:cxn>
+              </a:cxnLst>
+              <a:rect l="l" t="t" r="r" b="b"/>
+              <a:pathLst>
+                <a:path w="576496" h="874400">
+                  <a:moveTo>
+                    <a:pt x="0" y="213360"/>
+                  </a:moveTo>
+                  <a:lnTo>
+                    <a:pt x="121920" y="0"/>
+                  </a:lnTo>
+                  <a:lnTo>
+                    <a:pt x="576496" y="10304"/>
+                  </a:lnTo>
+                  <a:lnTo>
+                    <a:pt x="576496" y="874400"/>
+                  </a:lnTo>
+                  <a:lnTo>
+                    <a:pt x="432" y="874400"/>
+                  </a:lnTo>
+                  <a:lnTo>
+                    <a:pt x="0" y="213360"/>
+                  </a:lnTo>
+                  <a:close/>
+                </a:path>
+              </a:pathLst>
+            </a:custGeom>
+            <a:ln w="9525"/>
+            <a:effectLst/>
+          </p:spPr>
+          <p:style>
+            <a:lnRef idx="2">
+              <a:schemeClr val="accent1">
+                <a:shade val="50000"/>
+              </a:schemeClr>
+            </a:lnRef>
+            <a:fillRef idx="1">
+              <a:schemeClr val="accent1"/>
+            </a:fillRef>
+            <a:effectRef idx="0">
+              <a:schemeClr val="accent1"/>
+            </a:effectRef>
+            <a:fontRef idx="minor">
+              <a:schemeClr val="lt1"/>
+            </a:fontRef>
+          </p:style>
+          <p:txBody>
+            <a:bodyPr rtlCol="0" anchor="ctr"/>
+            <a:lstStyle/>
+            <a:p>
+              <a:pPr algn="ctr"/>
+              <a:endParaRPr lang="pl-PL"/>
+            </a:p>
+          </p:txBody>
+        </p:sp>
+        <p:sp>
+          <p:nvSpPr>
+            <p:cNvPr id="40" name="Prostokąt 3"/>
+            <p:cNvSpPr/>
+            <p:nvPr/>
+          </p:nvSpPr>
+          <p:spPr>
+            <a:xfrm>
+              <a:off x="5436096" y="1912268"/>
+              <a:ext cx="792088" cy="1080120"/>
+            </a:xfrm>
+            <a:custGeom>
+              <a:avLst/>
+              <a:gdLst>
+                <a:gd name="connsiteX0" fmla="*/ 0 w 576064"/>
+                <a:gd name="connsiteY0" fmla="*/ 0 h 864096"/>
+                <a:gd name="connsiteX1" fmla="*/ 576064 w 576064"/>
+                <a:gd name="connsiteY1" fmla="*/ 0 h 864096"/>
+                <a:gd name="connsiteX2" fmla="*/ 576064 w 576064"/>
+                <a:gd name="connsiteY2" fmla="*/ 864096 h 864096"/>
+                <a:gd name="connsiteX3" fmla="*/ 0 w 576064"/>
+                <a:gd name="connsiteY3" fmla="*/ 864096 h 864096"/>
+                <a:gd name="connsiteX4" fmla="*/ 0 w 576064"/>
+                <a:gd name="connsiteY4" fmla="*/ 0 h 864096"/>
+                <a:gd name="connsiteX0" fmla="*/ 432 w 576496"/>
+                <a:gd name="connsiteY0" fmla="*/ 0 h 864096"/>
+                <a:gd name="connsiteX1" fmla="*/ 576496 w 576496"/>
+                <a:gd name="connsiteY1" fmla="*/ 0 h 864096"/>
+                <a:gd name="connsiteX2" fmla="*/ 576496 w 576496"/>
+                <a:gd name="connsiteY2" fmla="*/ 864096 h 864096"/>
+                <a:gd name="connsiteX3" fmla="*/ 432 w 576496"/>
+                <a:gd name="connsiteY3" fmla="*/ 864096 h 864096"/>
+                <a:gd name="connsiteX4" fmla="*/ 0 w 576496"/>
+                <a:gd name="connsiteY4" fmla="*/ 355456 h 864096"/>
+                <a:gd name="connsiteX5" fmla="*/ 432 w 576496"/>
+                <a:gd name="connsiteY5" fmla="*/ 0 h 864096"/>
+                <a:gd name="connsiteX0" fmla="*/ 432 w 576496"/>
+                <a:gd name="connsiteY0" fmla="*/ 10304 h 874400"/>
+                <a:gd name="connsiteX1" fmla="*/ 243840 w 576496"/>
+                <a:gd name="connsiteY1" fmla="*/ 0 h 874400"/>
+                <a:gd name="connsiteX2" fmla="*/ 576496 w 576496"/>
+                <a:gd name="connsiteY2" fmla="*/ 10304 h 874400"/>
+                <a:gd name="connsiteX3" fmla="*/ 576496 w 576496"/>
+                <a:gd name="connsiteY3" fmla="*/ 874400 h 874400"/>
+                <a:gd name="connsiteX4" fmla="*/ 432 w 576496"/>
+                <a:gd name="connsiteY4" fmla="*/ 874400 h 874400"/>
+                <a:gd name="connsiteX5" fmla="*/ 0 w 576496"/>
+                <a:gd name="connsiteY5" fmla="*/ 365760 h 874400"/>
+                <a:gd name="connsiteX6" fmla="*/ 432 w 576496"/>
+                <a:gd name="connsiteY6" fmla="*/ 10304 h 874400"/>
+                <a:gd name="connsiteX0" fmla="*/ 0 w 576496"/>
+                <a:gd name="connsiteY0" fmla="*/ 365760 h 874400"/>
+                <a:gd name="connsiteX1" fmla="*/ 243840 w 576496"/>
+                <a:gd name="connsiteY1" fmla="*/ 0 h 874400"/>
+                <a:gd name="connsiteX2" fmla="*/ 576496 w 576496"/>
+                <a:gd name="connsiteY2" fmla="*/ 10304 h 874400"/>
+                <a:gd name="connsiteX3" fmla="*/ 576496 w 576496"/>
+                <a:gd name="connsiteY3" fmla="*/ 874400 h 874400"/>
+                <a:gd name="connsiteX4" fmla="*/ 432 w 576496"/>
+                <a:gd name="connsiteY4" fmla="*/ 874400 h 874400"/>
+                <a:gd name="connsiteX5" fmla="*/ 0 w 576496"/>
+                <a:gd name="connsiteY5" fmla="*/ 365760 h 874400"/>
+                <a:gd name="connsiteX0" fmla="*/ 0 w 576496"/>
+                <a:gd name="connsiteY0" fmla="*/ 213360 h 874400"/>
+                <a:gd name="connsiteX1" fmla="*/ 243840 w 576496"/>
+                <a:gd name="connsiteY1" fmla="*/ 0 h 874400"/>
+                <a:gd name="connsiteX2" fmla="*/ 576496 w 576496"/>
+                <a:gd name="connsiteY2" fmla="*/ 10304 h 874400"/>
+                <a:gd name="connsiteX3" fmla="*/ 576496 w 576496"/>
+                <a:gd name="connsiteY3" fmla="*/ 874400 h 874400"/>
+                <a:gd name="connsiteX4" fmla="*/ 432 w 576496"/>
+                <a:gd name="connsiteY4" fmla="*/ 874400 h 874400"/>
+                <a:gd name="connsiteX5" fmla="*/ 0 w 576496"/>
+                <a:gd name="connsiteY5" fmla="*/ 213360 h 874400"/>
+                <a:gd name="connsiteX0" fmla="*/ 0 w 576496"/>
+                <a:gd name="connsiteY0" fmla="*/ 213360 h 874400"/>
+                <a:gd name="connsiteX1" fmla="*/ 121920 w 576496"/>
+                <a:gd name="connsiteY1" fmla="*/ 0 h 874400"/>
+                <a:gd name="connsiteX2" fmla="*/ 576496 w 576496"/>
+                <a:gd name="connsiteY2" fmla="*/ 10304 h 874400"/>
+                <a:gd name="connsiteX3" fmla="*/ 576496 w 576496"/>
+                <a:gd name="connsiteY3" fmla="*/ 874400 h 874400"/>
+                <a:gd name="connsiteX4" fmla="*/ 432 w 576496"/>
+                <a:gd name="connsiteY4" fmla="*/ 874400 h 874400"/>
+                <a:gd name="connsiteX5" fmla="*/ 0 w 576496"/>
+                <a:gd name="connsiteY5" fmla="*/ 213360 h 874400"/>
+              </a:gdLst>
+              <a:ahLst/>
+              <a:cxnLst>
+                <a:cxn ang="0">
+                  <a:pos x="connsiteX0" y="connsiteY0"/>
+                </a:cxn>
+                <a:cxn ang="0">
+                  <a:pos x="connsiteX1" y="connsiteY1"/>
+                </a:cxn>
+                <a:cxn ang="0">
+                  <a:pos x="connsiteX2" y="connsiteY2"/>
+                </a:cxn>
+                <a:cxn ang="0">
+                  <a:pos x="connsiteX3" y="connsiteY3"/>
+                </a:cxn>
+                <a:cxn ang="0">
+                  <a:pos x="connsiteX4" y="connsiteY4"/>
+                </a:cxn>
+                <a:cxn ang="0">
+                  <a:pos x="connsiteX5" y="connsiteY5"/>
+                </a:cxn>
+              </a:cxnLst>
+              <a:rect l="l" t="t" r="r" b="b"/>
+              <a:pathLst>
+                <a:path w="576496" h="874400">
+                  <a:moveTo>
+                    <a:pt x="0" y="213360"/>
+                  </a:moveTo>
+                  <a:lnTo>
+                    <a:pt x="121920" y="0"/>
+                  </a:lnTo>
+                  <a:lnTo>
+                    <a:pt x="576496" y="10304"/>
+                  </a:lnTo>
+                  <a:lnTo>
+                    <a:pt x="576496" y="874400"/>
+                  </a:lnTo>
+                  <a:lnTo>
+                    <a:pt x="432" y="874400"/>
+                  </a:lnTo>
+                  <a:lnTo>
+                    <a:pt x="0" y="213360"/>
+                  </a:lnTo>
+                  <a:close/>
+                </a:path>
+              </a:pathLst>
+            </a:custGeom>
+            <a:ln w="9525"/>
+            <a:effectLst/>
+          </p:spPr>
+          <p:style>
+            <a:lnRef idx="2">
+              <a:schemeClr val="accent3">
+                <a:shade val="50000"/>
+              </a:schemeClr>
+            </a:lnRef>
+            <a:fillRef idx="1">
+              <a:schemeClr val="accent3"/>
+            </a:fillRef>
+            <a:effectRef idx="0">
+              <a:schemeClr val="accent3"/>
+            </a:effectRef>
+            <a:fontRef idx="minor">
+              <a:schemeClr val="lt1"/>
+            </a:fontRef>
+          </p:style>
+          <p:txBody>
+            <a:bodyPr rtlCol="0" anchor="ctr"/>
+            <a:lstStyle/>
+            <a:p>
+              <a:pPr algn="ctr"/>
+              <a:endParaRPr lang="pl-PL"/>
+            </a:p>
+          </p:txBody>
+        </p:sp>
+        <p:sp>
+          <p:nvSpPr>
+            <p:cNvPr id="41" name="pole tekstowe 40"/>
+            <p:cNvSpPr txBox="1"/>
+            <p:nvPr/>
+          </p:nvSpPr>
+          <p:spPr>
+            <a:xfrm>
+              <a:off x="5436096" y="2200300"/>
+              <a:ext cx="792088" cy="646331"/>
+            </a:xfrm>
+            <a:prstGeom prst="rect">
+              <a:avLst/>
+            </a:prstGeom>
+            <a:noFill/>
+          </p:spPr>
+          <p:txBody>
+            <a:bodyPr wrap="square" rtlCol="0">
+              <a:spAutoFit/>
+            </a:bodyPr>
+            <a:lstStyle/>
+            <a:p>
+              <a:pPr algn="ctr"/>
+              <a:r>
+                <a:rPr lang="pl-PL" dirty="0" err="1" smtClean="0"/>
+                <a:t>ImageTest</a:t>
+              </a:r>
+              <a:r>
+                <a:rPr lang="pl-PL" dirty="0" smtClean="0"/>
+                <a:t> </a:t>
+              </a:r>
+              <a:endParaRPr lang="pl-PL" dirty="0"/>
+            </a:p>
+          </p:txBody>
+        </p:sp>
+      </p:grpSp>
     </p:spTree>
     <p:extLst>
       <p:ext uri="{BB962C8B-B14F-4D97-AF65-F5344CB8AC3E}">
@@ -8612,228 +11624,6 @@
           </p:txBody>
         </p:sp>
       </p:grpSp>
-      <p:grpSp>
-        <p:nvGrpSpPr>
-          <p:cNvPr id="62" name="Grupa 61"/>
-          <p:cNvGrpSpPr/>
-          <p:nvPr/>
-        </p:nvGrpSpPr>
-        <p:grpSpPr>
-          <a:xfrm>
-            <a:off x="1547664" y="1772816"/>
-            <a:ext cx="792088" cy="1080120"/>
-            <a:chOff x="1547664" y="1772816"/>
-            <a:chExt cx="792088" cy="1080120"/>
-          </a:xfrm>
-        </p:grpSpPr>
-        <p:sp>
-          <p:nvSpPr>
-            <p:cNvPr id="6" name="Prostokąt 3"/>
-            <p:cNvSpPr/>
-            <p:nvPr/>
-          </p:nvSpPr>
-          <p:spPr>
-            <a:xfrm>
-              <a:off x="1547664" y="1772816"/>
-              <a:ext cx="792088" cy="1080120"/>
-            </a:xfrm>
-            <a:custGeom>
-              <a:avLst/>
-              <a:gdLst>
-                <a:gd name="connsiteX0" fmla="*/ 0 w 576064"/>
-                <a:gd name="connsiteY0" fmla="*/ 0 h 864096"/>
-                <a:gd name="connsiteX1" fmla="*/ 576064 w 576064"/>
-                <a:gd name="connsiteY1" fmla="*/ 0 h 864096"/>
-                <a:gd name="connsiteX2" fmla="*/ 576064 w 576064"/>
-                <a:gd name="connsiteY2" fmla="*/ 864096 h 864096"/>
-                <a:gd name="connsiteX3" fmla="*/ 0 w 576064"/>
-                <a:gd name="connsiteY3" fmla="*/ 864096 h 864096"/>
-                <a:gd name="connsiteX4" fmla="*/ 0 w 576064"/>
-                <a:gd name="connsiteY4" fmla="*/ 0 h 864096"/>
-                <a:gd name="connsiteX0" fmla="*/ 432 w 576496"/>
-                <a:gd name="connsiteY0" fmla="*/ 0 h 864096"/>
-                <a:gd name="connsiteX1" fmla="*/ 576496 w 576496"/>
-                <a:gd name="connsiteY1" fmla="*/ 0 h 864096"/>
-                <a:gd name="connsiteX2" fmla="*/ 576496 w 576496"/>
-                <a:gd name="connsiteY2" fmla="*/ 864096 h 864096"/>
-                <a:gd name="connsiteX3" fmla="*/ 432 w 576496"/>
-                <a:gd name="connsiteY3" fmla="*/ 864096 h 864096"/>
-                <a:gd name="connsiteX4" fmla="*/ 0 w 576496"/>
-                <a:gd name="connsiteY4" fmla="*/ 355456 h 864096"/>
-                <a:gd name="connsiteX5" fmla="*/ 432 w 576496"/>
-                <a:gd name="connsiteY5" fmla="*/ 0 h 864096"/>
-                <a:gd name="connsiteX0" fmla="*/ 432 w 576496"/>
-                <a:gd name="connsiteY0" fmla="*/ 10304 h 874400"/>
-                <a:gd name="connsiteX1" fmla="*/ 243840 w 576496"/>
-                <a:gd name="connsiteY1" fmla="*/ 0 h 874400"/>
-                <a:gd name="connsiteX2" fmla="*/ 576496 w 576496"/>
-                <a:gd name="connsiteY2" fmla="*/ 10304 h 874400"/>
-                <a:gd name="connsiteX3" fmla="*/ 576496 w 576496"/>
-                <a:gd name="connsiteY3" fmla="*/ 874400 h 874400"/>
-                <a:gd name="connsiteX4" fmla="*/ 432 w 576496"/>
-                <a:gd name="connsiteY4" fmla="*/ 874400 h 874400"/>
-                <a:gd name="connsiteX5" fmla="*/ 0 w 576496"/>
-                <a:gd name="connsiteY5" fmla="*/ 365760 h 874400"/>
-                <a:gd name="connsiteX6" fmla="*/ 432 w 576496"/>
-                <a:gd name="connsiteY6" fmla="*/ 10304 h 874400"/>
-                <a:gd name="connsiteX0" fmla="*/ 0 w 576496"/>
-                <a:gd name="connsiteY0" fmla="*/ 365760 h 874400"/>
-                <a:gd name="connsiteX1" fmla="*/ 243840 w 576496"/>
-                <a:gd name="connsiteY1" fmla="*/ 0 h 874400"/>
-                <a:gd name="connsiteX2" fmla="*/ 576496 w 576496"/>
-                <a:gd name="connsiteY2" fmla="*/ 10304 h 874400"/>
-                <a:gd name="connsiteX3" fmla="*/ 576496 w 576496"/>
-                <a:gd name="connsiteY3" fmla="*/ 874400 h 874400"/>
-                <a:gd name="connsiteX4" fmla="*/ 432 w 576496"/>
-                <a:gd name="connsiteY4" fmla="*/ 874400 h 874400"/>
-                <a:gd name="connsiteX5" fmla="*/ 0 w 576496"/>
-                <a:gd name="connsiteY5" fmla="*/ 365760 h 874400"/>
-                <a:gd name="connsiteX0" fmla="*/ 0 w 576496"/>
-                <a:gd name="connsiteY0" fmla="*/ 213360 h 874400"/>
-                <a:gd name="connsiteX1" fmla="*/ 243840 w 576496"/>
-                <a:gd name="connsiteY1" fmla="*/ 0 h 874400"/>
-                <a:gd name="connsiteX2" fmla="*/ 576496 w 576496"/>
-                <a:gd name="connsiteY2" fmla="*/ 10304 h 874400"/>
-                <a:gd name="connsiteX3" fmla="*/ 576496 w 576496"/>
-                <a:gd name="connsiteY3" fmla="*/ 874400 h 874400"/>
-                <a:gd name="connsiteX4" fmla="*/ 432 w 576496"/>
-                <a:gd name="connsiteY4" fmla="*/ 874400 h 874400"/>
-                <a:gd name="connsiteX5" fmla="*/ 0 w 576496"/>
-                <a:gd name="connsiteY5" fmla="*/ 213360 h 874400"/>
-                <a:gd name="connsiteX0" fmla="*/ 0 w 576496"/>
-                <a:gd name="connsiteY0" fmla="*/ 213360 h 874400"/>
-                <a:gd name="connsiteX1" fmla="*/ 121920 w 576496"/>
-                <a:gd name="connsiteY1" fmla="*/ 0 h 874400"/>
-                <a:gd name="connsiteX2" fmla="*/ 576496 w 576496"/>
-                <a:gd name="connsiteY2" fmla="*/ 10304 h 874400"/>
-                <a:gd name="connsiteX3" fmla="*/ 576496 w 576496"/>
-                <a:gd name="connsiteY3" fmla="*/ 874400 h 874400"/>
-                <a:gd name="connsiteX4" fmla="*/ 432 w 576496"/>
-                <a:gd name="connsiteY4" fmla="*/ 874400 h 874400"/>
-                <a:gd name="connsiteX5" fmla="*/ 0 w 576496"/>
-                <a:gd name="connsiteY5" fmla="*/ 213360 h 874400"/>
-              </a:gdLst>
-              <a:ahLst/>
-              <a:cxnLst>
-                <a:cxn ang="0">
-                  <a:pos x="connsiteX0" y="connsiteY0"/>
-                </a:cxn>
-                <a:cxn ang="0">
-                  <a:pos x="connsiteX1" y="connsiteY1"/>
-                </a:cxn>
-                <a:cxn ang="0">
-                  <a:pos x="connsiteX2" y="connsiteY2"/>
-                </a:cxn>
-                <a:cxn ang="0">
-                  <a:pos x="connsiteX3" y="connsiteY3"/>
-                </a:cxn>
-                <a:cxn ang="0">
-                  <a:pos x="connsiteX4" y="connsiteY4"/>
-                </a:cxn>
-                <a:cxn ang="0">
-                  <a:pos x="connsiteX5" y="connsiteY5"/>
-                </a:cxn>
-              </a:cxnLst>
-              <a:rect l="l" t="t" r="r" b="b"/>
-              <a:pathLst>
-                <a:path w="576496" h="874400">
-                  <a:moveTo>
-                    <a:pt x="0" y="213360"/>
-                  </a:moveTo>
-                  <a:lnTo>
-                    <a:pt x="121920" y="0"/>
-                  </a:lnTo>
-                  <a:lnTo>
-                    <a:pt x="576496" y="10304"/>
-                  </a:lnTo>
-                  <a:lnTo>
-                    <a:pt x="576496" y="874400"/>
-                  </a:lnTo>
-                  <a:lnTo>
-                    <a:pt x="432" y="874400"/>
-                  </a:lnTo>
-                  <a:lnTo>
-                    <a:pt x="0" y="213360"/>
-                  </a:lnTo>
-                  <a:close/>
-                </a:path>
-              </a:pathLst>
-            </a:custGeom>
-            <a:solidFill>
-              <a:schemeClr val="bg2">
-                <a:lumMod val="90000"/>
-              </a:schemeClr>
-            </a:solidFill>
-            <a:ln w="9525"/>
-            <a:effectLst>
-              <a:outerShdw blurRad="50800" dist="38100" algn="l" rotWithShape="0">
-                <a:prstClr val="black">
-                  <a:alpha val="40000"/>
-                </a:prstClr>
-              </a:outerShdw>
-            </a:effectLst>
-          </p:spPr>
-          <p:style>
-            <a:lnRef idx="2">
-              <a:schemeClr val="accent3">
-                <a:shade val="50000"/>
-              </a:schemeClr>
-            </a:lnRef>
-            <a:fillRef idx="1">
-              <a:schemeClr val="accent3"/>
-            </a:fillRef>
-            <a:effectRef idx="0">
-              <a:schemeClr val="accent3"/>
-            </a:effectRef>
-            <a:fontRef idx="minor">
-              <a:schemeClr val="lt1"/>
-            </a:fontRef>
-          </p:style>
-          <p:txBody>
-            <a:bodyPr rtlCol="0" anchor="ctr"/>
-            <a:lstStyle/>
-            <a:p>
-              <a:pPr algn="ctr"/>
-              <a:endParaRPr lang="pl-PL"/>
-            </a:p>
-          </p:txBody>
-        </p:sp>
-        <p:sp>
-          <p:nvSpPr>
-            <p:cNvPr id="7" name="pole tekstowe 6"/>
-            <p:cNvSpPr txBox="1"/>
-            <p:nvPr/>
-          </p:nvSpPr>
-          <p:spPr>
-            <a:xfrm>
-              <a:off x="1547664" y="2175510"/>
-              <a:ext cx="792088" cy="369332"/>
-            </a:xfrm>
-            <a:prstGeom prst="rect">
-              <a:avLst/>
-            </a:prstGeom>
-            <a:noFill/>
-          </p:spPr>
-          <p:txBody>
-            <a:bodyPr wrap="square" rtlCol="0">
-              <a:spAutoFit/>
-            </a:bodyPr>
-            <a:lstStyle/>
-            <a:p>
-              <a:pPr algn="ctr"/>
-              <a:r>
-                <a:rPr lang="pl-PL" dirty="0" err="1" smtClean="0"/>
-                <a:t>Scene</a:t>
-              </a:r>
-              <a:r>
-                <a:rPr lang="pl-PL" dirty="0" smtClean="0"/>
-                <a:t> </a:t>
-              </a:r>
-              <a:endParaRPr lang="pl-PL" dirty="0"/>
-            </a:p>
-          </p:txBody>
-        </p:sp>
-      </p:grpSp>
       <p:sp>
         <p:nvSpPr>
           <p:cNvPr id="8" name="Prostokąt 7"/>
@@ -8892,12 +11682,12 @@
         <p:spPr>
           <a:xfrm>
             <a:off x="2339752" y="2354084"/>
-            <a:ext cx="648072" cy="0"/>
+            <a:ext cx="568119" cy="0"/>
           </a:xfrm>
           <a:prstGeom prst="straightConnector1">
             <a:avLst/>
           </a:prstGeom>
-          <a:ln>
+          <a:ln w="19050">
             <a:tailEnd type="arrow"/>
           </a:ln>
         </p:spPr>
@@ -8923,16 +11713,16 @@
           <p:nvPr/>
         </p:nvCxnSpPr>
         <p:spPr>
-          <a:xfrm flipV="1">
-            <a:off x="863588" y="2636912"/>
-            <a:ext cx="2124236" cy="292596"/>
+          <a:xfrm>
+            <a:off x="1259632" y="2689461"/>
+            <a:ext cx="1648240" cy="12700"/>
           </a:xfrm>
           <a:prstGeom prst="bentConnector3">
             <a:avLst>
-              <a:gd name="adj1" fmla="val 75110"/>
+              <a:gd name="adj1" fmla="val 50000"/>
             </a:avLst>
           </a:prstGeom>
-          <a:ln>
+          <a:ln w="19050">
             <a:tailEnd type="arrow"/>
           </a:ln>
         </p:spPr>
@@ -9118,7 +11908,7 @@
           <a:prstGeom prst="straightConnector1">
             <a:avLst/>
           </a:prstGeom>
-          <a:ln>
+          <a:ln w="19050">
             <a:tailEnd type="arrow"/>
           </a:ln>
         </p:spPr>
@@ -9202,7 +11992,7 @@
           <a:prstGeom prst="bentConnector2">
             <a:avLst/>
           </a:prstGeom>
-          <a:ln>
+          <a:ln w="19050">
             <a:tailEnd type="arrow"/>
           </a:ln>
         </p:spPr>
@@ -9237,7 +12027,7 @@
               <a:gd name="adj1" fmla="val 1174"/>
             </a:avLst>
           </a:prstGeom>
-          <a:ln>
+          <a:ln w="19050">
             <a:tailEnd type="none"/>
           </a:ln>
         </p:spPr>
@@ -10105,7 +12895,7 @@
           <a:prstGeom prst="bentConnector2">
             <a:avLst/>
           </a:prstGeom>
-          <a:ln>
+          <a:ln w="19050">
             <a:tailEnd type="arrow"/>
           </a:ln>
         </p:spPr>
@@ -10357,7 +13147,7 @@
           <a:prstGeom prst="bentConnector2">
             <a:avLst/>
           </a:prstGeom>
-          <a:ln>
+          <a:ln w="19050">
             <a:tailEnd type="arrow"/>
           </a:ln>
         </p:spPr>
@@ -10613,7 +13403,7 @@
           <a:prstGeom prst="straightConnector1">
             <a:avLst/>
           </a:prstGeom>
-          <a:ln>
+          <a:ln w="19050">
             <a:tailEnd type="arrow"/>
           </a:ln>
         </p:spPr>
@@ -11272,7 +14062,7 @@
           <a:prstGeom prst="straightConnector1">
             <a:avLst/>
           </a:prstGeom>
-          <a:ln>
+          <a:ln w="19050">
             <a:tailEnd type="arrow"/>
           </a:ln>
         </p:spPr>
@@ -11307,7 +14097,7 @@
               <a:gd name="adj1" fmla="val -728"/>
             </a:avLst>
           </a:prstGeom>
-          <a:ln>
+          <a:ln w="19050">
             <a:tailEnd type="arrow"/>
           </a:ln>
         </p:spPr>
@@ -11342,7 +14132,7 @@
           <a:prstGeom prst="straightConnector1">
             <a:avLst/>
           </a:prstGeom>
-          <a:ln>
+          <a:ln w="19050">
             <a:tailEnd type="arrow"/>
           </a:ln>
         </p:spPr>
@@ -11377,7 +14167,7 @@
           <a:prstGeom prst="straightConnector1">
             <a:avLst/>
           </a:prstGeom>
-          <a:ln>
+          <a:ln w="19050">
             <a:tailEnd type="arrow"/>
           </a:ln>
         </p:spPr>
@@ -11426,6 +14216,228 @@
           </a:p>
         </p:txBody>
       </p:sp>
+      <p:grpSp>
+        <p:nvGrpSpPr>
+          <p:cNvPr id="62" name="Grupa 61"/>
+          <p:cNvGrpSpPr/>
+          <p:nvPr/>
+        </p:nvGrpSpPr>
+        <p:grpSpPr>
+          <a:xfrm>
+            <a:off x="1547664" y="1772816"/>
+            <a:ext cx="792088" cy="1080120"/>
+            <a:chOff x="1547664" y="1772816"/>
+            <a:chExt cx="792088" cy="1080120"/>
+          </a:xfrm>
+        </p:grpSpPr>
+        <p:sp>
+          <p:nvSpPr>
+            <p:cNvPr id="6" name="Prostokąt 3"/>
+            <p:cNvSpPr/>
+            <p:nvPr/>
+          </p:nvSpPr>
+          <p:spPr>
+            <a:xfrm>
+              <a:off x="1547664" y="1772816"/>
+              <a:ext cx="792088" cy="1080120"/>
+            </a:xfrm>
+            <a:custGeom>
+              <a:avLst/>
+              <a:gdLst>
+                <a:gd name="connsiteX0" fmla="*/ 0 w 576064"/>
+                <a:gd name="connsiteY0" fmla="*/ 0 h 864096"/>
+                <a:gd name="connsiteX1" fmla="*/ 576064 w 576064"/>
+                <a:gd name="connsiteY1" fmla="*/ 0 h 864096"/>
+                <a:gd name="connsiteX2" fmla="*/ 576064 w 576064"/>
+                <a:gd name="connsiteY2" fmla="*/ 864096 h 864096"/>
+                <a:gd name="connsiteX3" fmla="*/ 0 w 576064"/>
+                <a:gd name="connsiteY3" fmla="*/ 864096 h 864096"/>
+                <a:gd name="connsiteX4" fmla="*/ 0 w 576064"/>
+                <a:gd name="connsiteY4" fmla="*/ 0 h 864096"/>
+                <a:gd name="connsiteX0" fmla="*/ 432 w 576496"/>
+                <a:gd name="connsiteY0" fmla="*/ 0 h 864096"/>
+                <a:gd name="connsiteX1" fmla="*/ 576496 w 576496"/>
+                <a:gd name="connsiteY1" fmla="*/ 0 h 864096"/>
+                <a:gd name="connsiteX2" fmla="*/ 576496 w 576496"/>
+                <a:gd name="connsiteY2" fmla="*/ 864096 h 864096"/>
+                <a:gd name="connsiteX3" fmla="*/ 432 w 576496"/>
+                <a:gd name="connsiteY3" fmla="*/ 864096 h 864096"/>
+                <a:gd name="connsiteX4" fmla="*/ 0 w 576496"/>
+                <a:gd name="connsiteY4" fmla="*/ 355456 h 864096"/>
+                <a:gd name="connsiteX5" fmla="*/ 432 w 576496"/>
+                <a:gd name="connsiteY5" fmla="*/ 0 h 864096"/>
+                <a:gd name="connsiteX0" fmla="*/ 432 w 576496"/>
+                <a:gd name="connsiteY0" fmla="*/ 10304 h 874400"/>
+                <a:gd name="connsiteX1" fmla="*/ 243840 w 576496"/>
+                <a:gd name="connsiteY1" fmla="*/ 0 h 874400"/>
+                <a:gd name="connsiteX2" fmla="*/ 576496 w 576496"/>
+                <a:gd name="connsiteY2" fmla="*/ 10304 h 874400"/>
+                <a:gd name="connsiteX3" fmla="*/ 576496 w 576496"/>
+                <a:gd name="connsiteY3" fmla="*/ 874400 h 874400"/>
+                <a:gd name="connsiteX4" fmla="*/ 432 w 576496"/>
+                <a:gd name="connsiteY4" fmla="*/ 874400 h 874400"/>
+                <a:gd name="connsiteX5" fmla="*/ 0 w 576496"/>
+                <a:gd name="connsiteY5" fmla="*/ 365760 h 874400"/>
+                <a:gd name="connsiteX6" fmla="*/ 432 w 576496"/>
+                <a:gd name="connsiteY6" fmla="*/ 10304 h 874400"/>
+                <a:gd name="connsiteX0" fmla="*/ 0 w 576496"/>
+                <a:gd name="connsiteY0" fmla="*/ 365760 h 874400"/>
+                <a:gd name="connsiteX1" fmla="*/ 243840 w 576496"/>
+                <a:gd name="connsiteY1" fmla="*/ 0 h 874400"/>
+                <a:gd name="connsiteX2" fmla="*/ 576496 w 576496"/>
+                <a:gd name="connsiteY2" fmla="*/ 10304 h 874400"/>
+                <a:gd name="connsiteX3" fmla="*/ 576496 w 576496"/>
+                <a:gd name="connsiteY3" fmla="*/ 874400 h 874400"/>
+                <a:gd name="connsiteX4" fmla="*/ 432 w 576496"/>
+                <a:gd name="connsiteY4" fmla="*/ 874400 h 874400"/>
+                <a:gd name="connsiteX5" fmla="*/ 0 w 576496"/>
+                <a:gd name="connsiteY5" fmla="*/ 365760 h 874400"/>
+                <a:gd name="connsiteX0" fmla="*/ 0 w 576496"/>
+                <a:gd name="connsiteY0" fmla="*/ 213360 h 874400"/>
+                <a:gd name="connsiteX1" fmla="*/ 243840 w 576496"/>
+                <a:gd name="connsiteY1" fmla="*/ 0 h 874400"/>
+                <a:gd name="connsiteX2" fmla="*/ 576496 w 576496"/>
+                <a:gd name="connsiteY2" fmla="*/ 10304 h 874400"/>
+                <a:gd name="connsiteX3" fmla="*/ 576496 w 576496"/>
+                <a:gd name="connsiteY3" fmla="*/ 874400 h 874400"/>
+                <a:gd name="connsiteX4" fmla="*/ 432 w 576496"/>
+                <a:gd name="connsiteY4" fmla="*/ 874400 h 874400"/>
+                <a:gd name="connsiteX5" fmla="*/ 0 w 576496"/>
+                <a:gd name="connsiteY5" fmla="*/ 213360 h 874400"/>
+                <a:gd name="connsiteX0" fmla="*/ 0 w 576496"/>
+                <a:gd name="connsiteY0" fmla="*/ 213360 h 874400"/>
+                <a:gd name="connsiteX1" fmla="*/ 121920 w 576496"/>
+                <a:gd name="connsiteY1" fmla="*/ 0 h 874400"/>
+                <a:gd name="connsiteX2" fmla="*/ 576496 w 576496"/>
+                <a:gd name="connsiteY2" fmla="*/ 10304 h 874400"/>
+                <a:gd name="connsiteX3" fmla="*/ 576496 w 576496"/>
+                <a:gd name="connsiteY3" fmla="*/ 874400 h 874400"/>
+                <a:gd name="connsiteX4" fmla="*/ 432 w 576496"/>
+                <a:gd name="connsiteY4" fmla="*/ 874400 h 874400"/>
+                <a:gd name="connsiteX5" fmla="*/ 0 w 576496"/>
+                <a:gd name="connsiteY5" fmla="*/ 213360 h 874400"/>
+              </a:gdLst>
+              <a:ahLst/>
+              <a:cxnLst>
+                <a:cxn ang="0">
+                  <a:pos x="connsiteX0" y="connsiteY0"/>
+                </a:cxn>
+                <a:cxn ang="0">
+                  <a:pos x="connsiteX1" y="connsiteY1"/>
+                </a:cxn>
+                <a:cxn ang="0">
+                  <a:pos x="connsiteX2" y="connsiteY2"/>
+                </a:cxn>
+                <a:cxn ang="0">
+                  <a:pos x="connsiteX3" y="connsiteY3"/>
+                </a:cxn>
+                <a:cxn ang="0">
+                  <a:pos x="connsiteX4" y="connsiteY4"/>
+                </a:cxn>
+                <a:cxn ang="0">
+                  <a:pos x="connsiteX5" y="connsiteY5"/>
+                </a:cxn>
+              </a:cxnLst>
+              <a:rect l="l" t="t" r="r" b="b"/>
+              <a:pathLst>
+                <a:path w="576496" h="874400">
+                  <a:moveTo>
+                    <a:pt x="0" y="213360"/>
+                  </a:moveTo>
+                  <a:lnTo>
+                    <a:pt x="121920" y="0"/>
+                  </a:lnTo>
+                  <a:lnTo>
+                    <a:pt x="576496" y="10304"/>
+                  </a:lnTo>
+                  <a:lnTo>
+                    <a:pt x="576496" y="874400"/>
+                  </a:lnTo>
+                  <a:lnTo>
+                    <a:pt x="432" y="874400"/>
+                  </a:lnTo>
+                  <a:lnTo>
+                    <a:pt x="0" y="213360"/>
+                  </a:lnTo>
+                  <a:close/>
+                </a:path>
+              </a:pathLst>
+            </a:custGeom>
+            <a:solidFill>
+              <a:schemeClr val="bg2">
+                <a:lumMod val="90000"/>
+              </a:schemeClr>
+            </a:solidFill>
+            <a:ln w="9525"/>
+            <a:effectLst>
+              <a:outerShdw blurRad="50800" dist="38100" algn="l" rotWithShape="0">
+                <a:prstClr val="black">
+                  <a:alpha val="40000"/>
+                </a:prstClr>
+              </a:outerShdw>
+            </a:effectLst>
+          </p:spPr>
+          <p:style>
+            <a:lnRef idx="2">
+              <a:schemeClr val="accent3">
+                <a:shade val="50000"/>
+              </a:schemeClr>
+            </a:lnRef>
+            <a:fillRef idx="1">
+              <a:schemeClr val="accent3"/>
+            </a:fillRef>
+            <a:effectRef idx="0">
+              <a:schemeClr val="accent3"/>
+            </a:effectRef>
+            <a:fontRef idx="minor">
+              <a:schemeClr val="lt1"/>
+            </a:fontRef>
+          </p:style>
+          <p:txBody>
+            <a:bodyPr rtlCol="0" anchor="ctr"/>
+            <a:lstStyle/>
+            <a:p>
+              <a:pPr algn="ctr"/>
+              <a:endParaRPr lang="pl-PL"/>
+            </a:p>
+          </p:txBody>
+        </p:sp>
+        <p:sp>
+          <p:nvSpPr>
+            <p:cNvPr id="7" name="pole tekstowe 6"/>
+            <p:cNvSpPr txBox="1"/>
+            <p:nvPr/>
+          </p:nvSpPr>
+          <p:spPr>
+            <a:xfrm>
+              <a:off x="1547664" y="2175510"/>
+              <a:ext cx="792088" cy="369332"/>
+            </a:xfrm>
+            <a:prstGeom prst="rect">
+              <a:avLst/>
+            </a:prstGeom>
+            <a:noFill/>
+          </p:spPr>
+          <p:txBody>
+            <a:bodyPr wrap="square" rtlCol="0">
+              <a:spAutoFit/>
+            </a:bodyPr>
+            <a:lstStyle/>
+            <a:p>
+              <a:pPr algn="ctr"/>
+              <a:r>
+                <a:rPr lang="pl-PL" dirty="0" err="1" smtClean="0"/>
+                <a:t>Scene</a:t>
+              </a:r>
+              <a:r>
+                <a:rPr lang="pl-PL" dirty="0" smtClean="0"/>
+                <a:t> </a:t>
+              </a:r>
+              <a:endParaRPr lang="pl-PL" dirty="0"/>
+            </a:p>
+          </p:txBody>
+        </p:sp>
+      </p:grpSp>
     </p:spTree>
     <p:extLst>
       <p:ext uri="{BB962C8B-B14F-4D97-AF65-F5344CB8AC3E}">
@@ -11436,6 +14448,13 @@
   <p:clrMapOvr>
     <a:masterClrMapping/>
   </p:clrMapOvr>
+  <p:timing>
+    <p:tnLst>
+      <p:par>
+        <p:cTn id="1" dur="indefinite" restart="never" nodeType="tmRoot"/>
+      </p:par>
+    </p:tnLst>
+  </p:timing>
 </p:sld>
 </file>
 
@@ -11500,7 +14519,9 @@
           </a:xfrm>
         </p:spPr>
         <p:txBody>
-          <a:bodyPr/>
+          <a:bodyPr>
+            <a:normAutofit fontScale="92500" lnSpcReduction="10000"/>
+          </a:bodyPr>
           <a:lstStyle/>
           <a:p>
             <a:pPr marL="0" indent="0">
@@ -11557,10 +14578,6 @@
           <a:p>
             <a:pPr lvl="1"/>
             <a:r>
-              <a:rPr lang="en-US" dirty="0" smtClean="0"/>
-              <a:t> </a:t>
-            </a:r>
-            <a:r>
               <a:rPr lang="pl-PL" dirty="0" smtClean="0"/>
               <a:t>M</a:t>
             </a:r>
@@ -11575,6 +14592,14 @@
             <a:r>
               <a:rPr lang="en-US" dirty="0" err="1" smtClean="0"/>
               <a:t>Unittest</a:t>
+            </a:r>
+            <a:endParaRPr lang="pl-PL" dirty="0" smtClean="0"/>
+          </a:p>
+          <a:p>
+            <a:pPr lvl="1"/>
+            <a:r>
+              <a:rPr lang="pl-PL" dirty="0" err="1" smtClean="0"/>
+              <a:t>PyLint</a:t>
             </a:r>
             <a:endParaRPr lang="pl-PL" dirty="0"/>
           </a:p>
@@ -11942,7 +14967,11 @@
             </a:r>
             <a:r>
               <a:rPr lang="pl-PL" dirty="0" smtClean="0"/>
-              <a:t> File – x3d</a:t>
+              <a:t> File – </a:t>
+            </a:r>
+            <a:r>
+              <a:rPr lang="pl-PL" dirty="0" smtClean="0"/>
+              <a:t>X3D</a:t>
             </a:r>
             <a:endParaRPr lang="pl-PL" dirty="0"/>
           </a:p>

</xml_diff>

<commit_message>
Summary of alfirt tags
</commit_message>
<xml_diff>
--- a/documentation/presentation/general_overview.pptx
+++ b/documentation/presentation/general_overview.pptx
@@ -1047,6 +1047,13 @@
         </dgm:presLayoutVars>
       </dgm:prSet>
       <dgm:spPr/>
+      <dgm:t>
+        <a:bodyPr/>
+        <a:lstStyle/>
+        <a:p>
+          <a:endParaRPr lang="pl-PL"/>
+        </a:p>
+      </dgm:t>
     </dgm:pt>
     <dgm:pt modelId="{2650CDCD-BD59-4689-B3A0-2FCCA7BA5183}" type="pres">
       <dgm:prSet presAssocID="{6D0BDA8A-561A-4746-834E-1E307670056F}" presName="node" presStyleLbl="node1" presStyleIdx="0" presStyleCnt="3">
@@ -1066,10 +1073,24 @@
     <dgm:pt modelId="{E4F97650-C89E-4923-B5EF-545DCC98081C}" type="pres">
       <dgm:prSet presAssocID="{D6A1622A-123C-4819-A9A9-D26D36058771}" presName="sibTrans" presStyleLbl="sibTrans2D1" presStyleIdx="0" presStyleCnt="2"/>
       <dgm:spPr/>
+      <dgm:t>
+        <a:bodyPr/>
+        <a:lstStyle/>
+        <a:p>
+          <a:endParaRPr lang="pl-PL"/>
+        </a:p>
+      </dgm:t>
     </dgm:pt>
     <dgm:pt modelId="{96B76099-9FD5-4F71-BDF7-B3B560BDD894}" type="pres">
       <dgm:prSet presAssocID="{D6A1622A-123C-4819-A9A9-D26D36058771}" presName="connectorText" presStyleLbl="sibTrans2D1" presStyleIdx="0" presStyleCnt="2"/>
       <dgm:spPr/>
+      <dgm:t>
+        <a:bodyPr/>
+        <a:lstStyle/>
+        <a:p>
+          <a:endParaRPr lang="pl-PL"/>
+        </a:p>
+      </dgm:t>
     </dgm:pt>
     <dgm:pt modelId="{4F85E089-1A31-4F0F-A34D-A577B8C1EE33}" type="pres">
       <dgm:prSet presAssocID="{502AFD98-086D-4506-8435-BE95B6DBDC00}" presName="node" presStyleLbl="node1" presStyleIdx="1" presStyleCnt="3">
@@ -1089,10 +1110,24 @@
     <dgm:pt modelId="{D106EF5F-5160-4557-8B87-7A38B2711F7D}" type="pres">
       <dgm:prSet presAssocID="{82D7D5F1-50EA-49F6-856E-8E2F47E7F229}" presName="sibTrans" presStyleLbl="sibTrans2D1" presStyleIdx="1" presStyleCnt="2"/>
       <dgm:spPr/>
+      <dgm:t>
+        <a:bodyPr/>
+        <a:lstStyle/>
+        <a:p>
+          <a:endParaRPr lang="pl-PL"/>
+        </a:p>
+      </dgm:t>
     </dgm:pt>
     <dgm:pt modelId="{F955885F-A015-4BB5-A5D0-DA5B4ADBAFA7}" type="pres">
       <dgm:prSet presAssocID="{82D7D5F1-50EA-49F6-856E-8E2F47E7F229}" presName="connectorText" presStyleLbl="sibTrans2D1" presStyleIdx="1" presStyleCnt="2"/>
       <dgm:spPr/>
+      <dgm:t>
+        <a:bodyPr/>
+        <a:lstStyle/>
+        <a:p>
+          <a:endParaRPr lang="pl-PL"/>
+        </a:p>
+      </dgm:t>
     </dgm:pt>
     <dgm:pt modelId="{C6E1C9EA-6382-473E-865F-A63B4B2ECB93}" type="pres">
       <dgm:prSet presAssocID="{FD321F01-0F04-4CAA-84BD-34FCAF62FA6B}" presName="node" presStyleLbl="node1" presStyleIdx="2" presStyleCnt="3">
@@ -1111,17 +1146,17 @@
     </dgm:pt>
   </dgm:ptLst>
   <dgm:cxnLst>
+    <dgm:cxn modelId="{EC82A49E-F994-4D90-AE23-4D065D6738D7}" type="presOf" srcId="{D6A1622A-123C-4819-A9A9-D26D36058771}" destId="{E4F97650-C89E-4923-B5EF-545DCC98081C}" srcOrd="0" destOrd="0" presId="urn:microsoft.com/office/officeart/2005/8/layout/process1"/>
+    <dgm:cxn modelId="{78D59B7E-678D-4E7E-83C7-AA91BC4B1B6A}" srcId="{1F889F6B-99AE-48E8-B980-C302E82B165F}" destId="{6D0BDA8A-561A-4746-834E-1E307670056F}" srcOrd="0" destOrd="0" parTransId="{A2D97AC3-F07B-4CED-9E1B-19A6FE63C467}" sibTransId="{D6A1622A-123C-4819-A9A9-D26D36058771}"/>
+    <dgm:cxn modelId="{8B7860B9-DE2F-4113-AF6C-725F4283353C}" srcId="{1F889F6B-99AE-48E8-B980-C302E82B165F}" destId="{502AFD98-086D-4506-8435-BE95B6DBDC00}" srcOrd="1" destOrd="0" parTransId="{8C1045EB-01F3-4A16-9BB3-317A651E7636}" sibTransId="{82D7D5F1-50EA-49F6-856E-8E2F47E7F229}"/>
+    <dgm:cxn modelId="{CB41A144-BB8D-41F7-8371-113546E6DFD1}" srcId="{1F889F6B-99AE-48E8-B980-C302E82B165F}" destId="{FD321F01-0F04-4CAA-84BD-34FCAF62FA6B}" srcOrd="2" destOrd="0" parTransId="{4A6FBC04-4DBB-4C4D-A975-996677D9147C}" sibTransId="{944BFB0B-4F93-419F-82D9-2710920037CF}"/>
+    <dgm:cxn modelId="{E5FBC57C-4BBB-4FBB-B072-F534D94EA9C8}" type="presOf" srcId="{82D7D5F1-50EA-49F6-856E-8E2F47E7F229}" destId="{F955885F-A015-4BB5-A5D0-DA5B4ADBAFA7}" srcOrd="1" destOrd="0" presId="urn:microsoft.com/office/officeart/2005/8/layout/process1"/>
+    <dgm:cxn modelId="{833A2221-05AC-4701-A63D-BF8B32B0E681}" type="presOf" srcId="{FD321F01-0F04-4CAA-84BD-34FCAF62FA6B}" destId="{C6E1C9EA-6382-473E-865F-A63B4B2ECB93}" srcOrd="0" destOrd="0" presId="urn:microsoft.com/office/officeart/2005/8/layout/process1"/>
     <dgm:cxn modelId="{50817C4F-E9B0-47FE-8678-6E83ACE986B7}" type="presOf" srcId="{6D0BDA8A-561A-4746-834E-1E307670056F}" destId="{2650CDCD-BD59-4689-B3A0-2FCCA7BA5183}" srcOrd="0" destOrd="0" presId="urn:microsoft.com/office/officeart/2005/8/layout/process1"/>
+    <dgm:cxn modelId="{0D4A9A4A-4F3B-4DC6-8061-AC054193EFDA}" type="presOf" srcId="{1F889F6B-99AE-48E8-B980-C302E82B165F}" destId="{D2975970-A2C3-4E93-AED0-45141671E107}" srcOrd="0" destOrd="0" presId="urn:microsoft.com/office/officeart/2005/8/layout/process1"/>
+    <dgm:cxn modelId="{764D3507-7E01-4EAD-99E6-3E9EB77E6C01}" type="presOf" srcId="{82D7D5F1-50EA-49F6-856E-8E2F47E7F229}" destId="{D106EF5F-5160-4557-8B87-7A38B2711F7D}" srcOrd="0" destOrd="0" presId="urn:microsoft.com/office/officeart/2005/8/layout/process1"/>
     <dgm:cxn modelId="{D34BF8F6-C5D5-4299-AEF8-56D8A965D8FF}" type="presOf" srcId="{D6A1622A-123C-4819-A9A9-D26D36058771}" destId="{96B76099-9FD5-4F71-BDF7-B3B560BDD894}" srcOrd="1" destOrd="0" presId="urn:microsoft.com/office/officeart/2005/8/layout/process1"/>
-    <dgm:cxn modelId="{E5FBC57C-4BBB-4FBB-B072-F534D94EA9C8}" type="presOf" srcId="{82D7D5F1-50EA-49F6-856E-8E2F47E7F229}" destId="{F955885F-A015-4BB5-A5D0-DA5B4ADBAFA7}" srcOrd="1" destOrd="0" presId="urn:microsoft.com/office/officeart/2005/8/layout/process1"/>
-    <dgm:cxn modelId="{EC82A49E-F994-4D90-AE23-4D065D6738D7}" type="presOf" srcId="{D6A1622A-123C-4819-A9A9-D26D36058771}" destId="{E4F97650-C89E-4923-B5EF-545DCC98081C}" srcOrd="0" destOrd="0" presId="urn:microsoft.com/office/officeart/2005/8/layout/process1"/>
-    <dgm:cxn modelId="{833A2221-05AC-4701-A63D-BF8B32B0E681}" type="presOf" srcId="{FD321F01-0F04-4CAA-84BD-34FCAF62FA6B}" destId="{C6E1C9EA-6382-473E-865F-A63B4B2ECB93}" srcOrd="0" destOrd="0" presId="urn:microsoft.com/office/officeart/2005/8/layout/process1"/>
     <dgm:cxn modelId="{D4C6ABF7-2F57-4BAF-8166-E142FF1A0F34}" type="presOf" srcId="{502AFD98-086D-4506-8435-BE95B6DBDC00}" destId="{4F85E089-1A31-4F0F-A34D-A577B8C1EE33}" srcOrd="0" destOrd="0" presId="urn:microsoft.com/office/officeart/2005/8/layout/process1"/>
-    <dgm:cxn modelId="{0D4A9A4A-4F3B-4DC6-8061-AC054193EFDA}" type="presOf" srcId="{1F889F6B-99AE-48E8-B980-C302E82B165F}" destId="{D2975970-A2C3-4E93-AED0-45141671E107}" srcOrd="0" destOrd="0" presId="urn:microsoft.com/office/officeart/2005/8/layout/process1"/>
-    <dgm:cxn modelId="{CB41A144-BB8D-41F7-8371-113546E6DFD1}" srcId="{1F889F6B-99AE-48E8-B980-C302E82B165F}" destId="{FD321F01-0F04-4CAA-84BD-34FCAF62FA6B}" srcOrd="2" destOrd="0" parTransId="{4A6FBC04-4DBB-4C4D-A975-996677D9147C}" sibTransId="{944BFB0B-4F93-419F-82D9-2710920037CF}"/>
-    <dgm:cxn modelId="{8B7860B9-DE2F-4113-AF6C-725F4283353C}" srcId="{1F889F6B-99AE-48E8-B980-C302E82B165F}" destId="{502AFD98-086D-4506-8435-BE95B6DBDC00}" srcOrd="1" destOrd="0" parTransId="{8C1045EB-01F3-4A16-9BB3-317A651E7636}" sibTransId="{82D7D5F1-50EA-49F6-856E-8E2F47E7F229}"/>
-    <dgm:cxn modelId="{764D3507-7E01-4EAD-99E6-3E9EB77E6C01}" type="presOf" srcId="{82D7D5F1-50EA-49F6-856E-8E2F47E7F229}" destId="{D106EF5F-5160-4557-8B87-7A38B2711F7D}" srcOrd="0" destOrd="0" presId="urn:microsoft.com/office/officeart/2005/8/layout/process1"/>
-    <dgm:cxn modelId="{78D59B7E-678D-4E7E-83C7-AA91BC4B1B6A}" srcId="{1F889F6B-99AE-48E8-B980-C302E82B165F}" destId="{6D0BDA8A-561A-4746-834E-1E307670056F}" srcOrd="0" destOrd="0" parTransId="{A2D97AC3-F07B-4CED-9E1B-19A6FE63C467}" sibTransId="{D6A1622A-123C-4819-A9A9-D26D36058771}"/>
     <dgm:cxn modelId="{DF07863A-56A8-4611-BA53-23BF7E29FA8A}" type="presParOf" srcId="{D2975970-A2C3-4E93-AED0-45141671E107}" destId="{2650CDCD-BD59-4689-B3A0-2FCCA7BA5183}" srcOrd="0" destOrd="0" presId="urn:microsoft.com/office/officeart/2005/8/layout/process1"/>
     <dgm:cxn modelId="{CFD15A54-80E8-4E66-B76D-A57BA0E113DE}" type="presParOf" srcId="{D2975970-A2C3-4E93-AED0-45141671E107}" destId="{E4F97650-C89E-4923-B5EF-545DCC98081C}" srcOrd="1" destOrd="0" presId="urn:microsoft.com/office/officeart/2005/8/layout/process1"/>
     <dgm:cxn modelId="{0C37F1A4-DCBE-4984-AF68-6F8FB944A403}" type="presParOf" srcId="{E4F97650-C89E-4923-B5EF-545DCC98081C}" destId="{96B76099-9FD5-4F71-BDF7-B3B560BDD894}" srcOrd="0" destOrd="0" presId="urn:microsoft.com/office/officeart/2005/8/layout/process1"/>
@@ -7197,18 +7232,14 @@
           <a:lstStyle/>
           <a:p>
             <a:r>
-              <a:rPr lang="pl-PL" dirty="0" err="1" smtClean="0"/>
+              <a:rPr lang="en-US" dirty="0" err="1" smtClean="0"/>
               <a:t>Alfirt</a:t>
             </a:r>
             <a:r>
-              <a:rPr lang="pl-PL" dirty="0" smtClean="0"/>
-              <a:t> </a:t>
-            </a:r>
-            <a:r>
-              <a:rPr lang="pl-PL" dirty="0" err="1" smtClean="0"/>
-              <a:t>TAGs</a:t>
-            </a:r>
-            <a:endParaRPr lang="pl-PL" dirty="0"/>
+              <a:rPr lang="en-US" dirty="0" smtClean="0"/>
+              <a:t> TAGs</a:t>
+            </a:r>
+            <a:endParaRPr lang="en-US" dirty="0"/>
           </a:p>
         </p:txBody>
       </p:sp>
@@ -7222,55 +7253,87 @@
             <p:ph idx="1"/>
           </p:nvPr>
         </p:nvSpPr>
-        <p:spPr/>
+        <p:spPr>
+          <a:xfrm>
+            <a:off x="2438400" y="2286001"/>
+            <a:ext cx="6382072" cy="1863080"/>
+          </a:xfrm>
+        </p:spPr>
         <p:txBody>
           <a:bodyPr/>
           <a:lstStyle/>
           <a:p>
+            <a:r>
+              <a:rPr lang="en-US" dirty="0" smtClean="0"/>
+              <a:t>How to add information about position of object ?</a:t>
+            </a:r>
+          </a:p>
+          <a:p>
+            <a:r>
+              <a:rPr lang="en-US" dirty="0" smtClean="0"/>
+              <a:t>How to add information about the camera?</a:t>
+            </a:r>
+            <a:endParaRPr lang="pl-PL" dirty="0" smtClean="0"/>
+          </a:p>
+          <a:p>
             <a:pPr marL="0" indent="0">
               <a:buNone/>
             </a:pPr>
             <a:r>
-              <a:rPr lang="pl-PL" dirty="0" smtClean="0"/>
-              <a:t>TODO: </a:t>
-            </a:r>
-            <a:r>
-              <a:rPr lang="pl-PL" dirty="0" err="1" smtClean="0"/>
-              <a:t>add</a:t>
-            </a:r>
-            <a:r>
-              <a:rPr lang="pl-PL" dirty="0" smtClean="0"/>
-              <a:t> the idea </a:t>
-            </a:r>
-            <a:r>
-              <a:rPr lang="pl-PL" dirty="0" err="1" smtClean="0"/>
-              <a:t>behind</a:t>
-            </a:r>
-            <a:r>
-              <a:rPr lang="pl-PL" dirty="0" smtClean="0"/>
-              <a:t> the </a:t>
-            </a:r>
-            <a:r>
-              <a:rPr lang="pl-PL" dirty="0" err="1" smtClean="0"/>
-              <a:t>alfirt</a:t>
-            </a:r>
-            <a:r>
-              <a:rPr lang="pl-PL" dirty="0" smtClean="0"/>
-              <a:t> </a:t>
-            </a:r>
-            <a:r>
-              <a:rPr lang="pl-PL" dirty="0" err="1" smtClean="0"/>
-              <a:t>namespace</a:t>
-            </a:r>
-            <a:r>
-              <a:rPr lang="pl-PL" dirty="0" smtClean="0"/>
-              <a:t> and </a:t>
-            </a:r>
-            <a:r>
-              <a:rPr lang="pl-PL" dirty="0" err="1" smtClean="0"/>
-              <a:t>tags</a:t>
-            </a:r>
-            <a:endParaRPr lang="pl-PL" dirty="0"/>
+              <a:rPr lang="en-US" b="1" dirty="0" smtClean="0"/>
+              <a:t>Answer:</a:t>
+            </a:r>
+            <a:r>
+              <a:rPr lang="en-US" dirty="0" smtClean="0"/>
+              <a:t> XML Namespace Attributes</a:t>
+            </a:r>
+          </a:p>
+        </p:txBody>
+      </p:sp>
+      <p:sp>
+        <p:nvSpPr>
+          <p:cNvPr id="4" name="pole tekstowe 3"/>
+          <p:cNvSpPr txBox="1"/>
+          <p:nvPr/>
+        </p:nvSpPr>
+        <p:spPr>
+          <a:xfrm>
+            <a:off x="2483768" y="5215744"/>
+            <a:ext cx="6408712" cy="430887"/>
+          </a:xfrm>
+          <a:prstGeom prst="rect">
+            <a:avLst/>
+          </a:prstGeom>
+        </p:spPr>
+        <p:style>
+          <a:lnRef idx="1">
+            <a:schemeClr val="accent4"/>
+          </a:lnRef>
+          <a:fillRef idx="2">
+            <a:schemeClr val="accent4"/>
+          </a:fillRef>
+          <a:effectRef idx="1">
+            <a:schemeClr val="accent4"/>
+          </a:effectRef>
+          <a:fontRef idx="minor">
+            <a:schemeClr val="dk1"/>
+          </a:fontRef>
+        </p:style>
+        <p:txBody>
+          <a:bodyPr wrap="square" rtlCol="0">
+            <a:spAutoFit/>
+          </a:bodyPr>
+          <a:lstStyle/>
+          <a:p>
+            <a:r>
+              <a:rPr lang="en-US" sz="2200" dirty="0"/>
+              <a:t>What kind of </a:t>
+            </a:r>
+            <a:r>
+              <a:rPr lang="en-US" sz="2200" dirty="0" smtClean="0"/>
+              <a:t>granularity ?</a:t>
+            </a:r>
+            <a:endParaRPr lang="en-US" sz="2200" dirty="0"/>
           </a:p>
         </p:txBody>
       </p:sp>
@@ -14967,11 +15030,7 @@
             </a:r>
             <a:r>
               <a:rPr lang="pl-PL" dirty="0" smtClean="0"/>
-              <a:t> File – </a:t>
-            </a:r>
-            <a:r>
-              <a:rPr lang="pl-PL" dirty="0" smtClean="0"/>
-              <a:t>X3D</a:t>
+              <a:t> File – X3D</a:t>
             </a:r>
             <a:endParaRPr lang="pl-PL" dirty="0"/>
           </a:p>

</xml_diff>

<commit_message>
A bit tweaking of the code
</commit_message>
<xml_diff>
--- a/documentation/presentation/general_overview.pptx
+++ b/documentation/presentation/general_overview.pptx
@@ -7863,8 +7863,9 @@
           </a:prstGeom>
           <a:ln w="76200">
             <a:solidFill>
-              <a:srgbClr val="00B0F0"/>
+              <a:srgbClr val="FF0000"/>
             </a:solidFill>
+            <a:prstDash val="dash"/>
           </a:ln>
           <a:effectLst>
             <a:outerShdw blurRad="50800" dist="38100" algn="l" rotWithShape="0">
@@ -8173,6 +8174,7 @@
             <a:solidFill>
               <a:srgbClr val="FF0000"/>
             </a:solidFill>
+            <a:prstDash val="dash"/>
           </a:ln>
           <a:effectLst>
             <a:outerShdw blurRad="50800" dist="38100" algn="l" rotWithShape="0">

</xml_diff>